<commit_message>
Actualizacion General de Proyecto (Estetica) | 08.06.2021 08:32pm
</commit_message>
<xml_diff>
--- a/Presentaciones/Presentación2.pptx
+++ b/Presentaciones/Presentación2.pptx
@@ -154,7 +154,7 @@
           <a:blip r:embed="rId2">
             <a:extLst>
               <a:ext uri="{28A0092B-C50C-407E-A947-70E740481C1C}">
-                <a14:useLocalDpi xmlns:a14="http://schemas.microsoft.com/office/drawing/2010/main" val="0"/>
+                <a14:useLocalDpi xmlns:a14="http://schemas.microsoft.com/office/drawing/2010/main" xmlns="" val="0"/>
               </a:ext>
             </a:extLst>
           </a:blip>
@@ -295,6 +295,7 @@
           <a:p>
             <a:fld id="{5AFDB45A-1939-4D24-8F89-64100DDEDE71}" type="datetimeFigureOut">
               <a:rPr lang="es-MX" smtClean="0"/>
+              <a:pPr/>
               <a:t>08/06/2021</a:t>
             </a:fld>
             <a:endParaRPr lang="es-MX"/>
@@ -347,6 +348,7 @@
           <a:p>
             <a:fld id="{58D45DAE-5B21-4C47-83CD-9509906E2FC5}" type="slidenum">
               <a:rPr lang="es-MX" smtClean="0"/>
+              <a:pPr/>
               <a:t>‹Nº›</a:t>
             </a:fld>
             <a:endParaRPr lang="es-MX"/>
@@ -356,7 +358,7 @@
     </p:spTree>
     <p:extLst>
       <p:ext uri="{BB962C8B-B14F-4D97-AF65-F5344CB8AC3E}">
-        <p14:creationId xmlns:p14="http://schemas.microsoft.com/office/powerpoint/2010/main" val="1314996937"/>
+        <p14:creationId xmlns:p14="http://schemas.microsoft.com/office/powerpoint/2010/main" xmlns="" val="1314996937"/>
       </p:ext>
     </p:extLst>
   </p:cSld>
@@ -562,6 +564,7 @@
           <a:p>
             <a:fld id="{5AFDB45A-1939-4D24-8F89-64100DDEDE71}" type="datetimeFigureOut">
               <a:rPr lang="es-MX" smtClean="0"/>
+              <a:pPr/>
               <a:t>08/06/2021</a:t>
             </a:fld>
             <a:endParaRPr lang="es-MX"/>
@@ -604,6 +607,7 @@
           <a:p>
             <a:fld id="{58D45DAE-5B21-4C47-83CD-9509906E2FC5}" type="slidenum">
               <a:rPr lang="es-MX" smtClean="0"/>
+              <a:pPr/>
               <a:t>‹Nº›</a:t>
             </a:fld>
             <a:endParaRPr lang="es-MX"/>
@@ -613,7 +617,7 @@
     </p:spTree>
     <p:extLst>
       <p:ext uri="{BB962C8B-B14F-4D97-AF65-F5344CB8AC3E}">
-        <p14:creationId xmlns:p14="http://schemas.microsoft.com/office/powerpoint/2010/main" val="3016146258"/>
+        <p14:creationId xmlns:p14="http://schemas.microsoft.com/office/powerpoint/2010/main" xmlns="" val="3016146258"/>
       </p:ext>
     </p:extLst>
   </p:cSld>
@@ -652,7 +656,7 @@
           <a:blip r:embed="rId2">
             <a:extLst>
               <a:ext uri="{28A0092B-C50C-407E-A947-70E740481C1C}">
-                <a14:useLocalDpi xmlns:a14="http://schemas.microsoft.com/office/drawing/2010/main" val="0"/>
+                <a14:useLocalDpi xmlns:a14="http://schemas.microsoft.com/office/drawing/2010/main" xmlns="" val="0"/>
               </a:ext>
             </a:extLst>
           </a:blip>
@@ -793,6 +797,7 @@
           <a:p>
             <a:fld id="{5AFDB45A-1939-4D24-8F89-64100DDEDE71}" type="datetimeFigureOut">
               <a:rPr lang="es-MX" smtClean="0"/>
+              <a:pPr/>
               <a:t>08/06/2021</a:t>
             </a:fld>
             <a:endParaRPr lang="es-MX"/>
@@ -845,6 +850,7 @@
           <a:p>
             <a:fld id="{58D45DAE-5B21-4C47-83CD-9509906E2FC5}" type="slidenum">
               <a:rPr lang="es-MX" smtClean="0"/>
+              <a:pPr/>
               <a:t>‹Nº›</a:t>
             </a:fld>
             <a:endParaRPr lang="es-MX"/>
@@ -854,7 +860,7 @@
     </p:spTree>
     <p:extLst>
       <p:ext uri="{BB962C8B-B14F-4D97-AF65-F5344CB8AC3E}">
-        <p14:creationId xmlns:p14="http://schemas.microsoft.com/office/powerpoint/2010/main" val="2612195891"/>
+        <p14:creationId xmlns:p14="http://schemas.microsoft.com/office/powerpoint/2010/main" xmlns="" val="2612195891"/>
       </p:ext>
     </p:extLst>
   </p:cSld>
@@ -893,7 +899,7 @@
           <a:blip r:embed="rId2">
             <a:extLst>
               <a:ext uri="{28A0092B-C50C-407E-A947-70E740481C1C}">
-                <a14:useLocalDpi xmlns:a14="http://schemas.microsoft.com/office/drawing/2010/main" val="0"/>
+                <a14:useLocalDpi xmlns:a14="http://schemas.microsoft.com/office/drawing/2010/main" xmlns="" val="0"/>
               </a:ext>
             </a:extLst>
           </a:blip>
@@ -1103,6 +1109,7 @@
           <a:p>
             <a:fld id="{5AFDB45A-1939-4D24-8F89-64100DDEDE71}" type="datetimeFigureOut">
               <a:rPr lang="es-MX" smtClean="0"/>
+              <a:pPr/>
               <a:t>08/06/2021</a:t>
             </a:fld>
             <a:endParaRPr lang="es-MX"/>
@@ -1155,6 +1162,7 @@
           <a:p>
             <a:fld id="{58D45DAE-5B21-4C47-83CD-9509906E2FC5}" type="slidenum">
               <a:rPr lang="es-MX" smtClean="0"/>
+              <a:pPr/>
               <a:t>‹Nº›</a:t>
             </a:fld>
             <a:endParaRPr lang="es-MX"/>
@@ -1396,7 +1404,7 @@
     </p:spTree>
     <p:extLst>
       <p:ext uri="{BB962C8B-B14F-4D97-AF65-F5344CB8AC3E}">
-        <p14:creationId xmlns:p14="http://schemas.microsoft.com/office/powerpoint/2010/main" val="2192570909"/>
+        <p14:creationId xmlns:p14="http://schemas.microsoft.com/office/powerpoint/2010/main" xmlns="" val="2192570909"/>
       </p:ext>
     </p:extLst>
   </p:cSld>
@@ -1435,7 +1443,7 @@
           <a:blip r:embed="rId2">
             <a:extLst>
               <a:ext uri="{28A0092B-C50C-407E-A947-70E740481C1C}">
-                <a14:useLocalDpi xmlns:a14="http://schemas.microsoft.com/office/drawing/2010/main" val="0"/>
+                <a14:useLocalDpi xmlns:a14="http://schemas.microsoft.com/office/drawing/2010/main" xmlns="" val="0"/>
               </a:ext>
             </a:extLst>
           </a:blip>
@@ -1576,6 +1584,7 @@
           <a:p>
             <a:fld id="{5AFDB45A-1939-4D24-8F89-64100DDEDE71}" type="datetimeFigureOut">
               <a:rPr lang="es-MX" smtClean="0"/>
+              <a:pPr/>
               <a:t>08/06/2021</a:t>
             </a:fld>
             <a:endParaRPr lang="es-MX"/>
@@ -1628,6 +1637,7 @@
           <a:p>
             <a:fld id="{58D45DAE-5B21-4C47-83CD-9509906E2FC5}" type="slidenum">
               <a:rPr lang="es-MX" smtClean="0"/>
+              <a:pPr/>
               <a:t>‹Nº›</a:t>
             </a:fld>
             <a:endParaRPr lang="es-MX"/>
@@ -1637,7 +1647,7 @@
     </p:spTree>
     <p:extLst>
       <p:ext uri="{BB962C8B-B14F-4D97-AF65-F5344CB8AC3E}">
-        <p14:creationId xmlns:p14="http://schemas.microsoft.com/office/powerpoint/2010/main" val="969238005"/>
+        <p14:creationId xmlns:p14="http://schemas.microsoft.com/office/powerpoint/2010/main" xmlns="" val="969238005"/>
       </p:ext>
     </p:extLst>
   </p:cSld>
@@ -2123,6 +2133,7 @@
           <a:p>
             <a:fld id="{5AFDB45A-1939-4D24-8F89-64100DDEDE71}" type="datetimeFigureOut">
               <a:rPr lang="es-MX" smtClean="0"/>
+              <a:pPr/>
               <a:t>08/06/2021</a:t>
             </a:fld>
             <a:endParaRPr lang="es-MX"/>
@@ -2165,6 +2176,7 @@
           <a:p>
             <a:fld id="{58D45DAE-5B21-4C47-83CD-9509906E2FC5}" type="slidenum">
               <a:rPr lang="es-MX" smtClean="0"/>
+              <a:pPr/>
               <a:t>‹Nº›</a:t>
             </a:fld>
             <a:endParaRPr lang="es-MX"/>
@@ -2174,7 +2186,7 @@
     </p:spTree>
     <p:extLst>
       <p:ext uri="{BB962C8B-B14F-4D97-AF65-F5344CB8AC3E}">
-        <p14:creationId xmlns:p14="http://schemas.microsoft.com/office/powerpoint/2010/main" val="1734914403"/>
+        <p14:creationId xmlns:p14="http://schemas.microsoft.com/office/powerpoint/2010/main" xmlns="" val="1734914403"/>
       </p:ext>
     </p:extLst>
   </p:cSld>
@@ -2897,6 +2909,7 @@
           <a:p>
             <a:fld id="{5AFDB45A-1939-4D24-8F89-64100DDEDE71}" type="datetimeFigureOut">
               <a:rPr lang="es-MX" smtClean="0"/>
+              <a:pPr/>
               <a:t>08/06/2021</a:t>
             </a:fld>
             <a:endParaRPr lang="es-MX"/>
@@ -2939,6 +2952,7 @@
           <a:p>
             <a:fld id="{58D45DAE-5B21-4C47-83CD-9509906E2FC5}" type="slidenum">
               <a:rPr lang="es-MX" smtClean="0"/>
+              <a:pPr/>
               <a:t>‹Nº›</a:t>
             </a:fld>
             <a:endParaRPr lang="es-MX"/>
@@ -2948,7 +2962,7 @@
     </p:spTree>
     <p:extLst>
       <p:ext uri="{BB962C8B-B14F-4D97-AF65-F5344CB8AC3E}">
-        <p14:creationId xmlns:p14="http://schemas.microsoft.com/office/powerpoint/2010/main" val="2792880501"/>
+        <p14:creationId xmlns:p14="http://schemas.microsoft.com/office/powerpoint/2010/main" xmlns="" val="2792880501"/>
       </p:ext>
     </p:extLst>
   </p:cSld>
@@ -3072,6 +3086,7 @@
           <a:p>
             <a:fld id="{5AFDB45A-1939-4D24-8F89-64100DDEDE71}" type="datetimeFigureOut">
               <a:rPr lang="es-MX" smtClean="0"/>
+              <a:pPr/>
               <a:t>08/06/2021</a:t>
             </a:fld>
             <a:endParaRPr lang="es-MX"/>
@@ -3114,6 +3129,7 @@
           <a:p>
             <a:fld id="{58D45DAE-5B21-4C47-83CD-9509906E2FC5}" type="slidenum">
               <a:rPr lang="es-MX" smtClean="0"/>
+              <a:pPr/>
               <a:t>‹Nº›</a:t>
             </a:fld>
             <a:endParaRPr lang="es-MX"/>
@@ -3123,7 +3139,7 @@
     </p:spTree>
     <p:extLst>
       <p:ext uri="{BB962C8B-B14F-4D97-AF65-F5344CB8AC3E}">
-        <p14:creationId xmlns:p14="http://schemas.microsoft.com/office/powerpoint/2010/main" val="2907951825"/>
+        <p14:creationId xmlns:p14="http://schemas.microsoft.com/office/powerpoint/2010/main" xmlns="" val="2907951825"/>
       </p:ext>
     </p:extLst>
   </p:cSld>
@@ -3162,7 +3178,7 @@
           <a:blip r:embed="rId2">
             <a:extLst>
               <a:ext uri="{28A0092B-C50C-407E-A947-70E740481C1C}">
-                <a14:useLocalDpi xmlns:a14="http://schemas.microsoft.com/office/drawing/2010/main" val="0"/>
+                <a14:useLocalDpi xmlns:a14="http://schemas.microsoft.com/office/drawing/2010/main" xmlns="" val="0"/>
               </a:ext>
             </a:extLst>
           </a:blip>
@@ -3295,6 +3311,7 @@
           <a:p>
             <a:fld id="{5AFDB45A-1939-4D24-8F89-64100DDEDE71}" type="datetimeFigureOut">
               <a:rPr lang="es-MX" smtClean="0"/>
+              <a:pPr/>
               <a:t>08/06/2021</a:t>
             </a:fld>
             <a:endParaRPr lang="es-MX"/>
@@ -3347,6 +3364,7 @@
           <a:p>
             <a:fld id="{58D45DAE-5B21-4C47-83CD-9509906E2FC5}" type="slidenum">
               <a:rPr lang="es-MX" smtClean="0"/>
+              <a:pPr/>
               <a:t>‹Nº›</a:t>
             </a:fld>
             <a:endParaRPr lang="es-MX"/>
@@ -3356,7 +3374,7 @@
     </p:spTree>
     <p:extLst>
       <p:ext uri="{BB962C8B-B14F-4D97-AF65-F5344CB8AC3E}">
-        <p14:creationId xmlns:p14="http://schemas.microsoft.com/office/powerpoint/2010/main" val="758767631"/>
+        <p14:creationId xmlns:p14="http://schemas.microsoft.com/office/powerpoint/2010/main" xmlns="" val="758767631"/>
       </p:ext>
     </p:extLst>
   </p:cSld>
@@ -3475,6 +3493,7 @@
           <a:p>
             <a:fld id="{5AFDB45A-1939-4D24-8F89-64100DDEDE71}" type="datetimeFigureOut">
               <a:rPr lang="es-MX" smtClean="0"/>
+              <a:pPr/>
               <a:t>08/06/2021</a:t>
             </a:fld>
             <a:endParaRPr lang="es-MX"/>
@@ -3517,6 +3536,7 @@
           <a:p>
             <a:fld id="{58D45DAE-5B21-4C47-83CD-9509906E2FC5}" type="slidenum">
               <a:rPr lang="es-MX" smtClean="0"/>
+              <a:pPr/>
               <a:t>‹Nº›</a:t>
             </a:fld>
             <a:endParaRPr lang="es-MX"/>
@@ -3526,7 +3546,7 @@
     </p:spTree>
     <p:extLst>
       <p:ext uri="{BB962C8B-B14F-4D97-AF65-F5344CB8AC3E}">
-        <p14:creationId xmlns:p14="http://schemas.microsoft.com/office/powerpoint/2010/main" val="3438767011"/>
+        <p14:creationId xmlns:p14="http://schemas.microsoft.com/office/powerpoint/2010/main" xmlns="" val="3438767011"/>
       </p:ext>
     </p:extLst>
   </p:cSld>
@@ -3565,7 +3585,7 @@
           <a:blip r:embed="rId2">
             <a:extLst>
               <a:ext uri="{28A0092B-C50C-407E-A947-70E740481C1C}">
-                <a14:useLocalDpi xmlns:a14="http://schemas.microsoft.com/office/drawing/2010/main" val="0"/>
+                <a14:useLocalDpi xmlns:a14="http://schemas.microsoft.com/office/drawing/2010/main" xmlns="" val="0"/>
               </a:ext>
             </a:extLst>
           </a:blip>
@@ -3764,6 +3784,7 @@
           <a:p>
             <a:fld id="{5AFDB45A-1939-4D24-8F89-64100DDEDE71}" type="datetimeFigureOut">
               <a:rPr lang="es-MX" smtClean="0"/>
+              <a:pPr/>
               <a:t>08/06/2021</a:t>
             </a:fld>
             <a:endParaRPr lang="es-MX"/>
@@ -3816,6 +3837,7 @@
           <a:p>
             <a:fld id="{58D45DAE-5B21-4C47-83CD-9509906E2FC5}" type="slidenum">
               <a:rPr lang="es-MX" smtClean="0"/>
+              <a:pPr/>
               <a:t>‹Nº›</a:t>
             </a:fld>
             <a:endParaRPr lang="es-MX"/>
@@ -3825,7 +3847,7 @@
     </p:spTree>
     <p:extLst>
       <p:ext uri="{BB962C8B-B14F-4D97-AF65-F5344CB8AC3E}">
-        <p14:creationId xmlns:p14="http://schemas.microsoft.com/office/powerpoint/2010/main" val="2044377066"/>
+        <p14:creationId xmlns:p14="http://schemas.microsoft.com/office/powerpoint/2010/main" xmlns="" val="2044377066"/>
       </p:ext>
     </p:extLst>
   </p:cSld>
@@ -4006,6 +4028,7 @@
           <a:p>
             <a:fld id="{5AFDB45A-1939-4D24-8F89-64100DDEDE71}" type="datetimeFigureOut">
               <a:rPr lang="es-MX" smtClean="0"/>
+              <a:pPr/>
               <a:t>08/06/2021</a:t>
             </a:fld>
             <a:endParaRPr lang="es-MX"/>
@@ -4048,6 +4071,7 @@
           <a:p>
             <a:fld id="{58D45DAE-5B21-4C47-83CD-9509906E2FC5}" type="slidenum">
               <a:rPr lang="es-MX" smtClean="0"/>
+              <a:pPr/>
               <a:t>‹Nº›</a:t>
             </a:fld>
             <a:endParaRPr lang="es-MX"/>
@@ -4057,7 +4081,7 @@
     </p:spTree>
     <p:extLst>
       <p:ext uri="{BB962C8B-B14F-4D97-AF65-F5344CB8AC3E}">
-        <p14:creationId xmlns:p14="http://schemas.microsoft.com/office/powerpoint/2010/main" val="622927960"/>
+        <p14:creationId xmlns:p14="http://schemas.microsoft.com/office/powerpoint/2010/main" xmlns="" val="622927960"/>
       </p:ext>
     </p:extLst>
   </p:cSld>
@@ -4385,6 +4409,7 @@
           <a:p>
             <a:fld id="{5AFDB45A-1939-4D24-8F89-64100DDEDE71}" type="datetimeFigureOut">
               <a:rPr lang="es-MX" smtClean="0"/>
+              <a:pPr/>
               <a:t>08/06/2021</a:t>
             </a:fld>
             <a:endParaRPr lang="es-MX"/>
@@ -4427,6 +4452,7 @@
           <a:p>
             <a:fld id="{58D45DAE-5B21-4C47-83CD-9509906E2FC5}" type="slidenum">
               <a:rPr lang="es-MX" smtClean="0"/>
+              <a:pPr/>
               <a:t>‹Nº›</a:t>
             </a:fld>
             <a:endParaRPr lang="es-MX"/>
@@ -4436,7 +4462,7 @@
     </p:spTree>
     <p:extLst>
       <p:ext uri="{BB962C8B-B14F-4D97-AF65-F5344CB8AC3E}">
-        <p14:creationId xmlns:p14="http://schemas.microsoft.com/office/powerpoint/2010/main" val="1055974303"/>
+        <p14:creationId xmlns:p14="http://schemas.microsoft.com/office/powerpoint/2010/main" xmlns="" val="1055974303"/>
       </p:ext>
     </p:extLst>
   </p:cSld>
@@ -4503,6 +4529,7 @@
           <a:p>
             <a:fld id="{5AFDB45A-1939-4D24-8F89-64100DDEDE71}" type="datetimeFigureOut">
               <a:rPr lang="es-MX" smtClean="0"/>
+              <a:pPr/>
               <a:t>08/06/2021</a:t>
             </a:fld>
             <a:endParaRPr lang="es-MX"/>
@@ -4545,6 +4572,7 @@
           <a:p>
             <a:fld id="{58D45DAE-5B21-4C47-83CD-9509906E2FC5}" type="slidenum">
               <a:rPr lang="es-MX" smtClean="0"/>
+              <a:pPr/>
               <a:t>‹Nº›</a:t>
             </a:fld>
             <a:endParaRPr lang="es-MX"/>
@@ -4554,7 +4582,7 @@
     </p:spTree>
     <p:extLst>
       <p:ext uri="{BB962C8B-B14F-4D97-AF65-F5344CB8AC3E}">
-        <p14:creationId xmlns:p14="http://schemas.microsoft.com/office/powerpoint/2010/main" val="204765581"/>
+        <p14:creationId xmlns:p14="http://schemas.microsoft.com/office/powerpoint/2010/main" xmlns="" val="204765581"/>
       </p:ext>
     </p:extLst>
   </p:cSld>
@@ -4598,6 +4626,7 @@
           <a:p>
             <a:fld id="{5AFDB45A-1939-4D24-8F89-64100DDEDE71}" type="datetimeFigureOut">
               <a:rPr lang="es-MX" smtClean="0"/>
+              <a:pPr/>
               <a:t>08/06/2021</a:t>
             </a:fld>
             <a:endParaRPr lang="es-MX"/>
@@ -4640,6 +4669,7 @@
           <a:p>
             <a:fld id="{58D45DAE-5B21-4C47-83CD-9509906E2FC5}" type="slidenum">
               <a:rPr lang="es-MX" smtClean="0"/>
+              <a:pPr/>
               <a:t>‹Nº›</a:t>
             </a:fld>
             <a:endParaRPr lang="es-MX"/>
@@ -4649,7 +4679,7 @@
     </p:spTree>
     <p:extLst>
       <p:ext uri="{BB962C8B-B14F-4D97-AF65-F5344CB8AC3E}">
-        <p14:creationId xmlns:p14="http://schemas.microsoft.com/office/powerpoint/2010/main" val="427918391"/>
+        <p14:creationId xmlns:p14="http://schemas.microsoft.com/office/powerpoint/2010/main" xmlns="" val="427918391"/>
       </p:ext>
     </p:extLst>
   </p:cSld>
@@ -4847,6 +4877,7 @@
           <a:p>
             <a:fld id="{5AFDB45A-1939-4D24-8F89-64100DDEDE71}" type="datetimeFigureOut">
               <a:rPr lang="es-MX" smtClean="0"/>
+              <a:pPr/>
               <a:t>08/06/2021</a:t>
             </a:fld>
             <a:endParaRPr lang="es-MX"/>
@@ -4889,6 +4920,7 @@
           <a:p>
             <a:fld id="{58D45DAE-5B21-4C47-83CD-9509906E2FC5}" type="slidenum">
               <a:rPr lang="es-MX" smtClean="0"/>
+              <a:pPr/>
               <a:t>‹Nº›</a:t>
             </a:fld>
             <a:endParaRPr lang="es-MX"/>
@@ -4898,7 +4930,7 @@
     </p:spTree>
     <p:extLst>
       <p:ext uri="{BB962C8B-B14F-4D97-AF65-F5344CB8AC3E}">
-        <p14:creationId xmlns:p14="http://schemas.microsoft.com/office/powerpoint/2010/main" val="1725197513"/>
+        <p14:creationId xmlns:p14="http://schemas.microsoft.com/office/powerpoint/2010/main" xmlns="" val="1725197513"/>
       </p:ext>
     </p:extLst>
   </p:cSld>
@@ -5104,6 +5136,7 @@
           <a:p>
             <a:fld id="{5AFDB45A-1939-4D24-8F89-64100DDEDE71}" type="datetimeFigureOut">
               <a:rPr lang="es-MX" smtClean="0"/>
+              <a:pPr/>
               <a:t>08/06/2021</a:t>
             </a:fld>
             <a:endParaRPr lang="es-MX"/>
@@ -5146,6 +5179,7 @@
           <a:p>
             <a:fld id="{58D45DAE-5B21-4C47-83CD-9509906E2FC5}" type="slidenum">
               <a:rPr lang="es-MX" smtClean="0"/>
+              <a:pPr/>
               <a:t>‹Nº›</a:t>
             </a:fld>
             <a:endParaRPr lang="es-MX"/>
@@ -5155,7 +5189,7 @@
     </p:spTree>
     <p:extLst>
       <p:ext uri="{BB962C8B-B14F-4D97-AF65-F5344CB8AC3E}">
-        <p14:creationId xmlns:p14="http://schemas.microsoft.com/office/powerpoint/2010/main" val="478911410"/>
+        <p14:creationId xmlns:p14="http://schemas.microsoft.com/office/powerpoint/2010/main" xmlns="" val="478911410"/>
       </p:ext>
     </p:extLst>
   </p:cSld>
@@ -5199,7 +5233,7 @@
           <a:blip r:embed="rId19">
             <a:extLst>
               <a:ext uri="{28A0092B-C50C-407E-A947-70E740481C1C}">
-                <a14:useLocalDpi xmlns:a14="http://schemas.microsoft.com/office/drawing/2010/main" val="0"/>
+                <a14:useLocalDpi xmlns:a14="http://schemas.microsoft.com/office/drawing/2010/main" xmlns="" val="0"/>
               </a:ext>
             </a:extLst>
           </a:blip>
@@ -5347,6 +5381,7 @@
           <a:p>
             <a:fld id="{5AFDB45A-1939-4D24-8F89-64100DDEDE71}" type="datetimeFigureOut">
               <a:rPr lang="es-MX" smtClean="0"/>
+              <a:pPr/>
               <a:t>08/06/2021</a:t>
             </a:fld>
             <a:endParaRPr lang="es-MX"/>
@@ -5425,6 +5460,7 @@
           <a:p>
             <a:fld id="{58D45DAE-5B21-4C47-83CD-9509906E2FC5}" type="slidenum">
               <a:rPr lang="es-MX" smtClean="0"/>
+              <a:pPr/>
               <a:t>‹Nº›</a:t>
             </a:fld>
             <a:endParaRPr lang="es-MX"/>
@@ -5434,7 +5470,7 @@
     </p:spTree>
     <p:extLst>
       <p:ext uri="{BB962C8B-B14F-4D97-AF65-F5344CB8AC3E}">
-        <p14:creationId xmlns:p14="http://schemas.microsoft.com/office/powerpoint/2010/main" val="3686130357"/>
+        <p14:creationId xmlns:p14="http://schemas.microsoft.com/office/powerpoint/2010/main" xmlns="" val="3686130357"/>
       </p:ext>
     </p:extLst>
   </p:cSld>
@@ -5763,7 +5799,7 @@
           <p:cNvPr id="2" name="Título 1">
             <a:extLst>
               <a:ext uri="{FF2B5EF4-FFF2-40B4-BE49-F238E27FC236}">
-                <a16:creationId xmlns:a16="http://schemas.microsoft.com/office/drawing/2014/main" id="{736CF66E-0698-4988-817C-E3E1EA2CEBCB}"/>
+                <a16:creationId xmlns:a16="http://schemas.microsoft.com/office/drawing/2014/main" xmlns="" id="{736CF66E-0698-4988-817C-E3E1EA2CEBCB}"/>
               </a:ext>
             </a:extLst>
           </p:cNvPr>
@@ -5792,7 +5828,7 @@
           <p:cNvPr id="3" name="Subtítulo 2">
             <a:extLst>
               <a:ext uri="{FF2B5EF4-FFF2-40B4-BE49-F238E27FC236}">
-                <a16:creationId xmlns:a16="http://schemas.microsoft.com/office/drawing/2014/main" id="{6FAD7C89-E384-4596-80BF-E0BDDAE93EC3}"/>
+                <a16:creationId xmlns:a16="http://schemas.microsoft.com/office/drawing/2014/main" xmlns="" id="{6FAD7C89-E384-4596-80BF-E0BDDAE93EC3}"/>
               </a:ext>
             </a:extLst>
           </p:cNvPr>
@@ -5838,7 +5874,7 @@
     </p:spTree>
     <p:extLst>
       <p:ext uri="{BB962C8B-B14F-4D97-AF65-F5344CB8AC3E}">
-        <p14:creationId xmlns:p14="http://schemas.microsoft.com/office/powerpoint/2010/main" val="1381312946"/>
+        <p14:creationId xmlns:p14="http://schemas.microsoft.com/office/powerpoint/2010/main" xmlns="" val="1381312946"/>
       </p:ext>
     </p:extLst>
   </p:cSld>
@@ -5870,7 +5906,7 @@
           <p:cNvPr id="3" name="Marcador de contenido 2">
             <a:extLst>
               <a:ext uri="{FF2B5EF4-FFF2-40B4-BE49-F238E27FC236}">
-                <a16:creationId xmlns:a16="http://schemas.microsoft.com/office/drawing/2014/main" id="{550E7811-F79E-48D7-A304-B7042EF03C8D}"/>
+                <a16:creationId xmlns:a16="http://schemas.microsoft.com/office/drawing/2014/main" xmlns="" id="{550E7811-F79E-48D7-A304-B7042EF03C8D}"/>
               </a:ext>
             </a:extLst>
           </p:cNvPr>
@@ -5888,156 +5924,146 @@
           </a:xfrm>
         </p:spPr>
         <p:txBody>
-          <a:bodyPr/>
+          <a:bodyPr>
+            <a:normAutofit/>
+          </a:bodyPr>
           <a:lstStyle/>
           <a:p>
-            <a:r>
-              <a:rPr lang="es-MX" sz="1800" dirty="0">
-                <a:effectLst/>
-                <a:latin typeface="Arial" panose="020B0604020202020204" pitchFamily="34" charset="0"/>
+            <a:pPr algn="just"/>
+            <a:r>
+              <a:rPr lang="es-MX" altLang="es-MX" sz="2400" dirty="0">
+                <a:latin typeface="Arial Narrow" panose="020B0606020202030204" pitchFamily="34" charset="0"/>
                 <a:ea typeface="Calibri" panose="020F0502020204030204" pitchFamily="34" charset="0"/>
-                <a:cs typeface="Times New Roman" panose="02020603050405020304" pitchFamily="18" charset="0"/>
+                <a:cs typeface="Arial" panose="020B0604020202020204" pitchFamily="34" charset="0"/>
               </a:rPr>
               <a:t>En la figura anterior podemos ver el módulo completo y los nombres de cada módulo que usamos en nuestro proyecto, sólo para que sea más fácil entender el código al momento de verlo. El módulo que contiene todos estos módulos mostrados anteriormente tiene por nombre PF1 y el </a:t>
             </a:r>
             <a:r>
-              <a:rPr lang="es-MX" sz="1800" dirty="0" err="1">
-                <a:effectLst/>
-                <a:latin typeface="Arial" panose="020B0604020202020204" pitchFamily="34" charset="0"/>
+              <a:rPr lang="es-MX" altLang="es-MX" sz="2400" dirty="0" err="1">
+                <a:latin typeface="Arial Narrow" panose="020B0606020202030204" pitchFamily="34" charset="0"/>
                 <a:ea typeface="Calibri" panose="020F0502020204030204" pitchFamily="34" charset="0"/>
-                <a:cs typeface="Times New Roman" panose="02020603050405020304" pitchFamily="18" charset="0"/>
+                <a:cs typeface="Arial" panose="020B0604020202020204" pitchFamily="34" charset="0"/>
               </a:rPr>
               <a:t>testbench</a:t>
             </a:r>
             <a:r>
-              <a:rPr lang="es-MX" sz="1800" dirty="0">
-                <a:effectLst/>
-                <a:latin typeface="Arial" panose="020B0604020202020204" pitchFamily="34" charset="0"/>
+              <a:rPr lang="es-MX" altLang="es-MX" sz="2400" dirty="0">
+                <a:latin typeface="Arial Narrow" panose="020B0606020202030204" pitchFamily="34" charset="0"/>
                 <a:ea typeface="Calibri" panose="020F0502020204030204" pitchFamily="34" charset="0"/>
-                <a:cs typeface="Times New Roman" panose="02020603050405020304" pitchFamily="18" charset="0"/>
+                <a:cs typeface="Arial" panose="020B0604020202020204" pitchFamily="34" charset="0"/>
               </a:rPr>
               <a:t> se llama TB Prueba. </a:t>
             </a:r>
           </a:p>
           <a:p>
-            <a:r>
-              <a:rPr lang="es-MX" sz="1800" dirty="0">
-                <a:effectLst/>
-                <a:latin typeface="Arial" panose="020B0604020202020204" pitchFamily="34" charset="0"/>
+            <a:pPr algn="just"/>
+            <a:r>
+              <a:rPr lang="es-MX" altLang="es-MX" sz="2400" dirty="0">
+                <a:latin typeface="Arial Narrow" panose="020B0606020202030204" pitchFamily="34" charset="0"/>
                 <a:ea typeface="Calibri" panose="020F0502020204030204" pitchFamily="34" charset="0"/>
-                <a:cs typeface="Times New Roman" panose="02020603050405020304" pitchFamily="18" charset="0"/>
+                <a:cs typeface="Arial" panose="020B0604020202020204" pitchFamily="34" charset="0"/>
               </a:rPr>
               <a:t>Para esta fase del proyecto, primero tuve que terminar el código de la fase 1 que no habíamos terminado y cuando lo terminé y comprobé que funcionaba correctamente con instrucciones de tipo R, empecé agregando la instrucción </a:t>
             </a:r>
             <a:r>
-              <a:rPr lang="es-MX" sz="1800" dirty="0" err="1">
-                <a:effectLst/>
-                <a:latin typeface="Arial" panose="020B0604020202020204" pitchFamily="34" charset="0"/>
+              <a:rPr lang="es-MX" altLang="es-MX" sz="2400" dirty="0" err="1">
+                <a:latin typeface="Arial Narrow" panose="020B0606020202030204" pitchFamily="34" charset="0"/>
                 <a:ea typeface="Calibri" panose="020F0502020204030204" pitchFamily="34" charset="0"/>
-                <a:cs typeface="Times New Roman" panose="02020603050405020304" pitchFamily="18" charset="0"/>
+                <a:cs typeface="Arial" panose="020B0604020202020204" pitchFamily="34" charset="0"/>
               </a:rPr>
               <a:t>Beq</a:t>
             </a:r>
             <a:r>
-              <a:rPr lang="es-MX" sz="1800" dirty="0">
-                <a:effectLst/>
-                <a:latin typeface="Arial" panose="020B0604020202020204" pitchFamily="34" charset="0"/>
+              <a:rPr lang="es-MX" altLang="es-MX" sz="2400" dirty="0">
+                <a:latin typeface="Arial Narrow" panose="020B0606020202030204" pitchFamily="34" charset="0"/>
                 <a:ea typeface="Calibri" panose="020F0502020204030204" pitchFamily="34" charset="0"/>
-                <a:cs typeface="Times New Roman" panose="02020603050405020304" pitchFamily="18" charset="0"/>
+                <a:cs typeface="Arial" panose="020B0604020202020204" pitchFamily="34" charset="0"/>
               </a:rPr>
               <a:t> en el código, cuando hice funcionar esta instrucción en mi módulo agregué las instrucciones </a:t>
             </a:r>
             <a:r>
-              <a:rPr lang="es-MX" sz="1800" dirty="0" err="1">
-                <a:effectLst/>
-                <a:latin typeface="Arial" panose="020B0604020202020204" pitchFamily="34" charset="0"/>
+              <a:rPr lang="es-MX" altLang="es-MX" sz="2400" dirty="0" err="1">
+                <a:latin typeface="Arial Narrow" panose="020B0606020202030204" pitchFamily="34" charset="0"/>
                 <a:ea typeface="Calibri" panose="020F0502020204030204" pitchFamily="34" charset="0"/>
-                <a:cs typeface="Times New Roman" panose="02020603050405020304" pitchFamily="18" charset="0"/>
+                <a:cs typeface="Arial" panose="020B0604020202020204" pitchFamily="34" charset="0"/>
               </a:rPr>
               <a:t>lw</a:t>
             </a:r>
             <a:r>
-              <a:rPr lang="es-MX" sz="1800" dirty="0">
-                <a:effectLst/>
-                <a:latin typeface="Arial" panose="020B0604020202020204" pitchFamily="34" charset="0"/>
+              <a:rPr lang="es-MX" altLang="es-MX" sz="2400" dirty="0">
+                <a:latin typeface="Arial Narrow" panose="020B0606020202030204" pitchFamily="34" charset="0"/>
                 <a:ea typeface="Calibri" panose="020F0502020204030204" pitchFamily="34" charset="0"/>
-                <a:cs typeface="Times New Roman" panose="02020603050405020304" pitchFamily="18" charset="0"/>
+                <a:cs typeface="Arial" panose="020B0604020202020204" pitchFamily="34" charset="0"/>
               </a:rPr>
               <a:t> y </a:t>
             </a:r>
             <a:r>
-              <a:rPr lang="es-MX" sz="1800" dirty="0" err="1">
-                <a:effectLst/>
-                <a:latin typeface="Arial" panose="020B0604020202020204" pitchFamily="34" charset="0"/>
+              <a:rPr lang="es-MX" altLang="es-MX" sz="2400" dirty="0" err="1">
+                <a:latin typeface="Arial Narrow" panose="020B0606020202030204" pitchFamily="34" charset="0"/>
                 <a:ea typeface="Calibri" panose="020F0502020204030204" pitchFamily="34" charset="0"/>
-                <a:cs typeface="Times New Roman" panose="02020603050405020304" pitchFamily="18" charset="0"/>
+                <a:cs typeface="Arial" panose="020B0604020202020204" pitchFamily="34" charset="0"/>
               </a:rPr>
               <a:t>sw</a:t>
             </a:r>
             <a:r>
-              <a:rPr lang="es-MX" sz="1800" dirty="0">
-                <a:effectLst/>
-                <a:latin typeface="Arial" panose="020B0604020202020204" pitchFamily="34" charset="0"/>
+              <a:rPr lang="es-MX" altLang="es-MX" sz="2400" dirty="0">
+                <a:latin typeface="Arial Narrow" panose="020B0606020202030204" pitchFamily="34" charset="0"/>
                 <a:ea typeface="Calibri" panose="020F0502020204030204" pitchFamily="34" charset="0"/>
-                <a:cs typeface="Times New Roman" panose="02020603050405020304" pitchFamily="18" charset="0"/>
+                <a:cs typeface="Arial" panose="020B0604020202020204" pitchFamily="34" charset="0"/>
               </a:rPr>
               <a:t>, después de eso agregué las instrucciones de tipo I (</a:t>
             </a:r>
             <a:r>
-              <a:rPr lang="es-MX" sz="1800" dirty="0" err="1">
-                <a:effectLst/>
-                <a:latin typeface="Arial" panose="020B0604020202020204" pitchFamily="34" charset="0"/>
+              <a:rPr lang="es-MX" altLang="es-MX" sz="2400" dirty="0" err="1">
+                <a:latin typeface="Arial Narrow" panose="020B0606020202030204" pitchFamily="34" charset="0"/>
                 <a:ea typeface="Calibri" panose="020F0502020204030204" pitchFamily="34" charset="0"/>
-                <a:cs typeface="Times New Roman" panose="02020603050405020304" pitchFamily="18" charset="0"/>
+                <a:cs typeface="Arial" panose="020B0604020202020204" pitchFamily="34" charset="0"/>
               </a:rPr>
               <a:t>addi</a:t>
             </a:r>
             <a:r>
-              <a:rPr lang="es-MX" sz="1800" dirty="0">
-                <a:effectLst/>
-                <a:latin typeface="Arial" panose="020B0604020202020204" pitchFamily="34" charset="0"/>
+              <a:rPr lang="es-MX" altLang="es-MX" sz="2400" dirty="0">
+                <a:latin typeface="Arial Narrow" panose="020B0606020202030204" pitchFamily="34" charset="0"/>
                 <a:ea typeface="Calibri" panose="020F0502020204030204" pitchFamily="34" charset="0"/>
-                <a:cs typeface="Times New Roman" panose="02020603050405020304" pitchFamily="18" charset="0"/>
+                <a:cs typeface="Arial" panose="020B0604020202020204" pitchFamily="34" charset="0"/>
               </a:rPr>
               <a:t>, </a:t>
             </a:r>
             <a:r>
-              <a:rPr lang="es-MX" sz="1800" dirty="0" err="1">
-                <a:effectLst/>
-                <a:latin typeface="Arial" panose="020B0604020202020204" pitchFamily="34" charset="0"/>
+              <a:rPr lang="es-MX" altLang="es-MX" sz="2400" dirty="0" err="1">
+                <a:latin typeface="Arial Narrow" panose="020B0606020202030204" pitchFamily="34" charset="0"/>
                 <a:ea typeface="Calibri" panose="020F0502020204030204" pitchFamily="34" charset="0"/>
-                <a:cs typeface="Times New Roman" panose="02020603050405020304" pitchFamily="18" charset="0"/>
+                <a:cs typeface="Arial" panose="020B0604020202020204" pitchFamily="34" charset="0"/>
               </a:rPr>
               <a:t>andi</a:t>
             </a:r>
             <a:r>
-              <a:rPr lang="es-MX" sz="1800" dirty="0">
-                <a:effectLst/>
-                <a:latin typeface="Arial" panose="020B0604020202020204" pitchFamily="34" charset="0"/>
+              <a:rPr lang="es-MX" altLang="es-MX" sz="2400" dirty="0">
+                <a:latin typeface="Arial Narrow" panose="020B0606020202030204" pitchFamily="34" charset="0"/>
                 <a:ea typeface="Calibri" panose="020F0502020204030204" pitchFamily="34" charset="0"/>
-                <a:cs typeface="Times New Roman" panose="02020603050405020304" pitchFamily="18" charset="0"/>
+                <a:cs typeface="Arial" panose="020B0604020202020204" pitchFamily="34" charset="0"/>
               </a:rPr>
               <a:t>, </a:t>
             </a:r>
             <a:r>
-              <a:rPr lang="es-MX" sz="1800" dirty="0" err="1">
-                <a:effectLst/>
-                <a:latin typeface="Arial" panose="020B0604020202020204" pitchFamily="34" charset="0"/>
+              <a:rPr lang="es-MX" altLang="es-MX" sz="2400" dirty="0" err="1">
+                <a:latin typeface="Arial Narrow" panose="020B0606020202030204" pitchFamily="34" charset="0"/>
                 <a:ea typeface="Calibri" panose="020F0502020204030204" pitchFamily="34" charset="0"/>
-                <a:cs typeface="Times New Roman" panose="02020603050405020304" pitchFamily="18" charset="0"/>
+                <a:cs typeface="Arial" panose="020B0604020202020204" pitchFamily="34" charset="0"/>
               </a:rPr>
               <a:t>slti</a:t>
             </a:r>
             <a:r>
-              <a:rPr lang="es-MX" sz="1800" dirty="0">
-                <a:effectLst/>
-                <a:latin typeface="Arial" panose="020B0604020202020204" pitchFamily="34" charset="0"/>
+              <a:rPr lang="es-MX" altLang="es-MX" sz="2400" dirty="0">
+                <a:latin typeface="Arial Narrow" panose="020B0606020202030204" pitchFamily="34" charset="0"/>
                 <a:ea typeface="Calibri" panose="020F0502020204030204" pitchFamily="34" charset="0"/>
-                <a:cs typeface="Times New Roman" panose="02020603050405020304" pitchFamily="18" charset="0"/>
+                <a:cs typeface="Arial" panose="020B0604020202020204" pitchFamily="34" charset="0"/>
               </a:rPr>
               <a:t>, ori) y volví a probar todas estas instrucciones una por una en el código, posteriormente agregué los buffers y reconecté todos los módulos de la forma que se muestra en la figura anterior.</a:t>
             </a:r>
-            <a:endParaRPr lang="es-MX" sz="1800" dirty="0">
+          </a:p>
+          <a:p>
+            <a:endParaRPr lang="es-MX" sz="2000" dirty="0">
               <a:effectLst/>
               <a:latin typeface="Calibri" panose="020F0502020204030204" pitchFamily="34" charset="0"/>
               <a:ea typeface="Calibri" panose="020F0502020204030204" pitchFamily="34" charset="0"/>
@@ -6045,22 +6071,14 @@
             </a:endParaRPr>
           </a:p>
           <a:p>
-            <a:endParaRPr lang="es-MX" sz="1800" dirty="0">
-              <a:effectLst/>
-              <a:latin typeface="Calibri" panose="020F0502020204030204" pitchFamily="34" charset="0"/>
-              <a:ea typeface="Calibri" panose="020F0502020204030204" pitchFamily="34" charset="0"/>
-              <a:cs typeface="Times New Roman" panose="02020603050405020304" pitchFamily="18" charset="0"/>
-            </a:endParaRPr>
-          </a:p>
-          <a:p>
-            <a:endParaRPr lang="es-MX" dirty="0"/>
+            <a:endParaRPr lang="es-MX" sz="2400" dirty="0"/>
           </a:p>
         </p:txBody>
       </p:sp>
     </p:spTree>
     <p:extLst>
       <p:ext uri="{BB962C8B-B14F-4D97-AF65-F5344CB8AC3E}">
-        <p14:creationId xmlns:p14="http://schemas.microsoft.com/office/powerpoint/2010/main" val="1108851303"/>
+        <p14:creationId xmlns:p14="http://schemas.microsoft.com/office/powerpoint/2010/main" xmlns="" val="1108851303"/>
       </p:ext>
     </p:extLst>
   </p:cSld>
@@ -6092,7 +6110,7 @@
           <p:cNvPr id="2050" name="Imagen 22" descr="Interfaz de usuario gráfica&#10;&#10;Descripción generada automáticamente">
             <a:extLst>
               <a:ext uri="{FF2B5EF4-FFF2-40B4-BE49-F238E27FC236}">
-                <a16:creationId xmlns:a16="http://schemas.microsoft.com/office/drawing/2014/main" id="{E8056013-7011-4C2F-BD3A-44DDE1330D3C}"/>
+                <a16:creationId xmlns:a16="http://schemas.microsoft.com/office/drawing/2014/main" xmlns="" id="{E8056013-7011-4C2F-BD3A-44DDE1330D3C}"/>
               </a:ext>
             </a:extLst>
           </p:cNvPr>
@@ -6105,7 +6123,7 @@
           <a:blip r:embed="rId2">
             <a:extLst>
               <a:ext uri="{28A0092B-C50C-407E-A947-70E740481C1C}">
-                <a14:useLocalDpi xmlns:a14="http://schemas.microsoft.com/office/drawing/2010/main" val="0"/>
+                <a14:useLocalDpi xmlns:a14="http://schemas.microsoft.com/office/drawing/2010/main" xmlns="" val="0"/>
               </a:ext>
             </a:extLst>
           </a:blip>
@@ -6125,7 +6143,7 @@
           <a:noFill/>
           <a:extLst>
             <a:ext uri="{909E8E84-426E-40DD-AFC4-6F175D3DCCD1}">
-              <a14:hiddenFill xmlns:a14="http://schemas.microsoft.com/office/drawing/2010/main">
+              <a14:hiddenFill xmlns:a14="http://schemas.microsoft.com/office/drawing/2010/main" xmlns="">
                 <a:solidFill>
                   <a:srgbClr val="FFFFFF"/>
                 </a:solidFill>
@@ -6139,7 +6157,7 @@
           <p:cNvPr id="2049" name="Imagen 23" descr="Interfaz de usuario gráfica, Aplicación&#10;&#10;Descripción generada automáticamente">
             <a:extLst>
               <a:ext uri="{FF2B5EF4-FFF2-40B4-BE49-F238E27FC236}">
-                <a16:creationId xmlns:a16="http://schemas.microsoft.com/office/drawing/2014/main" id="{AB791984-4557-4B40-AE52-38AF6B4727F0}"/>
+                <a16:creationId xmlns:a16="http://schemas.microsoft.com/office/drawing/2014/main" xmlns="" id="{AB791984-4557-4B40-AE52-38AF6B4727F0}"/>
               </a:ext>
             </a:extLst>
           </p:cNvPr>
@@ -6152,7 +6170,7 @@
           <a:blip r:embed="rId3">
             <a:extLst>
               <a:ext uri="{28A0092B-C50C-407E-A947-70E740481C1C}">
-                <a14:useLocalDpi xmlns:a14="http://schemas.microsoft.com/office/drawing/2010/main" val="0"/>
+                <a14:useLocalDpi xmlns:a14="http://schemas.microsoft.com/office/drawing/2010/main" xmlns="" val="0"/>
               </a:ext>
             </a:extLst>
           </a:blip>
@@ -6163,7 +6181,7 @@
         </p:blipFill>
         <p:spPr bwMode="auto">
           <a:xfrm>
-            <a:off x="573206" y="2252426"/>
+            <a:off x="573206" y="2321701"/>
             <a:ext cx="5610225" cy="962025"/>
           </a:xfrm>
           <a:prstGeom prst="rect">
@@ -6172,7 +6190,7 @@
           <a:noFill/>
           <a:extLst>
             <a:ext uri="{909E8E84-426E-40DD-AFC4-6F175D3DCCD1}">
-              <a14:hiddenFill xmlns:a14="http://schemas.microsoft.com/office/drawing/2010/main">
+              <a14:hiddenFill xmlns:a14="http://schemas.microsoft.com/office/drawing/2010/main" xmlns="">
                 <a:solidFill>
                   <a:srgbClr val="FFFFFF"/>
                 </a:solidFill>
@@ -6186,7 +6204,7 @@
           <p:cNvPr id="4" name="Rectangle 3">
             <a:extLst>
               <a:ext uri="{FF2B5EF4-FFF2-40B4-BE49-F238E27FC236}">
-                <a16:creationId xmlns:a16="http://schemas.microsoft.com/office/drawing/2014/main" id="{7B390D1A-9AE6-493B-ADF6-F4E28310CB2E}"/>
+                <a16:creationId xmlns:a16="http://schemas.microsoft.com/office/drawing/2014/main" xmlns="" id="{7B390D1A-9AE6-493B-ADF6-F4E28310CB2E}"/>
               </a:ext>
             </a:extLst>
           </p:cNvPr>
@@ -6198,7 +6216,7 @@
         <p:spPr bwMode="auto">
           <a:xfrm>
             <a:off x="573206" y="334302"/>
-            <a:ext cx="12369420" cy="615553"/>
+            <a:ext cx="12369420" cy="677108"/>
           </a:xfrm>
           <a:prstGeom prst="rect">
             <a:avLst/>
@@ -6210,14 +6228,14 @@
           <a:effectLst/>
           <a:extLst>
             <a:ext uri="{909E8E84-426E-40DD-AFC4-6F175D3DCCD1}">
-              <a14:hiddenFill xmlns:a14="http://schemas.microsoft.com/office/drawing/2010/main">
+              <a14:hiddenFill xmlns:a14="http://schemas.microsoft.com/office/drawing/2010/main" xmlns="">
                 <a:solidFill>
                   <a:schemeClr val="accent1"/>
                 </a:solidFill>
               </a14:hiddenFill>
             </a:ext>
             <a:ext uri="{91240B29-F687-4F45-9708-019B960494DF}">
-              <a14:hiddenLine xmlns:a14="http://schemas.microsoft.com/office/drawing/2010/main" w="9525">
+              <a14:hiddenLine xmlns:a14="http://schemas.microsoft.com/office/drawing/2010/main" xmlns="" w="9525">
                 <a:solidFill>
                   <a:schemeClr val="tx1"/>
                 </a:solidFill>
@@ -6227,7 +6245,7 @@
               </a14:hiddenLine>
             </a:ext>
             <a:ext uri="{AF507438-7753-43E0-B8FC-AC1667EBCBE1}">
-              <a14:hiddenEffects xmlns:a14="http://schemas.microsoft.com/office/drawing/2010/main">
+              <a14:hiddenEffects xmlns:a14="http://schemas.microsoft.com/office/drawing/2010/main" xmlns="">
                 <a:effectLst>
                   <a:outerShdw dist="35921" dir="2700000" algn="ctr" rotWithShape="0">
                     <a:schemeClr val="bg2"/>
@@ -6263,6 +6281,14 @@
               <a:tabLst/>
             </a:pPr>
             <a:r>
+              <a:rPr lang="es-MX" altLang="es-MX" sz="2000" dirty="0">
+                <a:latin typeface="Arial Narrow" panose="020B0606020202030204" pitchFamily="34" charset="0"/>
+                <a:ea typeface="Calibri" panose="020F0502020204030204" pitchFamily="34" charset="0"/>
+                <a:cs typeface="Arial" panose="020B0604020202020204" pitchFamily="34" charset="0"/>
+              </a:rPr>
+              <a:t>Cuando el módulo estaba listo volví a probar las instrucciones una por una y estos fueron los resultados</a:t>
+            </a:r>
+            <a:r>
               <a:rPr kumimoji="0" lang="es-MX" altLang="es-MX" sz="1600" b="0" i="0" u="none" strike="noStrike" cap="none" normalizeH="0" baseline="0" dirty="0">
                 <a:ln>
                   <a:noFill/>
@@ -6275,67 +6301,7 @@
                 <a:ea typeface="Calibri" panose="020F0502020204030204" pitchFamily="34" charset="0"/>
                 <a:cs typeface="Arial" panose="020B0604020202020204" pitchFamily="34" charset="0"/>
               </a:rPr>
-              <a:t>Cuando el m</a:t>
-            </a:r>
-            <a:r>
-              <a:rPr kumimoji="0" lang="es-MX" altLang="es-MX" sz="1600" b="0" i="0" u="none" strike="noStrike" cap="none" normalizeH="0" baseline="0" dirty="0">
-                <a:ln>
-                  <a:noFill/>
-                </a:ln>
-                <a:solidFill>
-                  <a:schemeClr val="tx1"/>
-                </a:solidFill>
-                <a:effectLst/>
-                <a:latin typeface="Calibri" panose="020F0502020204030204" pitchFamily="34" charset="0"/>
-                <a:ea typeface="Calibri" panose="020F0502020204030204" pitchFamily="34" charset="0"/>
-                <a:cs typeface="Arial" panose="020B0604020202020204" pitchFamily="34" charset="0"/>
-              </a:rPr>
-              <a:t>ó</a:t>
-            </a:r>
-            <a:r>
-              <a:rPr kumimoji="0" lang="es-MX" altLang="es-MX" sz="1600" b="0" i="0" u="none" strike="noStrike" cap="none" normalizeH="0" baseline="0" dirty="0">
-                <a:ln>
-                  <a:noFill/>
-                </a:ln>
-                <a:solidFill>
-                  <a:schemeClr val="tx1"/>
-                </a:solidFill>
-                <a:effectLst/>
-                <a:latin typeface="Arial" panose="020B0604020202020204" pitchFamily="34" charset="0"/>
-                <a:ea typeface="Calibri" panose="020F0502020204030204" pitchFamily="34" charset="0"/>
-                <a:cs typeface="Arial" panose="020B0604020202020204" pitchFamily="34" charset="0"/>
-              </a:rPr>
-              <a:t>dulo estaba listo volv</a:t>
-            </a:r>
-            <a:r>
-              <a:rPr kumimoji="0" lang="es-MX" altLang="es-MX" sz="1600" b="0" i="0" u="none" strike="noStrike" cap="none" normalizeH="0" baseline="0" dirty="0">
-                <a:ln>
-                  <a:noFill/>
-                </a:ln>
-                <a:solidFill>
-                  <a:schemeClr val="tx1"/>
-                </a:solidFill>
-                <a:effectLst/>
-                <a:latin typeface="Calibri" panose="020F0502020204030204" pitchFamily="34" charset="0"/>
-                <a:ea typeface="Calibri" panose="020F0502020204030204" pitchFamily="34" charset="0"/>
-                <a:cs typeface="Arial" panose="020B0604020202020204" pitchFamily="34" charset="0"/>
-              </a:rPr>
-              <a:t>í</a:t>
-            </a:r>
-            <a:r>
-              <a:rPr kumimoji="0" lang="es-MX" altLang="es-MX" sz="1600" b="0" i="0" u="none" strike="noStrike" cap="none" normalizeH="0" baseline="0" dirty="0">
-                <a:ln>
-                  <a:noFill/>
-                </a:ln>
-                <a:solidFill>
-                  <a:schemeClr val="tx1"/>
-                </a:solidFill>
-                <a:effectLst/>
-                <a:latin typeface="Arial" panose="020B0604020202020204" pitchFamily="34" charset="0"/>
-                <a:ea typeface="Calibri" panose="020F0502020204030204" pitchFamily="34" charset="0"/>
-                <a:cs typeface="Arial" panose="020B0604020202020204" pitchFamily="34" charset="0"/>
-              </a:rPr>
-              <a:t> a probar las instrucciones una por una y estos fueron los resultados:</a:t>
+              <a:t>:</a:t>
             </a:r>
             <a:endParaRPr kumimoji="0" lang="es-MX" altLang="es-MX" sz="1400" b="0" i="0" u="none" strike="noStrike" cap="none" normalizeH="0" baseline="0" dirty="0">
               <a:ln>
@@ -6382,7 +6348,7 @@
           <p:cNvPr id="5" name="Rectangle 4">
             <a:extLst>
               <a:ext uri="{FF2B5EF4-FFF2-40B4-BE49-F238E27FC236}">
-                <a16:creationId xmlns:a16="http://schemas.microsoft.com/office/drawing/2014/main" id="{5A8EBE7B-F616-48C0-A7FA-CDBB5AE3E033}"/>
+                <a16:creationId xmlns:a16="http://schemas.microsoft.com/office/drawing/2014/main" xmlns="" id="{5A8EBE7B-F616-48C0-A7FA-CDBB5AE3E033}"/>
               </a:ext>
             </a:extLst>
           </p:cNvPr>
@@ -6394,7 +6360,7 @@
         <p:spPr bwMode="auto">
           <a:xfrm>
             <a:off x="573206" y="1632805"/>
-            <a:ext cx="7829387" cy="892552"/>
+            <a:ext cx="8155158" cy="954107"/>
           </a:xfrm>
           <a:prstGeom prst="rect">
             <a:avLst/>
@@ -6406,14 +6372,14 @@
           <a:effectLst/>
           <a:extLst>
             <a:ext uri="{909E8E84-426E-40DD-AFC4-6F175D3DCCD1}">
-              <a14:hiddenFill xmlns:a14="http://schemas.microsoft.com/office/drawing/2010/main">
+              <a14:hiddenFill xmlns:a14="http://schemas.microsoft.com/office/drawing/2010/main" xmlns="">
                 <a:solidFill>
                   <a:schemeClr val="accent1"/>
                 </a:solidFill>
               </a14:hiddenFill>
             </a:ext>
             <a:ext uri="{91240B29-F687-4F45-9708-019B960494DF}">
-              <a14:hiddenLine xmlns:a14="http://schemas.microsoft.com/office/drawing/2010/main" w="9525">
+              <a14:hiddenLine xmlns:a14="http://schemas.microsoft.com/office/drawing/2010/main" xmlns="" w="9525">
                 <a:solidFill>
                   <a:schemeClr val="tx1"/>
                 </a:solidFill>
@@ -6423,7 +6389,7 @@
               </a14:hiddenLine>
             </a:ext>
             <a:ext uri="{AF507438-7753-43E0-B8FC-AC1667EBCBE1}">
-              <a14:hiddenEffects xmlns:a14="http://schemas.microsoft.com/office/drawing/2010/main">
+              <a14:hiddenEffects xmlns:a14="http://schemas.microsoft.com/office/drawing/2010/main" xmlns="">
                 <a:effectLst>
                   <a:outerShdw dist="35921" dir="2700000" algn="ctr" rotWithShape="0">
                     <a:schemeClr val="bg2"/>
@@ -6434,7 +6400,7 @@
           </a:extLst>
         </p:spPr>
         <p:txBody>
-          <a:bodyPr vert="horz" wrap="none" lIns="91440" tIns="45720" rIns="91440" bIns="45720" numCol="1" anchor="ctr" anchorCtr="0" compatLnSpc="1">
+          <a:bodyPr vert="horz" wrap="square" lIns="91440" tIns="45720" rIns="91440" bIns="45720" numCol="1" anchor="ctr" anchorCtr="0" compatLnSpc="1">
             <a:prstTxWarp prst="textNoShape">
               <a:avLst/>
             </a:prstTxWarp>
@@ -6531,6 +6497,14 @@
               <a:tabLst/>
             </a:pPr>
             <a:r>
+              <a:rPr lang="es-MX" altLang="es-MX" sz="2000" dirty="0">
+                <a:latin typeface="Arial Narrow" panose="020B0606020202030204" pitchFamily="34" charset="0"/>
+                <a:ea typeface="Calibri" panose="020F0502020204030204" pitchFamily="34" charset="0"/>
+                <a:cs typeface="Arial" panose="020B0604020202020204" pitchFamily="34" charset="0"/>
+              </a:rPr>
+              <a:t>Primero, en la figura 2 podemos ver los datos precargados en el banco de registros</a:t>
+            </a:r>
+            <a:r>
               <a:rPr kumimoji="0" lang="es-MX" altLang="es-MX" sz="1600" b="0" i="0" u="none" strike="noStrike" cap="none" normalizeH="0" baseline="0" dirty="0">
                 <a:ln>
                   <a:noFill/>
@@ -6543,7 +6517,7 @@
                 <a:ea typeface="Calibri" panose="020F0502020204030204" pitchFamily="34" charset="0"/>
                 <a:cs typeface="Arial" panose="020B0604020202020204" pitchFamily="34" charset="0"/>
               </a:rPr>
-              <a:t>Primero, en la figura 2 podemos ver los datos precargados en el banco de registros.</a:t>
+              <a:t>.</a:t>
             </a:r>
             <a:endParaRPr kumimoji="0" lang="es-MX" altLang="es-MX" sz="1400" b="0" i="0" u="none" strike="noStrike" cap="none" normalizeH="0" baseline="0" dirty="0">
               <a:ln>
@@ -6590,7 +6564,7 @@
           <p:cNvPr id="6" name="Rectangle 5">
             <a:extLst>
               <a:ext uri="{FF2B5EF4-FFF2-40B4-BE49-F238E27FC236}">
-                <a16:creationId xmlns:a16="http://schemas.microsoft.com/office/drawing/2014/main" id="{3CC1A499-7E67-4892-9965-6498995E44FF}"/>
+                <a16:creationId xmlns:a16="http://schemas.microsoft.com/office/drawing/2014/main" xmlns="" id="{3CC1A499-7E67-4892-9965-6498995E44FF}"/>
               </a:ext>
             </a:extLst>
           </p:cNvPr>
@@ -6614,14 +6588,14 @@
           <a:effectLst/>
           <a:extLst>
             <a:ext uri="{909E8E84-426E-40DD-AFC4-6F175D3DCCD1}">
-              <a14:hiddenFill xmlns:a14="http://schemas.microsoft.com/office/drawing/2010/main">
+              <a14:hiddenFill xmlns:a14="http://schemas.microsoft.com/office/drawing/2010/main" xmlns="">
                 <a:solidFill>
                   <a:schemeClr val="accent1"/>
                 </a:solidFill>
               </a14:hiddenFill>
             </a:ext>
             <a:ext uri="{91240B29-F687-4F45-9708-019B960494DF}">
-              <a14:hiddenLine xmlns:a14="http://schemas.microsoft.com/office/drawing/2010/main" w="9525">
+              <a14:hiddenLine xmlns:a14="http://schemas.microsoft.com/office/drawing/2010/main" xmlns="" w="9525">
                 <a:solidFill>
                   <a:schemeClr val="tx1"/>
                 </a:solidFill>
@@ -6631,7 +6605,7 @@
               </a14:hiddenLine>
             </a:ext>
             <a:ext uri="{AF507438-7753-43E0-B8FC-AC1667EBCBE1}">
-              <a14:hiddenEffects xmlns:a14="http://schemas.microsoft.com/office/drawing/2010/main">
+              <a14:hiddenEffects xmlns:a14="http://schemas.microsoft.com/office/drawing/2010/main" xmlns="">
                 <a:effectLst>
                   <a:outerShdw dist="35921" dir="2700000" algn="ctr" rotWithShape="0">
                     <a:schemeClr val="bg2"/>
@@ -6699,7 +6673,7 @@
           <p:cNvPr id="10" name="CuadroTexto 9">
             <a:extLst>
               <a:ext uri="{FF2B5EF4-FFF2-40B4-BE49-F238E27FC236}">
-                <a16:creationId xmlns:a16="http://schemas.microsoft.com/office/drawing/2014/main" id="{6144A165-BACC-405B-8FA0-A164207069E7}"/>
+                <a16:creationId xmlns:a16="http://schemas.microsoft.com/office/drawing/2014/main" xmlns="" id="{6144A165-BACC-405B-8FA0-A164207069E7}"/>
               </a:ext>
             </a:extLst>
           </p:cNvPr>
@@ -6708,8 +6682,8 @@
         </p:nvSpPr>
         <p:spPr>
           <a:xfrm>
-            <a:off x="573206" y="3436907"/>
-            <a:ext cx="8384274" cy="541751"/>
+            <a:off x="573205" y="3436907"/>
+            <a:ext cx="10316467" cy="750975"/>
           </a:xfrm>
           <a:prstGeom prst="rect">
             <a:avLst/>
@@ -6731,38 +6705,29 @@
               </a:spcAft>
             </a:pPr>
             <a:r>
-              <a:rPr lang="es-MX" sz="1400" dirty="0">
-                <a:effectLst/>
-                <a:latin typeface="Arial" panose="020B0604020202020204" pitchFamily="34" charset="0"/>
+              <a:rPr lang="es-MX" altLang="es-MX" sz="2000" dirty="0">
+                <a:latin typeface="Arial Narrow" panose="020B0606020202030204" pitchFamily="34" charset="0"/>
                 <a:ea typeface="Calibri" panose="020F0502020204030204" pitchFamily="34" charset="0"/>
-                <a:cs typeface="Times New Roman" panose="02020603050405020304" pitchFamily="18" charset="0"/>
+                <a:cs typeface="Arial" panose="020B0604020202020204" pitchFamily="34" charset="0"/>
               </a:rPr>
               <a:t>La primera instrucción que probé fue </a:t>
             </a:r>
             <a:r>
-              <a:rPr lang="es-MX" sz="1400" dirty="0" err="1">
-                <a:effectLst/>
-                <a:latin typeface="Arial" panose="020B0604020202020204" pitchFamily="34" charset="0"/>
+              <a:rPr lang="es-MX" altLang="es-MX" sz="2000" dirty="0" err="1">
+                <a:latin typeface="Arial Narrow" panose="020B0606020202030204" pitchFamily="34" charset="0"/>
                 <a:ea typeface="Calibri" panose="020F0502020204030204" pitchFamily="34" charset="0"/>
-                <a:cs typeface="Times New Roman" panose="02020603050405020304" pitchFamily="18" charset="0"/>
+                <a:cs typeface="Arial" panose="020B0604020202020204" pitchFamily="34" charset="0"/>
               </a:rPr>
               <a:t>Nop</a:t>
             </a:r>
             <a:r>
-              <a:rPr lang="es-MX" sz="1400" dirty="0">
-                <a:effectLst/>
-                <a:latin typeface="Arial" panose="020B0604020202020204" pitchFamily="34" charset="0"/>
+              <a:rPr lang="es-MX" altLang="es-MX" sz="2000" dirty="0">
+                <a:latin typeface="Arial Narrow" panose="020B0606020202030204" pitchFamily="34" charset="0"/>
                 <a:ea typeface="Calibri" panose="020F0502020204030204" pitchFamily="34" charset="0"/>
-                <a:cs typeface="Times New Roman" panose="02020603050405020304" pitchFamily="18" charset="0"/>
+                <a:cs typeface="Arial" panose="020B0604020202020204" pitchFamily="34" charset="0"/>
               </a:rPr>
               <a:t>, en la figura 3 podemos ver que no se realiza operación alguna y se almacena un 0 en la dirección 0.</a:t>
             </a:r>
-            <a:endParaRPr lang="es-MX" sz="1200" dirty="0">
-              <a:effectLst/>
-              <a:latin typeface="Calibri" panose="020F0502020204030204" pitchFamily="34" charset="0"/>
-              <a:ea typeface="Calibri" panose="020F0502020204030204" pitchFamily="34" charset="0"/>
-              <a:cs typeface="Times New Roman" panose="02020603050405020304" pitchFamily="18" charset="0"/>
-            </a:endParaRPr>
           </a:p>
         </p:txBody>
       </p:sp>
@@ -6771,7 +6736,7 @@
           <p:cNvPr id="8" name="Rectangle 7">
             <a:extLst>
               <a:ext uri="{FF2B5EF4-FFF2-40B4-BE49-F238E27FC236}">
-                <a16:creationId xmlns:a16="http://schemas.microsoft.com/office/drawing/2014/main" id="{F7AC1F8A-E805-427D-A1A4-BAFEA0C19E64}"/>
+                <a16:creationId xmlns:a16="http://schemas.microsoft.com/office/drawing/2014/main" xmlns="" id="{F7AC1F8A-E805-427D-A1A4-BAFEA0C19E64}"/>
               </a:ext>
             </a:extLst>
           </p:cNvPr>
@@ -6795,14 +6760,14 @@
           <a:effectLst/>
           <a:extLst>
             <a:ext uri="{909E8E84-426E-40DD-AFC4-6F175D3DCCD1}">
-              <a14:hiddenFill xmlns:a14="http://schemas.microsoft.com/office/drawing/2010/main">
+              <a14:hiddenFill xmlns:a14="http://schemas.microsoft.com/office/drawing/2010/main" xmlns="">
                 <a:solidFill>
                   <a:schemeClr val="accent1"/>
                 </a:solidFill>
               </a14:hiddenFill>
             </a:ext>
             <a:ext uri="{91240B29-F687-4F45-9708-019B960494DF}">
-              <a14:hiddenLine xmlns:a14="http://schemas.microsoft.com/office/drawing/2010/main" w="9525">
+              <a14:hiddenLine xmlns:a14="http://schemas.microsoft.com/office/drawing/2010/main" xmlns="" w="9525">
                 <a:solidFill>
                   <a:schemeClr val="tx1"/>
                 </a:solidFill>
@@ -6812,7 +6777,7 @@
               </a14:hiddenLine>
             </a:ext>
             <a:ext uri="{AF507438-7753-43E0-B8FC-AC1667EBCBE1}">
-              <a14:hiddenEffects xmlns:a14="http://schemas.microsoft.com/office/drawing/2010/main">
+              <a14:hiddenEffects xmlns:a14="http://schemas.microsoft.com/office/drawing/2010/main" xmlns="">
                 <a:effectLst>
                   <a:outerShdw dist="35921" dir="2700000" algn="ctr" rotWithShape="0">
                     <a:schemeClr val="bg2"/>
@@ -6840,7 +6805,7 @@
           <p:cNvPr id="2054" name="Imagen 26" descr="Interfaz de usuario gráfica&#10;&#10;Descripción generada automáticamente">
             <a:extLst>
               <a:ext uri="{FF2B5EF4-FFF2-40B4-BE49-F238E27FC236}">
-                <a16:creationId xmlns:a16="http://schemas.microsoft.com/office/drawing/2014/main" id="{8454799F-DB2A-4D5A-96BC-5711C5AB02F7}"/>
+                <a16:creationId xmlns:a16="http://schemas.microsoft.com/office/drawing/2014/main" xmlns="" id="{8454799F-DB2A-4D5A-96BC-5711C5AB02F7}"/>
               </a:ext>
             </a:extLst>
           </p:cNvPr>
@@ -6853,7 +6818,7 @@
           <a:blip r:embed="rId4">
             <a:extLst>
               <a:ext uri="{28A0092B-C50C-407E-A947-70E740481C1C}">
-                <a14:useLocalDpi xmlns:a14="http://schemas.microsoft.com/office/drawing/2010/main" val="0"/>
+                <a14:useLocalDpi xmlns:a14="http://schemas.microsoft.com/office/drawing/2010/main" xmlns="" val="0"/>
               </a:ext>
             </a:extLst>
           </a:blip>
@@ -6864,7 +6829,7 @@
         </p:blipFill>
         <p:spPr bwMode="auto">
           <a:xfrm>
-            <a:off x="573206" y="3995130"/>
+            <a:off x="587061" y="4410766"/>
             <a:ext cx="5610225" cy="895350"/>
           </a:xfrm>
           <a:prstGeom prst="rect">
@@ -6873,7 +6838,7 @@
           <a:noFill/>
           <a:extLst>
             <a:ext uri="{909E8E84-426E-40DD-AFC4-6F175D3DCCD1}">
-              <a14:hiddenFill xmlns:a14="http://schemas.microsoft.com/office/drawing/2010/main">
+              <a14:hiddenFill xmlns:a14="http://schemas.microsoft.com/office/drawing/2010/main" xmlns="">
                 <a:solidFill>
                   <a:srgbClr val="FFFFFF"/>
                 </a:solidFill>
@@ -6887,7 +6852,7 @@
           <p:cNvPr id="9" name="Rectangle 8">
             <a:extLst>
               <a:ext uri="{FF2B5EF4-FFF2-40B4-BE49-F238E27FC236}">
-                <a16:creationId xmlns:a16="http://schemas.microsoft.com/office/drawing/2014/main" id="{66A41CD2-38CD-4B4E-9B8A-DAA83E426545}"/>
+                <a16:creationId xmlns:a16="http://schemas.microsoft.com/office/drawing/2014/main" xmlns="" id="{66A41CD2-38CD-4B4E-9B8A-DAA83E426545}"/>
               </a:ext>
             </a:extLst>
           </p:cNvPr>
@@ -6898,8 +6863,8 @@
         </p:nvSpPr>
         <p:spPr bwMode="auto">
           <a:xfrm>
-            <a:off x="573206" y="4844314"/>
-            <a:ext cx="10728207" cy="877163"/>
+            <a:off x="573206" y="5398496"/>
+            <a:ext cx="10728207" cy="1154162"/>
           </a:xfrm>
           <a:prstGeom prst="rect">
             <a:avLst/>
@@ -6911,14 +6876,14 @@
           <a:effectLst/>
           <a:extLst>
             <a:ext uri="{909E8E84-426E-40DD-AFC4-6F175D3DCCD1}">
-              <a14:hiddenFill xmlns:a14="http://schemas.microsoft.com/office/drawing/2010/main">
+              <a14:hiddenFill xmlns:a14="http://schemas.microsoft.com/office/drawing/2010/main" xmlns="">
                 <a:solidFill>
                   <a:schemeClr val="accent1"/>
                 </a:solidFill>
               </a14:hiddenFill>
             </a:ext>
             <a:ext uri="{91240B29-F687-4F45-9708-019B960494DF}">
-              <a14:hiddenLine xmlns:a14="http://schemas.microsoft.com/office/drawing/2010/main" w="9525">
+              <a14:hiddenLine xmlns:a14="http://schemas.microsoft.com/office/drawing/2010/main" xmlns="" w="9525">
                 <a:solidFill>
                   <a:schemeClr val="tx1"/>
                 </a:solidFill>
@@ -6928,7 +6893,7 @@
               </a14:hiddenLine>
             </a:ext>
             <a:ext uri="{AF507438-7753-43E0-B8FC-AC1667EBCBE1}">
-              <a14:hiddenEffects xmlns:a14="http://schemas.microsoft.com/office/drawing/2010/main">
+              <a14:hiddenEffects xmlns:a14="http://schemas.microsoft.com/office/drawing/2010/main" xmlns="">
                 <a:effectLst>
                   <a:outerShdw dist="35921" dir="2700000" algn="ctr" rotWithShape="0">
                     <a:schemeClr val="bg2"/>
@@ -7006,217 +6971,36 @@
               <a:tabLst/>
             </a:pPr>
             <a:r>
-              <a:rPr kumimoji="0" lang="es-MX" altLang="es-MX" sz="1400" b="0" i="0" u="none" strike="noStrike" cap="none" normalizeH="0" baseline="0" dirty="0">
-                <a:ln>
-                  <a:noFill/>
-                </a:ln>
-                <a:solidFill>
-                  <a:schemeClr val="tx1"/>
-                </a:solidFill>
-                <a:effectLst/>
-                <a:latin typeface="Arial" panose="020B0604020202020204" pitchFamily="34" charset="0"/>
+              <a:rPr lang="es-MX" altLang="es-MX" sz="2000" dirty="0">
+                <a:latin typeface="Arial Narrow" panose="020B0606020202030204" pitchFamily="34" charset="0"/>
                 <a:ea typeface="Calibri" panose="020F0502020204030204" pitchFamily="34" charset="0"/>
                 <a:cs typeface="Arial" panose="020B0604020202020204" pitchFamily="34" charset="0"/>
               </a:rPr>
-              <a:t>La siguiente instrucci</a:t>
-            </a:r>
-            <a:r>
-              <a:rPr kumimoji="0" lang="es-MX" altLang="es-MX" sz="1400" b="0" i="0" u="none" strike="noStrike" cap="none" normalizeH="0" baseline="0" dirty="0">
-                <a:ln>
-                  <a:noFill/>
-                </a:ln>
-                <a:solidFill>
-                  <a:schemeClr val="tx1"/>
-                </a:solidFill>
-                <a:effectLst/>
-                <a:latin typeface="Calibri" panose="020F0502020204030204" pitchFamily="34" charset="0"/>
-                <a:ea typeface="Calibri" panose="020F0502020204030204" pitchFamily="34" charset="0"/>
-                <a:cs typeface="Arial" panose="020B0604020202020204" pitchFamily="34" charset="0"/>
-              </a:rPr>
-              <a:t>ó</a:t>
-            </a:r>
-            <a:r>
-              <a:rPr kumimoji="0" lang="es-MX" altLang="es-MX" sz="1400" b="0" i="0" u="none" strike="noStrike" cap="none" normalizeH="0" baseline="0" dirty="0">
-                <a:ln>
-                  <a:noFill/>
-                </a:ln>
-                <a:solidFill>
-                  <a:schemeClr val="tx1"/>
-                </a:solidFill>
-                <a:effectLst/>
-                <a:latin typeface="Arial" panose="020B0604020202020204" pitchFamily="34" charset="0"/>
-                <a:ea typeface="Calibri" panose="020F0502020204030204" pitchFamily="34" charset="0"/>
-                <a:cs typeface="Arial" panose="020B0604020202020204" pitchFamily="34" charset="0"/>
-              </a:rPr>
-              <a:t>n fue </a:t>
-            </a:r>
-            <a:r>
-              <a:rPr kumimoji="0" lang="es-MX" altLang="es-MX" sz="1400" b="0" i="0" u="none" strike="noStrike" cap="none" normalizeH="0" baseline="0" dirty="0" err="1">
-                <a:ln>
-                  <a:noFill/>
-                </a:ln>
-                <a:solidFill>
-                  <a:schemeClr val="tx1"/>
-                </a:solidFill>
-                <a:effectLst/>
-                <a:latin typeface="Arial" panose="020B0604020202020204" pitchFamily="34" charset="0"/>
+              <a:t>La siguiente instrucción fue </a:t>
+            </a:r>
+            <a:r>
+              <a:rPr lang="es-MX" altLang="es-MX" sz="2000" dirty="0" err="1">
+                <a:latin typeface="Arial Narrow" panose="020B0606020202030204" pitchFamily="34" charset="0"/>
                 <a:ea typeface="Calibri" panose="020F0502020204030204" pitchFamily="34" charset="0"/>
                 <a:cs typeface="Arial" panose="020B0604020202020204" pitchFamily="34" charset="0"/>
               </a:rPr>
               <a:t>addi</a:t>
             </a:r>
             <a:r>
-              <a:rPr kumimoji="0" lang="es-MX" altLang="es-MX" sz="1400" b="0" i="0" u="none" strike="noStrike" cap="none" normalizeH="0" baseline="0" dirty="0">
-                <a:ln>
-                  <a:noFill/>
-                </a:ln>
-                <a:solidFill>
-                  <a:schemeClr val="tx1"/>
-                </a:solidFill>
-                <a:effectLst/>
-                <a:latin typeface="Arial" panose="020B0604020202020204" pitchFamily="34" charset="0"/>
+              <a:rPr lang="es-MX" altLang="es-MX" sz="2000" dirty="0">
+                <a:latin typeface="Arial Narrow" panose="020B0606020202030204" pitchFamily="34" charset="0"/>
                 <a:ea typeface="Calibri" panose="020F0502020204030204" pitchFamily="34" charset="0"/>
                 <a:cs typeface="Arial" panose="020B0604020202020204" pitchFamily="34" charset="0"/>
               </a:rPr>
-              <a:t>, en la figura 4 se muestra la instrucci</a:t>
-            </a:r>
-            <a:r>
-              <a:rPr kumimoji="0" lang="es-MX" altLang="es-MX" sz="1400" b="0" i="0" u="none" strike="noStrike" cap="none" normalizeH="0" baseline="0" dirty="0">
-                <a:ln>
-                  <a:noFill/>
-                </a:ln>
-                <a:solidFill>
-                  <a:schemeClr val="tx1"/>
-                </a:solidFill>
-                <a:effectLst/>
-                <a:latin typeface="Calibri" panose="020F0502020204030204" pitchFamily="34" charset="0"/>
-                <a:ea typeface="Calibri" panose="020F0502020204030204" pitchFamily="34" charset="0"/>
-                <a:cs typeface="Arial" panose="020B0604020202020204" pitchFamily="34" charset="0"/>
-              </a:rPr>
-              <a:t>ó</a:t>
-            </a:r>
-            <a:r>
-              <a:rPr kumimoji="0" lang="es-MX" altLang="es-MX" sz="1400" b="0" i="0" u="none" strike="noStrike" cap="none" normalizeH="0" baseline="0" dirty="0">
-                <a:ln>
-                  <a:noFill/>
-                </a:ln>
-                <a:solidFill>
-                  <a:schemeClr val="tx1"/>
-                </a:solidFill>
-                <a:effectLst/>
-                <a:latin typeface="Arial" panose="020B0604020202020204" pitchFamily="34" charset="0"/>
-                <a:ea typeface="Calibri" panose="020F0502020204030204" pitchFamily="34" charset="0"/>
-                <a:cs typeface="Arial" panose="020B0604020202020204" pitchFamily="34" charset="0"/>
-              </a:rPr>
-              <a:t>n y el banco de registros con el nuevo dato. En la instrucci</a:t>
-            </a:r>
-            <a:r>
-              <a:rPr kumimoji="0" lang="es-MX" altLang="es-MX" sz="1400" b="0" i="0" u="none" strike="noStrike" cap="none" normalizeH="0" baseline="0" dirty="0">
-                <a:ln>
-                  <a:noFill/>
-                </a:ln>
-                <a:solidFill>
-                  <a:schemeClr val="tx1"/>
-                </a:solidFill>
-                <a:effectLst/>
-                <a:latin typeface="Calibri" panose="020F0502020204030204" pitchFamily="34" charset="0"/>
-                <a:ea typeface="Calibri" panose="020F0502020204030204" pitchFamily="34" charset="0"/>
-                <a:cs typeface="Arial" panose="020B0604020202020204" pitchFamily="34" charset="0"/>
-              </a:rPr>
-              <a:t>ó</a:t>
-            </a:r>
-            <a:r>
-              <a:rPr kumimoji="0" lang="es-MX" altLang="es-MX" sz="1400" b="0" i="0" u="none" strike="noStrike" cap="none" normalizeH="0" baseline="0" dirty="0">
-                <a:ln>
-                  <a:noFill/>
-                </a:ln>
-                <a:solidFill>
-                  <a:schemeClr val="tx1"/>
-                </a:solidFill>
-                <a:effectLst/>
-                <a:latin typeface="Arial" panose="020B0604020202020204" pitchFamily="34" charset="0"/>
-                <a:ea typeface="Calibri" panose="020F0502020204030204" pitchFamily="34" charset="0"/>
-                <a:cs typeface="Arial" panose="020B0604020202020204" pitchFamily="34" charset="0"/>
-              </a:rPr>
-              <a:t>n se indica primero la operaci</a:t>
-            </a:r>
-            <a:r>
-              <a:rPr kumimoji="0" lang="es-MX" altLang="es-MX" sz="1400" b="0" i="0" u="none" strike="noStrike" cap="none" normalizeH="0" baseline="0" dirty="0">
-                <a:ln>
-                  <a:noFill/>
-                </a:ln>
-                <a:solidFill>
-                  <a:schemeClr val="tx1"/>
-                </a:solidFill>
-                <a:effectLst/>
-                <a:latin typeface="Calibri" panose="020F0502020204030204" pitchFamily="34" charset="0"/>
-                <a:ea typeface="Calibri" panose="020F0502020204030204" pitchFamily="34" charset="0"/>
-                <a:cs typeface="Arial" panose="020B0604020202020204" pitchFamily="34" charset="0"/>
-              </a:rPr>
-              <a:t>ó</a:t>
-            </a:r>
-            <a:r>
-              <a:rPr kumimoji="0" lang="es-MX" altLang="es-MX" sz="1400" b="0" i="0" u="none" strike="noStrike" cap="none" normalizeH="0" baseline="0" dirty="0">
-                <a:ln>
-                  <a:noFill/>
-                </a:ln>
-                <a:solidFill>
-                  <a:schemeClr val="tx1"/>
-                </a:solidFill>
-                <a:effectLst/>
-                <a:latin typeface="Arial" panose="020B0604020202020204" pitchFamily="34" charset="0"/>
-                <a:ea typeface="Calibri" panose="020F0502020204030204" pitchFamily="34" charset="0"/>
-                <a:cs typeface="Arial" panose="020B0604020202020204" pitchFamily="34" charset="0"/>
-              </a:rPr>
-              <a:t>n a realizar (010000), luego el registro operando (00100), luego el registro destino (10000) y por </a:t>
-            </a:r>
-            <a:r>
-              <a:rPr kumimoji="0" lang="es-MX" altLang="es-MX" sz="1400" b="0" i="0" u="none" strike="noStrike" cap="none" normalizeH="0" baseline="0" dirty="0">
-                <a:ln>
-                  <a:noFill/>
-                </a:ln>
-                <a:solidFill>
-                  <a:schemeClr val="tx1"/>
-                </a:solidFill>
-                <a:effectLst/>
-                <a:latin typeface="Calibri" panose="020F0502020204030204" pitchFamily="34" charset="0"/>
-                <a:ea typeface="Calibri" panose="020F0502020204030204" pitchFamily="34" charset="0"/>
-                <a:cs typeface="Arial" panose="020B0604020202020204" pitchFamily="34" charset="0"/>
-              </a:rPr>
-              <a:t>ú</a:t>
-            </a:r>
-            <a:r>
-              <a:rPr kumimoji="0" lang="es-MX" altLang="es-MX" sz="1400" b="0" i="0" u="none" strike="noStrike" cap="none" normalizeH="0" baseline="0" dirty="0">
-                <a:ln>
-                  <a:noFill/>
-                </a:ln>
-                <a:solidFill>
-                  <a:schemeClr val="tx1"/>
-                </a:solidFill>
-                <a:effectLst/>
-                <a:latin typeface="Arial" panose="020B0604020202020204" pitchFamily="34" charset="0"/>
-                <a:ea typeface="Calibri" panose="020F0502020204030204" pitchFamily="34" charset="0"/>
-                <a:cs typeface="Arial" panose="020B0604020202020204" pitchFamily="34" charset="0"/>
-              </a:rPr>
-              <a:t>ltimo 0000100010001100 que es el valor inmediato que se va a sumar.</a:t>
-            </a:r>
-            <a:endParaRPr kumimoji="0" lang="es-MX" altLang="es-MX" sz="2000" b="0" i="0" u="none" strike="noStrike" cap="none" normalizeH="0" baseline="0" dirty="0">
-              <a:ln>
-                <a:noFill/>
-              </a:ln>
-              <a:solidFill>
-                <a:schemeClr val="tx1"/>
-              </a:solidFill>
-              <a:effectLst/>
-              <a:latin typeface="Arial" panose="020B0604020202020204" pitchFamily="34" charset="0"/>
-            </a:endParaRPr>
+              <a:t>, en la figura 4 se muestra la instrucción y el banco de registros con el nuevo dato. En la instrucción se indica primero la operación a realizar (010000), luego el registro operando (00100), luego el registro destino (10000) y por último 0000100010001100 que es el valor inmediato que se va a sumar.</a:t>
+            </a:r>
           </a:p>
         </p:txBody>
       </p:sp>
     </p:spTree>
     <p:extLst>
       <p:ext uri="{BB962C8B-B14F-4D97-AF65-F5344CB8AC3E}">
-        <p14:creationId xmlns:p14="http://schemas.microsoft.com/office/powerpoint/2010/main" val="1061168951"/>
+        <p14:creationId xmlns:p14="http://schemas.microsoft.com/office/powerpoint/2010/main" xmlns="" val="1061168951"/>
       </p:ext>
     </p:extLst>
   </p:cSld>
@@ -7248,7 +7032,7 @@
           <p:cNvPr id="3075" name="Imagen 27" descr="Interfaz de usuario gráfica, Texto, Aplicación&#10;&#10;Descripción generada automáticamente">
             <a:extLst>
               <a:ext uri="{FF2B5EF4-FFF2-40B4-BE49-F238E27FC236}">
-                <a16:creationId xmlns:a16="http://schemas.microsoft.com/office/drawing/2014/main" id="{756EAFF1-F689-4EE5-9815-2C929880A0C1}"/>
+                <a16:creationId xmlns:a16="http://schemas.microsoft.com/office/drawing/2014/main" xmlns="" id="{756EAFF1-F689-4EE5-9815-2C929880A0C1}"/>
               </a:ext>
             </a:extLst>
           </p:cNvPr>
@@ -7261,7 +7045,7 @@
           <a:blip r:embed="rId2">
             <a:extLst>
               <a:ext uri="{28A0092B-C50C-407E-A947-70E740481C1C}">
-                <a14:useLocalDpi xmlns:a14="http://schemas.microsoft.com/office/drawing/2010/main" val="0"/>
+                <a14:useLocalDpi xmlns:a14="http://schemas.microsoft.com/office/drawing/2010/main" xmlns="" val="0"/>
               </a:ext>
             </a:extLst>
           </a:blip>
@@ -7272,7 +7056,7 @@
         </p:blipFill>
         <p:spPr bwMode="auto">
           <a:xfrm>
-            <a:off x="368487" y="683014"/>
+            <a:off x="368487" y="235527"/>
             <a:ext cx="5610225" cy="971550"/>
           </a:xfrm>
           <a:prstGeom prst="rect">
@@ -7281,7 +7065,7 @@
           <a:noFill/>
           <a:extLst>
             <a:ext uri="{909E8E84-426E-40DD-AFC4-6F175D3DCCD1}">
-              <a14:hiddenFill xmlns:a14="http://schemas.microsoft.com/office/drawing/2010/main">
+              <a14:hiddenFill xmlns:a14="http://schemas.microsoft.com/office/drawing/2010/main" xmlns="">
                 <a:solidFill>
                   <a:srgbClr val="FFFFFF"/>
                 </a:solidFill>
@@ -7295,7 +7079,7 @@
           <p:cNvPr id="3074" name="Imagen 28" descr="Interfaz de usuario gráfica&#10;&#10;Descripción generada automáticamente">
             <a:extLst>
               <a:ext uri="{FF2B5EF4-FFF2-40B4-BE49-F238E27FC236}">
-                <a16:creationId xmlns:a16="http://schemas.microsoft.com/office/drawing/2014/main" id="{F2DA37F2-91D4-4AC2-ADF9-CEA92C339630}"/>
+                <a16:creationId xmlns:a16="http://schemas.microsoft.com/office/drawing/2014/main" xmlns="" id="{F2DA37F2-91D4-4AC2-ADF9-CEA92C339630}"/>
               </a:ext>
             </a:extLst>
           </p:cNvPr>
@@ -7308,7 +7092,7 @@
           <a:blip r:embed="rId3">
             <a:extLst>
               <a:ext uri="{28A0092B-C50C-407E-A947-70E740481C1C}">
-                <a14:useLocalDpi xmlns:a14="http://schemas.microsoft.com/office/drawing/2010/main" val="0"/>
+                <a14:useLocalDpi xmlns:a14="http://schemas.microsoft.com/office/drawing/2010/main" xmlns="" val="0"/>
               </a:ext>
             </a:extLst>
           </a:blip>
@@ -7328,7 +7112,7 @@
           <a:noFill/>
           <a:extLst>
             <a:ext uri="{909E8E84-426E-40DD-AFC4-6F175D3DCCD1}">
-              <a14:hiddenFill xmlns:a14="http://schemas.microsoft.com/office/drawing/2010/main">
+              <a14:hiddenFill xmlns:a14="http://schemas.microsoft.com/office/drawing/2010/main" xmlns="">
                 <a:solidFill>
                   <a:srgbClr val="FFFFFF"/>
                 </a:solidFill>
@@ -7342,7 +7126,7 @@
           <p:cNvPr id="3073" name="Imagen 29" descr="Interfaz de usuario gráfica, Texto, Aplicación&#10;&#10;Descripción generada automáticamente">
             <a:extLst>
               <a:ext uri="{FF2B5EF4-FFF2-40B4-BE49-F238E27FC236}">
-                <a16:creationId xmlns:a16="http://schemas.microsoft.com/office/drawing/2014/main" id="{8E8382B4-6F55-4027-A7DE-94B15B7C13E0}"/>
+                <a16:creationId xmlns:a16="http://schemas.microsoft.com/office/drawing/2014/main" xmlns="" id="{8E8382B4-6F55-4027-A7DE-94B15B7C13E0}"/>
               </a:ext>
             </a:extLst>
           </p:cNvPr>
@@ -7355,7 +7139,7 @@
           <a:blip r:embed="rId4">
             <a:extLst>
               <a:ext uri="{28A0092B-C50C-407E-A947-70E740481C1C}">
-                <a14:useLocalDpi xmlns:a14="http://schemas.microsoft.com/office/drawing/2010/main" val="0"/>
+                <a14:useLocalDpi xmlns:a14="http://schemas.microsoft.com/office/drawing/2010/main" xmlns="" val="0"/>
               </a:ext>
             </a:extLst>
           </a:blip>
@@ -7366,7 +7150,7 @@
         </p:blipFill>
         <p:spPr bwMode="auto">
           <a:xfrm>
-            <a:off x="368487" y="4133363"/>
+            <a:off x="368487" y="4756818"/>
             <a:ext cx="5610225" cy="971550"/>
           </a:xfrm>
           <a:prstGeom prst="rect">
@@ -7375,7 +7159,7 @@
           <a:noFill/>
           <a:extLst>
             <a:ext uri="{909E8E84-426E-40DD-AFC4-6F175D3DCCD1}">
-              <a14:hiddenFill xmlns:a14="http://schemas.microsoft.com/office/drawing/2010/main">
+              <a14:hiddenFill xmlns:a14="http://schemas.microsoft.com/office/drawing/2010/main" xmlns="">
                 <a:solidFill>
                   <a:srgbClr val="FFFFFF"/>
                 </a:solidFill>
@@ -7389,7 +7173,7 @@
           <p:cNvPr id="4" name="Rectangle 4">
             <a:extLst>
               <a:ext uri="{FF2B5EF4-FFF2-40B4-BE49-F238E27FC236}">
-                <a16:creationId xmlns:a16="http://schemas.microsoft.com/office/drawing/2014/main" id="{E88AE0F0-A3B1-44DE-BF8E-DF77CE777687}"/>
+                <a16:creationId xmlns:a16="http://schemas.microsoft.com/office/drawing/2014/main" xmlns="" id="{E88AE0F0-A3B1-44DE-BF8E-DF77CE777687}"/>
               </a:ext>
             </a:extLst>
           </p:cNvPr>
@@ -7413,14 +7197,14 @@
           <a:effectLst/>
           <a:extLst>
             <a:ext uri="{909E8E84-426E-40DD-AFC4-6F175D3DCCD1}">
-              <a14:hiddenFill xmlns:a14="http://schemas.microsoft.com/office/drawing/2010/main">
+              <a14:hiddenFill xmlns:a14="http://schemas.microsoft.com/office/drawing/2010/main" xmlns="">
                 <a:solidFill>
                   <a:schemeClr val="accent1"/>
                 </a:solidFill>
               </a14:hiddenFill>
             </a:ext>
             <a:ext uri="{91240B29-F687-4F45-9708-019B960494DF}">
-              <a14:hiddenLine xmlns:a14="http://schemas.microsoft.com/office/drawing/2010/main" w="9525">
+              <a14:hiddenLine xmlns:a14="http://schemas.microsoft.com/office/drawing/2010/main" xmlns="" w="9525">
                 <a:solidFill>
                   <a:schemeClr val="tx1"/>
                 </a:solidFill>
@@ -7430,7 +7214,7 @@
               </a14:hiddenLine>
             </a:ext>
             <a:ext uri="{AF507438-7753-43E0-B8FC-AC1667EBCBE1}">
-              <a14:hiddenEffects xmlns:a14="http://schemas.microsoft.com/office/drawing/2010/main">
+              <a14:hiddenEffects xmlns:a14="http://schemas.microsoft.com/office/drawing/2010/main" xmlns="">
                 <a:effectLst>
                   <a:outerShdw dist="35921" dir="2700000" algn="ctr" rotWithShape="0">
                     <a:schemeClr val="bg2"/>
@@ -7458,7 +7242,7 @@
           <p:cNvPr id="5" name="Rectangle 5">
             <a:extLst>
               <a:ext uri="{FF2B5EF4-FFF2-40B4-BE49-F238E27FC236}">
-                <a16:creationId xmlns:a16="http://schemas.microsoft.com/office/drawing/2014/main" id="{C38B094D-1FC0-464C-9377-15E98080279A}"/>
+                <a16:creationId xmlns:a16="http://schemas.microsoft.com/office/drawing/2014/main" xmlns="" id="{C38B094D-1FC0-464C-9377-15E98080279A}"/>
               </a:ext>
             </a:extLst>
           </p:cNvPr>
@@ -7469,8 +7253,8 @@
         </p:nvSpPr>
         <p:spPr bwMode="auto">
           <a:xfrm>
-            <a:off x="368489" y="1606797"/>
-            <a:ext cx="10929938" cy="1154162"/>
+            <a:off x="368489" y="1191160"/>
+            <a:ext cx="10929938" cy="1461939"/>
           </a:xfrm>
           <a:prstGeom prst="rect">
             <a:avLst/>
@@ -7482,14 +7266,14 @@
           <a:effectLst/>
           <a:extLst>
             <a:ext uri="{909E8E84-426E-40DD-AFC4-6F175D3DCCD1}">
-              <a14:hiddenFill xmlns:a14="http://schemas.microsoft.com/office/drawing/2010/main">
+              <a14:hiddenFill xmlns:a14="http://schemas.microsoft.com/office/drawing/2010/main" xmlns="">
                 <a:solidFill>
                   <a:schemeClr val="accent1"/>
                 </a:solidFill>
               </a14:hiddenFill>
             </a:ext>
             <a:ext uri="{91240B29-F687-4F45-9708-019B960494DF}">
-              <a14:hiddenLine xmlns:a14="http://schemas.microsoft.com/office/drawing/2010/main" w="9525">
+              <a14:hiddenLine xmlns:a14="http://schemas.microsoft.com/office/drawing/2010/main" xmlns="" w="9525">
                 <a:solidFill>
                   <a:schemeClr val="tx1"/>
                 </a:solidFill>
@@ -7499,7 +7283,7 @@
               </a14:hiddenLine>
             </a:ext>
             <a:ext uri="{AF507438-7753-43E0-B8FC-AC1667EBCBE1}">
-              <a14:hiddenEffects xmlns:a14="http://schemas.microsoft.com/office/drawing/2010/main">
+              <a14:hiddenEffects xmlns:a14="http://schemas.microsoft.com/office/drawing/2010/main" xmlns="">
                 <a:effectLst>
                   <a:outerShdw dist="35921" dir="2700000" algn="ctr" rotWithShape="0">
                     <a:schemeClr val="bg2"/>
@@ -7535,7 +7319,7 @@
               <a:tabLst/>
             </a:pPr>
             <a:r>
-              <a:rPr kumimoji="0" lang="es-MX" altLang="es-MX" sz="900" b="0" i="1" u="none" strike="noStrike" cap="none" normalizeH="0" baseline="0" dirty="0">
+              <a:rPr kumimoji="0" lang="es-MX" altLang="es-MX" sz="1100" b="1" i="1" u="none" strike="noStrike" cap="none" normalizeH="0" baseline="0" dirty="0">
                 <a:ln>
                   <a:noFill/>
                 </a:ln>
@@ -7549,7 +7333,7 @@
               </a:rPr>
               <a:t>Figura 5</a:t>
             </a:r>
-            <a:endParaRPr kumimoji="0" lang="es-MX" altLang="es-MX" sz="1100" b="0" i="0" u="none" strike="noStrike" cap="none" normalizeH="0" baseline="0" dirty="0">
+            <a:endParaRPr kumimoji="0" lang="es-MX" altLang="es-MX" sz="1600" b="1" i="0" u="none" strike="noStrike" cap="none" normalizeH="0" baseline="0" dirty="0">
               <a:ln>
                 <a:noFill/>
               </a:ln>
@@ -7577,209 +7361,29 @@
               <a:tabLst/>
             </a:pPr>
             <a:r>
-              <a:rPr kumimoji="0" lang="es-MX" altLang="es-MX" sz="1400" b="0" i="0" u="none" strike="noStrike" cap="none" normalizeH="0" baseline="0" dirty="0">
-                <a:ln>
-                  <a:noFill/>
-                </a:ln>
-                <a:solidFill>
-                  <a:schemeClr val="tx1"/>
-                </a:solidFill>
-                <a:effectLst/>
-                <a:latin typeface="Arial" panose="020B0604020202020204" pitchFamily="34" charset="0"/>
+              <a:rPr lang="es-MX" altLang="es-MX" sz="2000" dirty="0">
+                <a:latin typeface="Arial Narrow" panose="020B0606020202030204" pitchFamily="34" charset="0"/>
                 <a:ea typeface="Calibri" panose="020F0502020204030204" pitchFamily="34" charset="0"/>
                 <a:cs typeface="Arial" panose="020B0604020202020204" pitchFamily="34" charset="0"/>
               </a:rPr>
               <a:t>La siguiente fue </a:t>
             </a:r>
             <a:r>
-              <a:rPr kumimoji="0" lang="es-MX" altLang="es-MX" sz="1400" b="0" i="0" u="none" strike="noStrike" cap="none" normalizeH="0" baseline="0" dirty="0" err="1">
-                <a:ln>
-                  <a:noFill/>
-                </a:ln>
-                <a:solidFill>
-                  <a:schemeClr val="tx1"/>
-                </a:solidFill>
-                <a:effectLst/>
-                <a:latin typeface="Arial" panose="020B0604020202020204" pitchFamily="34" charset="0"/>
+              <a:rPr lang="es-MX" altLang="es-MX" sz="2000" dirty="0" err="1">
+                <a:latin typeface="Arial Narrow" panose="020B0606020202030204" pitchFamily="34" charset="0"/>
                 <a:ea typeface="Calibri" panose="020F0502020204030204" pitchFamily="34" charset="0"/>
                 <a:cs typeface="Arial" panose="020B0604020202020204" pitchFamily="34" charset="0"/>
               </a:rPr>
               <a:t>Slti</a:t>
             </a:r>
             <a:r>
-              <a:rPr kumimoji="0" lang="es-MX" altLang="es-MX" sz="1400" b="0" i="0" u="none" strike="noStrike" cap="none" normalizeH="0" baseline="0" dirty="0">
-                <a:ln>
-                  <a:noFill/>
-                </a:ln>
-                <a:solidFill>
-                  <a:schemeClr val="tx1"/>
-                </a:solidFill>
-                <a:effectLst/>
-                <a:latin typeface="Arial" panose="020B0604020202020204" pitchFamily="34" charset="0"/>
+              <a:rPr lang="es-MX" altLang="es-MX" sz="2000" dirty="0">
+                <a:latin typeface="Arial Narrow" panose="020B0606020202030204" pitchFamily="34" charset="0"/>
                 <a:ea typeface="Calibri" panose="020F0502020204030204" pitchFamily="34" charset="0"/>
                 <a:cs typeface="Arial" panose="020B0604020202020204" pitchFamily="34" charset="0"/>
               </a:rPr>
-              <a:t>, en la figura 5 podemos ver que el resultado de la operaci</a:t>
-            </a:r>
-            <a:r>
-              <a:rPr kumimoji="0" lang="es-MX" altLang="es-MX" sz="1400" b="0" i="0" u="none" strike="noStrike" cap="none" normalizeH="0" baseline="0" dirty="0">
-                <a:ln>
-                  <a:noFill/>
-                </a:ln>
-                <a:solidFill>
-                  <a:schemeClr val="tx1"/>
-                </a:solidFill>
-                <a:effectLst/>
-                <a:latin typeface="Calibri" panose="020F0502020204030204" pitchFamily="34" charset="0"/>
-                <a:ea typeface="Calibri" panose="020F0502020204030204" pitchFamily="34" charset="0"/>
-                <a:cs typeface="Arial" panose="020B0604020202020204" pitchFamily="34" charset="0"/>
-              </a:rPr>
-              <a:t>ó</a:t>
-            </a:r>
-            <a:r>
-              <a:rPr kumimoji="0" lang="es-MX" altLang="es-MX" sz="1400" b="0" i="0" u="none" strike="noStrike" cap="none" normalizeH="0" baseline="0" dirty="0">
-                <a:ln>
-                  <a:noFill/>
-                </a:ln>
-                <a:solidFill>
-                  <a:schemeClr val="tx1"/>
-                </a:solidFill>
-                <a:effectLst/>
-                <a:latin typeface="Arial" panose="020B0604020202020204" pitchFamily="34" charset="0"/>
-                <a:ea typeface="Calibri" panose="020F0502020204030204" pitchFamily="34" charset="0"/>
-                <a:cs typeface="Arial" panose="020B0604020202020204" pitchFamily="34" charset="0"/>
-              </a:rPr>
-              <a:t>n se almacena en la direcci</a:t>
-            </a:r>
-            <a:r>
-              <a:rPr kumimoji="0" lang="es-MX" altLang="es-MX" sz="1400" b="0" i="0" u="none" strike="noStrike" cap="none" normalizeH="0" baseline="0" dirty="0">
-                <a:ln>
-                  <a:noFill/>
-                </a:ln>
-                <a:solidFill>
-                  <a:schemeClr val="tx1"/>
-                </a:solidFill>
-                <a:effectLst/>
-                <a:latin typeface="Calibri" panose="020F0502020204030204" pitchFamily="34" charset="0"/>
-                <a:ea typeface="Calibri" panose="020F0502020204030204" pitchFamily="34" charset="0"/>
-                <a:cs typeface="Arial" panose="020B0604020202020204" pitchFamily="34" charset="0"/>
-              </a:rPr>
-              <a:t>ó</a:t>
-            </a:r>
-            <a:r>
-              <a:rPr kumimoji="0" lang="es-MX" altLang="es-MX" sz="1400" b="0" i="0" u="none" strike="noStrike" cap="none" normalizeH="0" baseline="0" dirty="0">
-                <a:ln>
-                  <a:noFill/>
-                </a:ln>
-                <a:solidFill>
-                  <a:schemeClr val="tx1"/>
-                </a:solidFill>
-                <a:effectLst/>
-                <a:latin typeface="Arial" panose="020B0604020202020204" pitchFamily="34" charset="0"/>
-                <a:ea typeface="Calibri" panose="020F0502020204030204" pitchFamily="34" charset="0"/>
-                <a:cs typeface="Arial" panose="020B0604020202020204" pitchFamily="34" charset="0"/>
-              </a:rPr>
-              <a:t>n 17, el c</a:t>
-            </a:r>
-            <a:r>
-              <a:rPr kumimoji="0" lang="es-MX" altLang="es-MX" sz="1400" b="0" i="0" u="none" strike="noStrike" cap="none" normalizeH="0" baseline="0" dirty="0">
-                <a:ln>
-                  <a:noFill/>
-                </a:ln>
-                <a:solidFill>
-                  <a:schemeClr val="tx1"/>
-                </a:solidFill>
-                <a:effectLst/>
-                <a:latin typeface="Calibri" panose="020F0502020204030204" pitchFamily="34" charset="0"/>
-                <a:ea typeface="Calibri" panose="020F0502020204030204" pitchFamily="34" charset="0"/>
-                <a:cs typeface="Arial" panose="020B0604020202020204" pitchFamily="34" charset="0"/>
-              </a:rPr>
-              <a:t>ó</a:t>
-            </a:r>
-            <a:r>
-              <a:rPr kumimoji="0" lang="es-MX" altLang="es-MX" sz="1400" b="0" i="0" u="none" strike="noStrike" cap="none" normalizeH="0" baseline="0" dirty="0">
-                <a:ln>
-                  <a:noFill/>
-                </a:ln>
-                <a:solidFill>
-                  <a:schemeClr val="tx1"/>
-                </a:solidFill>
-                <a:effectLst/>
-                <a:latin typeface="Arial" panose="020B0604020202020204" pitchFamily="34" charset="0"/>
-                <a:ea typeface="Calibri" panose="020F0502020204030204" pitchFamily="34" charset="0"/>
-                <a:cs typeface="Arial" panose="020B0604020202020204" pitchFamily="34" charset="0"/>
-              </a:rPr>
-              <a:t>digo es el siguiente: 001010 (para la operaci</a:t>
-            </a:r>
-            <a:r>
-              <a:rPr kumimoji="0" lang="es-MX" altLang="es-MX" sz="1400" b="0" i="0" u="none" strike="noStrike" cap="none" normalizeH="0" baseline="0" dirty="0">
-                <a:ln>
-                  <a:noFill/>
-                </a:ln>
-                <a:solidFill>
-                  <a:schemeClr val="tx1"/>
-                </a:solidFill>
-                <a:effectLst/>
-                <a:latin typeface="Calibri" panose="020F0502020204030204" pitchFamily="34" charset="0"/>
-                <a:ea typeface="Calibri" panose="020F0502020204030204" pitchFamily="34" charset="0"/>
-                <a:cs typeface="Arial" panose="020B0604020202020204" pitchFamily="34" charset="0"/>
-              </a:rPr>
-              <a:t>ó</a:t>
-            </a:r>
-            <a:r>
-              <a:rPr kumimoji="0" lang="es-MX" altLang="es-MX" sz="1400" b="0" i="0" u="none" strike="noStrike" cap="none" normalizeH="0" baseline="0" dirty="0">
-                <a:ln>
-                  <a:noFill/>
-                </a:ln>
-                <a:solidFill>
-                  <a:schemeClr val="tx1"/>
-                </a:solidFill>
-                <a:effectLst/>
-                <a:latin typeface="Arial" panose="020B0604020202020204" pitchFamily="34" charset="0"/>
-                <a:ea typeface="Calibri" panose="020F0502020204030204" pitchFamily="34" charset="0"/>
-                <a:cs typeface="Arial" panose="020B0604020202020204" pitchFamily="34" charset="0"/>
-              </a:rPr>
-              <a:t>n), 00101 (para operando 1), 10001 (direcci</a:t>
-            </a:r>
-            <a:r>
-              <a:rPr kumimoji="0" lang="es-MX" altLang="es-MX" sz="1400" b="0" i="0" u="none" strike="noStrike" cap="none" normalizeH="0" baseline="0" dirty="0">
-                <a:ln>
-                  <a:noFill/>
-                </a:ln>
-                <a:solidFill>
-                  <a:schemeClr val="tx1"/>
-                </a:solidFill>
-                <a:effectLst/>
-                <a:latin typeface="Calibri" panose="020F0502020204030204" pitchFamily="34" charset="0"/>
-                <a:ea typeface="Calibri" panose="020F0502020204030204" pitchFamily="34" charset="0"/>
-                <a:cs typeface="Arial" panose="020B0604020202020204" pitchFamily="34" charset="0"/>
-              </a:rPr>
-              <a:t>ó</a:t>
-            </a:r>
-            <a:r>
-              <a:rPr kumimoji="0" lang="es-MX" altLang="es-MX" sz="1400" b="0" i="0" u="none" strike="noStrike" cap="none" normalizeH="0" baseline="0" dirty="0">
-                <a:ln>
-                  <a:noFill/>
-                </a:ln>
-                <a:solidFill>
-                  <a:schemeClr val="tx1"/>
-                </a:solidFill>
-                <a:effectLst/>
-                <a:latin typeface="Arial" panose="020B0604020202020204" pitchFamily="34" charset="0"/>
-                <a:ea typeface="Calibri" panose="020F0502020204030204" pitchFamily="34" charset="0"/>
-                <a:cs typeface="Arial" panose="020B0604020202020204" pitchFamily="34" charset="0"/>
-              </a:rPr>
-              <a:t>n destino) y 0011100111100000 como valor inmediato, al ser menor el operando 1 que el valor inmediato, se almacena un 1.</a:t>
-            </a:r>
-            <a:endParaRPr kumimoji="0" lang="es-MX" altLang="es-MX" sz="1200" b="0" i="0" u="none" strike="noStrike" cap="none" normalizeH="0" baseline="0" dirty="0">
-              <a:ln>
-                <a:noFill/>
-              </a:ln>
-              <a:solidFill>
-                <a:schemeClr val="tx1"/>
-              </a:solidFill>
-              <a:effectLst/>
-            </a:endParaRPr>
+              <a:t>, en la figura 5 podemos ver que el resultado de la operación se almacena en la dirección 17, el código es el siguiente: 001010 (para la operación), 00101 (para operando 1), 10001 (dirección destino) y 0011100111100000 como valor inmediato, al ser menor el operando 1 que el valor inmediato, se almacena un 1.</a:t>
+            </a:r>
           </a:p>
           <a:p>
             <a:pPr marL="0" marR="0" lvl="0" indent="0" algn="l" defTabSz="914400" rtl="0" eaLnBrk="0" fontAlgn="base" latinLnBrk="0" hangingPunct="0">
@@ -7816,7 +7420,7 @@
           <p:cNvPr id="6" name="Rectangle 6">
             <a:extLst>
               <a:ext uri="{FF2B5EF4-FFF2-40B4-BE49-F238E27FC236}">
-                <a16:creationId xmlns:a16="http://schemas.microsoft.com/office/drawing/2014/main" id="{DE2CD96D-46CA-4BAB-BF98-CCF261DE8941}"/>
+                <a16:creationId xmlns:a16="http://schemas.microsoft.com/office/drawing/2014/main" xmlns="" id="{DE2CD96D-46CA-4BAB-BF98-CCF261DE8941}"/>
               </a:ext>
             </a:extLst>
           </p:cNvPr>
@@ -7827,8 +7431,8 @@
         </p:nvSpPr>
         <p:spPr bwMode="auto">
           <a:xfrm>
-            <a:off x="368489" y="3394677"/>
-            <a:ext cx="10929938" cy="938719"/>
+            <a:off x="368489" y="3491659"/>
+            <a:ext cx="10929938" cy="1431161"/>
           </a:xfrm>
           <a:prstGeom prst="rect">
             <a:avLst/>
@@ -7840,14 +7444,14 @@
           <a:effectLst/>
           <a:extLst>
             <a:ext uri="{909E8E84-426E-40DD-AFC4-6F175D3DCCD1}">
-              <a14:hiddenFill xmlns:a14="http://schemas.microsoft.com/office/drawing/2010/main">
+              <a14:hiddenFill xmlns:a14="http://schemas.microsoft.com/office/drawing/2010/main" xmlns="">
                 <a:solidFill>
                   <a:schemeClr val="accent1"/>
                 </a:solidFill>
               </a14:hiddenFill>
             </a:ext>
             <a:ext uri="{91240B29-F687-4F45-9708-019B960494DF}">
-              <a14:hiddenLine xmlns:a14="http://schemas.microsoft.com/office/drawing/2010/main" w="9525">
+              <a14:hiddenLine xmlns:a14="http://schemas.microsoft.com/office/drawing/2010/main" xmlns="" w="9525">
                 <a:solidFill>
                   <a:schemeClr val="tx1"/>
                 </a:solidFill>
@@ -7857,7 +7461,7 @@
               </a14:hiddenLine>
             </a:ext>
             <a:ext uri="{AF507438-7753-43E0-B8FC-AC1667EBCBE1}">
-              <a14:hiddenEffects xmlns:a14="http://schemas.microsoft.com/office/drawing/2010/main">
+              <a14:hiddenEffects xmlns:a14="http://schemas.microsoft.com/office/drawing/2010/main" xmlns="">
                 <a:effectLst>
                   <a:outerShdw dist="35921" dir="2700000" algn="ctr" rotWithShape="0">
                     <a:schemeClr val="bg2"/>
@@ -7935,179 +7539,29 @@
               <a:tabLst/>
             </a:pPr>
             <a:r>
-              <a:rPr kumimoji="0" lang="es-MX" altLang="es-MX" sz="1400" b="0" i="0" u="none" strike="noStrike" cap="none" normalizeH="0" baseline="0" dirty="0">
-                <a:ln>
-                  <a:noFill/>
-                </a:ln>
-                <a:solidFill>
-                  <a:schemeClr val="tx1"/>
-                </a:solidFill>
-                <a:effectLst/>
-                <a:latin typeface="Arial" panose="020B0604020202020204" pitchFamily="34" charset="0"/>
+              <a:rPr lang="es-MX" altLang="es-MX" sz="2000" dirty="0">
+                <a:latin typeface="Arial Narrow" panose="020B0606020202030204" pitchFamily="34" charset="0"/>
                 <a:ea typeface="Calibri" panose="020F0502020204030204" pitchFamily="34" charset="0"/>
                 <a:cs typeface="Arial" panose="020B0604020202020204" pitchFamily="34" charset="0"/>
               </a:rPr>
-              <a:t>La pr</a:t>
-            </a:r>
-            <a:r>
-              <a:rPr kumimoji="0" lang="es-MX" altLang="es-MX" sz="1400" b="0" i="0" u="none" strike="noStrike" cap="none" normalizeH="0" baseline="0" dirty="0">
-                <a:ln>
-                  <a:noFill/>
-                </a:ln>
-                <a:solidFill>
-                  <a:schemeClr val="tx1"/>
-                </a:solidFill>
-                <a:effectLst/>
-                <a:latin typeface="Calibri" panose="020F0502020204030204" pitchFamily="34" charset="0"/>
-                <a:ea typeface="Calibri" panose="020F0502020204030204" pitchFamily="34" charset="0"/>
-                <a:cs typeface="Arial" panose="020B0604020202020204" pitchFamily="34" charset="0"/>
-              </a:rPr>
-              <a:t>ó</a:t>
-            </a:r>
-            <a:r>
-              <a:rPr kumimoji="0" lang="es-MX" altLang="es-MX" sz="1400" b="0" i="0" u="none" strike="noStrike" cap="none" normalizeH="0" baseline="0" dirty="0">
-                <a:ln>
-                  <a:noFill/>
-                </a:ln>
-                <a:solidFill>
-                  <a:schemeClr val="tx1"/>
-                </a:solidFill>
-                <a:effectLst/>
-                <a:latin typeface="Arial" panose="020B0604020202020204" pitchFamily="34" charset="0"/>
-                <a:ea typeface="Calibri" panose="020F0502020204030204" pitchFamily="34" charset="0"/>
-                <a:cs typeface="Arial" panose="020B0604020202020204" pitchFamily="34" charset="0"/>
-              </a:rPr>
-              <a:t>xima operaci</a:t>
-            </a:r>
-            <a:r>
-              <a:rPr kumimoji="0" lang="es-MX" altLang="es-MX" sz="1400" b="0" i="0" u="none" strike="noStrike" cap="none" normalizeH="0" baseline="0" dirty="0">
-                <a:ln>
-                  <a:noFill/>
-                </a:ln>
-                <a:solidFill>
-                  <a:schemeClr val="tx1"/>
-                </a:solidFill>
-                <a:effectLst/>
-                <a:latin typeface="Calibri" panose="020F0502020204030204" pitchFamily="34" charset="0"/>
-                <a:ea typeface="Calibri" panose="020F0502020204030204" pitchFamily="34" charset="0"/>
-                <a:cs typeface="Arial" panose="020B0604020202020204" pitchFamily="34" charset="0"/>
-              </a:rPr>
-              <a:t>ó</a:t>
-            </a:r>
-            <a:r>
-              <a:rPr kumimoji="0" lang="es-MX" altLang="es-MX" sz="1400" b="0" i="0" u="none" strike="noStrike" cap="none" normalizeH="0" baseline="0" dirty="0">
-                <a:ln>
-                  <a:noFill/>
-                </a:ln>
-                <a:solidFill>
-                  <a:schemeClr val="tx1"/>
-                </a:solidFill>
-                <a:effectLst/>
-                <a:latin typeface="Arial" panose="020B0604020202020204" pitchFamily="34" charset="0"/>
-                <a:ea typeface="Calibri" panose="020F0502020204030204" pitchFamily="34" charset="0"/>
-                <a:cs typeface="Arial" panose="020B0604020202020204" pitchFamily="34" charset="0"/>
-              </a:rPr>
-              <a:t>n es </a:t>
-            </a:r>
-            <a:r>
-              <a:rPr kumimoji="0" lang="es-MX" altLang="es-MX" sz="1400" b="0" i="0" u="none" strike="noStrike" cap="none" normalizeH="0" baseline="0" dirty="0" err="1">
-                <a:ln>
-                  <a:noFill/>
-                </a:ln>
-                <a:solidFill>
-                  <a:schemeClr val="tx1"/>
-                </a:solidFill>
-                <a:effectLst/>
-                <a:latin typeface="Arial" panose="020B0604020202020204" pitchFamily="34" charset="0"/>
+              <a:t>La próxima operación es </a:t>
+            </a:r>
+            <a:r>
+              <a:rPr lang="es-MX" altLang="es-MX" sz="2000" dirty="0" err="1">
+                <a:latin typeface="Arial Narrow" panose="020B0606020202030204" pitchFamily="34" charset="0"/>
                 <a:ea typeface="Calibri" panose="020F0502020204030204" pitchFamily="34" charset="0"/>
                 <a:cs typeface="Arial" panose="020B0604020202020204" pitchFamily="34" charset="0"/>
               </a:rPr>
               <a:t>andi</a:t>
             </a:r>
             <a:r>
-              <a:rPr kumimoji="0" lang="es-MX" altLang="es-MX" sz="1400" b="0" i="0" u="none" strike="noStrike" cap="none" normalizeH="0" baseline="0" dirty="0">
-                <a:ln>
-                  <a:noFill/>
-                </a:ln>
-                <a:solidFill>
-                  <a:schemeClr val="tx1"/>
-                </a:solidFill>
-                <a:effectLst/>
-                <a:latin typeface="Arial" panose="020B0604020202020204" pitchFamily="34" charset="0"/>
+              <a:rPr lang="es-MX" altLang="es-MX" sz="2000" dirty="0">
+                <a:latin typeface="Arial Narrow" panose="020B0606020202030204" pitchFamily="34" charset="0"/>
                 <a:ea typeface="Calibri" panose="020F0502020204030204" pitchFamily="34" charset="0"/>
                 <a:cs typeface="Arial" panose="020B0604020202020204" pitchFamily="34" charset="0"/>
               </a:rPr>
-              <a:t>, el resultado se va a almacenar en la direcci</a:t>
-            </a:r>
-            <a:r>
-              <a:rPr kumimoji="0" lang="es-MX" altLang="es-MX" sz="1400" b="0" i="0" u="none" strike="noStrike" cap="none" normalizeH="0" baseline="0" dirty="0">
-                <a:ln>
-                  <a:noFill/>
-                </a:ln>
-                <a:solidFill>
-                  <a:schemeClr val="tx1"/>
-                </a:solidFill>
-                <a:effectLst/>
-                <a:latin typeface="Calibri" panose="020F0502020204030204" pitchFamily="34" charset="0"/>
-                <a:ea typeface="Calibri" panose="020F0502020204030204" pitchFamily="34" charset="0"/>
-                <a:cs typeface="Arial" panose="020B0604020202020204" pitchFamily="34" charset="0"/>
-              </a:rPr>
-              <a:t>ó</a:t>
-            </a:r>
-            <a:r>
-              <a:rPr kumimoji="0" lang="es-MX" altLang="es-MX" sz="1400" b="0" i="0" u="none" strike="noStrike" cap="none" normalizeH="0" baseline="0" dirty="0">
-                <a:ln>
-                  <a:noFill/>
-                </a:ln>
-                <a:solidFill>
-                  <a:schemeClr val="tx1"/>
-                </a:solidFill>
-                <a:effectLst/>
-                <a:latin typeface="Arial" panose="020B0604020202020204" pitchFamily="34" charset="0"/>
-                <a:ea typeface="Calibri" panose="020F0502020204030204" pitchFamily="34" charset="0"/>
-                <a:cs typeface="Arial" panose="020B0604020202020204" pitchFamily="34" charset="0"/>
-              </a:rPr>
-              <a:t>n 18, como lo podemos ver en la figura 6, los datos que se van a operar son el de la direcci</a:t>
-            </a:r>
-            <a:r>
-              <a:rPr kumimoji="0" lang="es-MX" altLang="es-MX" sz="1400" b="0" i="0" u="none" strike="noStrike" cap="none" normalizeH="0" baseline="0" dirty="0">
-                <a:ln>
-                  <a:noFill/>
-                </a:ln>
-                <a:solidFill>
-                  <a:schemeClr val="tx1"/>
-                </a:solidFill>
-                <a:effectLst/>
-                <a:latin typeface="Calibri" panose="020F0502020204030204" pitchFamily="34" charset="0"/>
-                <a:ea typeface="Calibri" panose="020F0502020204030204" pitchFamily="34" charset="0"/>
-                <a:cs typeface="Arial" panose="020B0604020202020204" pitchFamily="34" charset="0"/>
-              </a:rPr>
-              <a:t>ó</a:t>
-            </a:r>
-            <a:r>
-              <a:rPr kumimoji="0" lang="es-MX" altLang="es-MX" sz="1400" b="0" i="0" u="none" strike="noStrike" cap="none" normalizeH="0" baseline="0" dirty="0">
-                <a:ln>
-                  <a:noFill/>
-                </a:ln>
-                <a:solidFill>
-                  <a:schemeClr val="tx1"/>
-                </a:solidFill>
-                <a:effectLst/>
-                <a:latin typeface="Arial" panose="020B0604020202020204" pitchFamily="34" charset="0"/>
-                <a:ea typeface="Calibri" panose="020F0502020204030204" pitchFamily="34" charset="0"/>
-                <a:cs typeface="Arial" panose="020B0604020202020204" pitchFamily="34" charset="0"/>
-              </a:rPr>
-              <a:t>n 9 (00000000000000000000000011111110) y el valor inmediato 0110110011110001.</a:t>
-            </a:r>
-            <a:endParaRPr kumimoji="0" lang="es-MX" altLang="es-MX" sz="1200" b="0" i="0" u="none" strike="noStrike" cap="none" normalizeH="0" baseline="0" dirty="0">
-              <a:ln>
-                <a:noFill/>
-              </a:ln>
-              <a:solidFill>
-                <a:schemeClr val="tx1"/>
-              </a:solidFill>
-              <a:effectLst/>
-            </a:endParaRPr>
+              <a:t>, el resultado se va a almacenar en la dirección 18, como lo podemos ver en la figura 6, los datos que se van a operar son el de la dirección 9 (00000000000000000000000011111110) y el valor inmediato 0110110011110001.</a:t>
+            </a:r>
           </a:p>
           <a:p>
             <a:pPr marL="0" marR="0" lvl="0" indent="0" algn="l" defTabSz="914400" rtl="0" eaLnBrk="0" fontAlgn="base" latinLnBrk="0" hangingPunct="0">
@@ -8144,7 +7598,7 @@
           <p:cNvPr id="7" name="Rectangle 7">
             <a:extLst>
               <a:ext uri="{FF2B5EF4-FFF2-40B4-BE49-F238E27FC236}">
-                <a16:creationId xmlns:a16="http://schemas.microsoft.com/office/drawing/2014/main" id="{51E65EBA-8808-4B12-9CDD-D11BF4616039}"/>
+                <a16:creationId xmlns:a16="http://schemas.microsoft.com/office/drawing/2014/main" xmlns="" id="{51E65EBA-8808-4B12-9CDD-D11BF4616039}"/>
               </a:ext>
             </a:extLst>
           </p:cNvPr>
@@ -8155,8 +7609,8 @@
         </p:nvSpPr>
         <p:spPr bwMode="auto">
           <a:xfrm>
-            <a:off x="368487" y="5218188"/>
-            <a:ext cx="10415588" cy="877163"/>
+            <a:off x="368487" y="5703838"/>
+            <a:ext cx="10415588" cy="1154162"/>
           </a:xfrm>
           <a:prstGeom prst="rect">
             <a:avLst/>
@@ -8168,14 +7622,14 @@
           <a:effectLst/>
           <a:extLst>
             <a:ext uri="{909E8E84-426E-40DD-AFC4-6F175D3DCCD1}">
-              <a14:hiddenFill xmlns:a14="http://schemas.microsoft.com/office/drawing/2010/main">
+              <a14:hiddenFill xmlns:a14="http://schemas.microsoft.com/office/drawing/2010/main" xmlns="">
                 <a:solidFill>
                   <a:schemeClr val="accent1"/>
                 </a:solidFill>
               </a14:hiddenFill>
             </a:ext>
             <a:ext uri="{91240B29-F687-4F45-9708-019B960494DF}">
-              <a14:hiddenLine xmlns:a14="http://schemas.microsoft.com/office/drawing/2010/main" w="9525">
+              <a14:hiddenLine xmlns:a14="http://schemas.microsoft.com/office/drawing/2010/main" xmlns="" w="9525">
                 <a:solidFill>
                   <a:schemeClr val="tx1"/>
                 </a:solidFill>
@@ -8185,7 +7639,7 @@
               </a14:hiddenLine>
             </a:ext>
             <a:ext uri="{AF507438-7753-43E0-B8FC-AC1667EBCBE1}">
-              <a14:hiddenEffects xmlns:a14="http://schemas.microsoft.com/office/drawing/2010/main">
+              <a14:hiddenEffects xmlns:a14="http://schemas.microsoft.com/office/drawing/2010/main" xmlns="">
                 <a:effectLst>
                   <a:outerShdw dist="35921" dir="2700000" algn="ctr" rotWithShape="0">
                     <a:schemeClr val="bg2"/>
@@ -8263,157 +7717,20 @@
               <a:tabLst/>
             </a:pPr>
             <a:r>
-              <a:rPr kumimoji="0" lang="es-MX" altLang="es-MX" sz="1400" b="0" i="0" u="none" strike="noStrike" cap="none" normalizeH="0" baseline="0" dirty="0">
-                <a:ln>
-                  <a:noFill/>
-                </a:ln>
-                <a:solidFill>
-                  <a:schemeClr val="tx1"/>
-                </a:solidFill>
-                <a:effectLst/>
-                <a:latin typeface="Arial" panose="020B0604020202020204" pitchFamily="34" charset="0"/>
+              <a:rPr lang="es-MX" altLang="es-MX" sz="2000" dirty="0">
+                <a:latin typeface="Arial Narrow" panose="020B0606020202030204" pitchFamily="34" charset="0"/>
                 <a:ea typeface="Calibri" panose="020F0502020204030204" pitchFamily="34" charset="0"/>
                 <a:cs typeface="Arial" panose="020B0604020202020204" pitchFamily="34" charset="0"/>
               </a:rPr>
-              <a:t>La pr</a:t>
-            </a:r>
-            <a:r>
-              <a:rPr kumimoji="0" lang="es-MX" altLang="es-MX" sz="1400" b="0" i="0" u="none" strike="noStrike" cap="none" normalizeH="0" baseline="0" dirty="0">
-                <a:ln>
-                  <a:noFill/>
-                </a:ln>
-                <a:solidFill>
-                  <a:schemeClr val="tx1"/>
-                </a:solidFill>
-                <a:effectLst/>
-                <a:latin typeface="Calibri" panose="020F0502020204030204" pitchFamily="34" charset="0"/>
-                <a:ea typeface="Calibri" panose="020F0502020204030204" pitchFamily="34" charset="0"/>
-                <a:cs typeface="Arial" panose="020B0604020202020204" pitchFamily="34" charset="0"/>
-              </a:rPr>
-              <a:t>ó</a:t>
-            </a:r>
-            <a:r>
-              <a:rPr kumimoji="0" lang="es-MX" altLang="es-MX" sz="1400" b="0" i="0" u="none" strike="noStrike" cap="none" normalizeH="0" baseline="0" dirty="0">
-                <a:ln>
-                  <a:noFill/>
-                </a:ln>
-                <a:solidFill>
-                  <a:schemeClr val="tx1"/>
-                </a:solidFill>
-                <a:effectLst/>
-                <a:latin typeface="Arial" panose="020B0604020202020204" pitchFamily="34" charset="0"/>
-                <a:ea typeface="Calibri" panose="020F0502020204030204" pitchFamily="34" charset="0"/>
-                <a:cs typeface="Arial" panose="020B0604020202020204" pitchFamily="34" charset="0"/>
-              </a:rPr>
-              <a:t>xima instrucci</a:t>
-            </a:r>
-            <a:r>
-              <a:rPr kumimoji="0" lang="es-MX" altLang="es-MX" sz="1400" b="0" i="0" u="none" strike="noStrike" cap="none" normalizeH="0" baseline="0" dirty="0">
-                <a:ln>
-                  <a:noFill/>
-                </a:ln>
-                <a:solidFill>
-                  <a:schemeClr val="tx1"/>
-                </a:solidFill>
-                <a:effectLst/>
-                <a:latin typeface="Calibri" panose="020F0502020204030204" pitchFamily="34" charset="0"/>
-                <a:ea typeface="Calibri" panose="020F0502020204030204" pitchFamily="34" charset="0"/>
-                <a:cs typeface="Arial" panose="020B0604020202020204" pitchFamily="34" charset="0"/>
-              </a:rPr>
-              <a:t>ó</a:t>
-            </a:r>
-            <a:r>
-              <a:rPr kumimoji="0" lang="es-MX" altLang="es-MX" sz="1400" b="0" i="0" u="none" strike="noStrike" cap="none" normalizeH="0" baseline="0" dirty="0">
-                <a:ln>
-                  <a:noFill/>
-                </a:ln>
-                <a:solidFill>
-                  <a:schemeClr val="tx1"/>
-                </a:solidFill>
-                <a:effectLst/>
-                <a:latin typeface="Arial" panose="020B0604020202020204" pitchFamily="34" charset="0"/>
-                <a:ea typeface="Calibri" panose="020F0502020204030204" pitchFamily="34" charset="0"/>
-                <a:cs typeface="Arial" panose="020B0604020202020204" pitchFamily="34" charset="0"/>
-              </a:rPr>
-              <a:t>n es ori, el resultado se almacena en la direcci</a:t>
-            </a:r>
-            <a:r>
-              <a:rPr kumimoji="0" lang="es-MX" altLang="es-MX" sz="1400" b="0" i="0" u="none" strike="noStrike" cap="none" normalizeH="0" baseline="0" dirty="0">
-                <a:ln>
-                  <a:noFill/>
-                </a:ln>
-                <a:solidFill>
-                  <a:schemeClr val="tx1"/>
-                </a:solidFill>
-                <a:effectLst/>
-                <a:latin typeface="Calibri" panose="020F0502020204030204" pitchFamily="34" charset="0"/>
-                <a:ea typeface="Calibri" panose="020F0502020204030204" pitchFamily="34" charset="0"/>
-                <a:cs typeface="Arial" panose="020B0604020202020204" pitchFamily="34" charset="0"/>
-              </a:rPr>
-              <a:t>ó</a:t>
-            </a:r>
-            <a:r>
-              <a:rPr kumimoji="0" lang="es-MX" altLang="es-MX" sz="1400" b="0" i="0" u="none" strike="noStrike" cap="none" normalizeH="0" baseline="0" dirty="0">
-                <a:ln>
-                  <a:noFill/>
-                </a:ln>
-                <a:solidFill>
-                  <a:schemeClr val="tx1"/>
-                </a:solidFill>
-                <a:effectLst/>
-                <a:latin typeface="Arial" panose="020B0604020202020204" pitchFamily="34" charset="0"/>
-                <a:ea typeface="Calibri" panose="020F0502020204030204" pitchFamily="34" charset="0"/>
-                <a:cs typeface="Arial" panose="020B0604020202020204" pitchFamily="34" charset="0"/>
-              </a:rPr>
-              <a:t>n 19 (ver figura 7), el operando 1 es el contenido de la direcci</a:t>
-            </a:r>
-            <a:r>
-              <a:rPr kumimoji="0" lang="es-MX" altLang="es-MX" sz="1400" b="0" i="0" u="none" strike="noStrike" cap="none" normalizeH="0" baseline="0" dirty="0">
-                <a:ln>
-                  <a:noFill/>
-                </a:ln>
-                <a:solidFill>
-                  <a:schemeClr val="tx1"/>
-                </a:solidFill>
-                <a:effectLst/>
-                <a:latin typeface="Calibri" panose="020F0502020204030204" pitchFamily="34" charset="0"/>
-                <a:ea typeface="Calibri" panose="020F0502020204030204" pitchFamily="34" charset="0"/>
-                <a:cs typeface="Arial" panose="020B0604020202020204" pitchFamily="34" charset="0"/>
-              </a:rPr>
-              <a:t>ó</a:t>
-            </a:r>
-            <a:r>
-              <a:rPr kumimoji="0" lang="es-MX" altLang="es-MX" sz="1400" b="0" i="0" u="none" strike="noStrike" cap="none" normalizeH="0" baseline="0" dirty="0">
-                <a:ln>
-                  <a:noFill/>
-                </a:ln>
-                <a:solidFill>
-                  <a:schemeClr val="tx1"/>
-                </a:solidFill>
-                <a:effectLst/>
-                <a:latin typeface="Arial" panose="020B0604020202020204" pitchFamily="34" charset="0"/>
-                <a:ea typeface="Calibri" panose="020F0502020204030204" pitchFamily="34" charset="0"/>
-                <a:cs typeface="Arial" panose="020B0604020202020204" pitchFamily="34" charset="0"/>
-              </a:rPr>
-              <a:t>n 15 del banco de registros (00000000000000000000000000101111) y el otro operando es el inmediato 0011100101010011.</a:t>
-            </a:r>
-            <a:endParaRPr kumimoji="0" lang="es-MX" altLang="es-MX" sz="2000" b="0" i="0" u="none" strike="noStrike" cap="none" normalizeH="0" baseline="0" dirty="0">
-              <a:ln>
-                <a:noFill/>
-              </a:ln>
-              <a:solidFill>
-                <a:schemeClr val="tx1"/>
-              </a:solidFill>
-              <a:effectLst/>
-              <a:latin typeface="Arial" panose="020B0604020202020204" pitchFamily="34" charset="0"/>
-            </a:endParaRPr>
+              <a:t>La próxima instrucción es ori, el resultado se almacena en la dirección 19 (ver figura 7), el operando 1 es el contenido de la dirección 15 del banco de registros (00000000000000000000000000101111) y el otro operando es el inmediato 0011100101010011.</a:t>
+            </a:r>
           </a:p>
         </p:txBody>
       </p:sp>
     </p:spTree>
     <p:extLst>
       <p:ext uri="{BB962C8B-B14F-4D97-AF65-F5344CB8AC3E}">
-        <p14:creationId xmlns:p14="http://schemas.microsoft.com/office/powerpoint/2010/main" val="2778459961"/>
+        <p14:creationId xmlns:p14="http://schemas.microsoft.com/office/powerpoint/2010/main" xmlns="" val="2778459961"/>
       </p:ext>
     </p:extLst>
   </p:cSld>
@@ -8445,7 +7762,7 @@
           <p:cNvPr id="4098" name="Imagen 34" descr="Interfaz de usuario gráfica, Aplicación&#10;&#10;Descripción generada automáticamente">
             <a:extLst>
               <a:ext uri="{FF2B5EF4-FFF2-40B4-BE49-F238E27FC236}">
-                <a16:creationId xmlns:a16="http://schemas.microsoft.com/office/drawing/2014/main" id="{A2EDD926-3238-4E17-901E-D49A6CC952C5}"/>
+                <a16:creationId xmlns:a16="http://schemas.microsoft.com/office/drawing/2014/main" xmlns="" id="{A2EDD926-3238-4E17-901E-D49A6CC952C5}"/>
               </a:ext>
             </a:extLst>
           </p:cNvPr>
@@ -8458,7 +7775,7 @@
           <a:blip r:embed="rId2">
             <a:extLst>
               <a:ext uri="{28A0092B-C50C-407E-A947-70E740481C1C}">
-                <a14:useLocalDpi xmlns:a14="http://schemas.microsoft.com/office/drawing/2010/main" val="0"/>
+                <a14:useLocalDpi xmlns:a14="http://schemas.microsoft.com/office/drawing/2010/main" xmlns="" val="0"/>
               </a:ext>
             </a:extLst>
           </a:blip>
@@ -8478,7 +7795,7 @@
           <a:noFill/>
           <a:extLst>
             <a:ext uri="{909E8E84-426E-40DD-AFC4-6F175D3DCCD1}">
-              <a14:hiddenFill xmlns:a14="http://schemas.microsoft.com/office/drawing/2010/main">
+              <a14:hiddenFill xmlns:a14="http://schemas.microsoft.com/office/drawing/2010/main" xmlns="">
                 <a:solidFill>
                   <a:srgbClr val="FFFFFF"/>
                 </a:solidFill>
@@ -8492,7 +7809,7 @@
           <p:cNvPr id="4097" name="Imagen 35" descr="Interfaz de usuario gráfica, Aplicación&#10;&#10;Descripción generada automáticamente">
             <a:extLst>
               <a:ext uri="{FF2B5EF4-FFF2-40B4-BE49-F238E27FC236}">
-                <a16:creationId xmlns:a16="http://schemas.microsoft.com/office/drawing/2014/main" id="{0C16770A-7C32-4A51-A8A9-7AC449DA5184}"/>
+                <a16:creationId xmlns:a16="http://schemas.microsoft.com/office/drawing/2014/main" xmlns="" id="{0C16770A-7C32-4A51-A8A9-7AC449DA5184}"/>
               </a:ext>
             </a:extLst>
           </p:cNvPr>
@@ -8505,7 +7822,7 @@
           <a:blip r:embed="rId3">
             <a:extLst>
               <a:ext uri="{28A0092B-C50C-407E-A947-70E740481C1C}">
-                <a14:useLocalDpi xmlns:a14="http://schemas.microsoft.com/office/drawing/2010/main" val="0"/>
+                <a14:useLocalDpi xmlns:a14="http://schemas.microsoft.com/office/drawing/2010/main" xmlns="" val="0"/>
               </a:ext>
             </a:extLst>
           </a:blip>
@@ -8516,7 +7833,7 @@
         </p:blipFill>
         <p:spPr bwMode="auto">
           <a:xfrm>
-            <a:off x="485775" y="1632383"/>
+            <a:off x="485775" y="1937183"/>
             <a:ext cx="5619750" cy="1000125"/>
           </a:xfrm>
           <a:prstGeom prst="rect">
@@ -8525,7 +7842,7 @@
           <a:noFill/>
           <a:extLst>
             <a:ext uri="{909E8E84-426E-40DD-AFC4-6F175D3DCCD1}">
-              <a14:hiddenFill xmlns:a14="http://schemas.microsoft.com/office/drawing/2010/main">
+              <a14:hiddenFill xmlns:a14="http://schemas.microsoft.com/office/drawing/2010/main" xmlns="">
                 <a:solidFill>
                   <a:srgbClr val="FFFFFF"/>
                 </a:solidFill>
@@ -8539,7 +7856,7 @@
           <p:cNvPr id="4" name="Rectangle 3">
             <a:extLst>
               <a:ext uri="{FF2B5EF4-FFF2-40B4-BE49-F238E27FC236}">
-                <a16:creationId xmlns:a16="http://schemas.microsoft.com/office/drawing/2014/main" id="{67C501BD-1B82-4186-ADAD-359E56EE90C3}"/>
+                <a16:creationId xmlns:a16="http://schemas.microsoft.com/office/drawing/2014/main" xmlns="" id="{67C501BD-1B82-4186-ADAD-359E56EE90C3}"/>
               </a:ext>
             </a:extLst>
           </p:cNvPr>
@@ -8563,14 +7880,14 @@
           <a:effectLst/>
           <a:extLst>
             <a:ext uri="{909E8E84-426E-40DD-AFC4-6F175D3DCCD1}">
-              <a14:hiddenFill xmlns:a14="http://schemas.microsoft.com/office/drawing/2010/main">
+              <a14:hiddenFill xmlns:a14="http://schemas.microsoft.com/office/drawing/2010/main" xmlns="">
                 <a:solidFill>
                   <a:schemeClr val="accent1"/>
                 </a:solidFill>
               </a14:hiddenFill>
             </a:ext>
             <a:ext uri="{91240B29-F687-4F45-9708-019B960494DF}">
-              <a14:hiddenLine xmlns:a14="http://schemas.microsoft.com/office/drawing/2010/main" w="9525">
+              <a14:hiddenLine xmlns:a14="http://schemas.microsoft.com/office/drawing/2010/main" xmlns="" w="9525">
                 <a:solidFill>
                   <a:schemeClr val="tx1"/>
                 </a:solidFill>
@@ -8580,7 +7897,7 @@
               </a14:hiddenLine>
             </a:ext>
             <a:ext uri="{AF507438-7753-43E0-B8FC-AC1667EBCBE1}">
-              <a14:hiddenEffects xmlns:a14="http://schemas.microsoft.com/office/drawing/2010/main">
+              <a14:hiddenEffects xmlns:a14="http://schemas.microsoft.com/office/drawing/2010/main" xmlns="">
                 <a:effectLst>
                   <a:outerShdw dist="35921" dir="2700000" algn="ctr" rotWithShape="0">
                     <a:schemeClr val="bg2"/>
@@ -8608,7 +7925,7 @@
           <p:cNvPr id="5" name="Rectangle 4">
             <a:extLst>
               <a:ext uri="{FF2B5EF4-FFF2-40B4-BE49-F238E27FC236}">
-                <a16:creationId xmlns:a16="http://schemas.microsoft.com/office/drawing/2014/main" id="{6F00A579-D184-4380-844C-0BEF9167F5AF}"/>
+                <a16:creationId xmlns:a16="http://schemas.microsoft.com/office/drawing/2014/main" xmlns="" id="{6F00A579-D184-4380-844C-0BEF9167F5AF}"/>
               </a:ext>
             </a:extLst>
           </p:cNvPr>
@@ -8620,7 +7937,7 @@
         <p:spPr bwMode="auto">
           <a:xfrm>
             <a:off x="442912" y="1146341"/>
-            <a:ext cx="10817128" cy="723275"/>
+            <a:ext cx="12674945" cy="815608"/>
           </a:xfrm>
           <a:prstGeom prst="rect">
             <a:avLst/>
@@ -8632,14 +7949,14 @@
           <a:effectLst/>
           <a:extLst>
             <a:ext uri="{909E8E84-426E-40DD-AFC4-6F175D3DCCD1}">
-              <a14:hiddenFill xmlns:a14="http://schemas.microsoft.com/office/drawing/2010/main">
+              <a14:hiddenFill xmlns:a14="http://schemas.microsoft.com/office/drawing/2010/main" xmlns="">
                 <a:solidFill>
                   <a:schemeClr val="accent1"/>
                 </a:solidFill>
               </a14:hiddenFill>
             </a:ext>
             <a:ext uri="{91240B29-F687-4F45-9708-019B960494DF}">
-              <a14:hiddenLine xmlns:a14="http://schemas.microsoft.com/office/drawing/2010/main" w="9525">
+              <a14:hiddenLine xmlns:a14="http://schemas.microsoft.com/office/drawing/2010/main" xmlns="" w="9525">
                 <a:solidFill>
                   <a:schemeClr val="tx1"/>
                 </a:solidFill>
@@ -8649,7 +7966,7 @@
               </a14:hiddenLine>
             </a:ext>
             <a:ext uri="{AF507438-7753-43E0-B8FC-AC1667EBCBE1}">
-              <a14:hiddenEffects xmlns:a14="http://schemas.microsoft.com/office/drawing/2010/main">
+              <a14:hiddenEffects xmlns:a14="http://schemas.microsoft.com/office/drawing/2010/main" xmlns="">
                 <a:effectLst>
                   <a:outerShdw dist="35921" dir="2700000" algn="ctr" rotWithShape="0">
                     <a:schemeClr val="bg2"/>
@@ -8727,89 +8044,45 @@
               <a:tabLst/>
             </a:pPr>
             <a:r>
-              <a:rPr kumimoji="0" lang="es-MX" altLang="es-MX" sz="1400" b="0" i="0" u="none" strike="noStrike" cap="none" normalizeH="0" baseline="0" dirty="0">
-                <a:ln>
-                  <a:noFill/>
-                </a:ln>
-                <a:solidFill>
-                  <a:schemeClr val="tx1"/>
-                </a:solidFill>
-                <a:effectLst/>
-                <a:latin typeface="Arial" panose="020B0604020202020204" pitchFamily="34" charset="0"/>
+              <a:rPr lang="es-MX" altLang="es-MX" sz="2000" dirty="0">
+                <a:latin typeface="Arial Narrow" panose="020B0606020202030204" pitchFamily="34" charset="0"/>
                 <a:ea typeface="Calibri" panose="020F0502020204030204" pitchFamily="34" charset="0"/>
                 <a:cs typeface="Arial" panose="020B0604020202020204" pitchFamily="34" charset="0"/>
               </a:rPr>
               <a:t>Como vamos a ver las instrucciones </a:t>
             </a:r>
             <a:r>
-              <a:rPr kumimoji="0" lang="es-MX" altLang="es-MX" sz="1400" b="0" i="0" u="none" strike="noStrike" cap="none" normalizeH="0" baseline="0" dirty="0" err="1">
-                <a:ln>
-                  <a:noFill/>
-                </a:ln>
-                <a:solidFill>
-                  <a:schemeClr val="tx1"/>
-                </a:solidFill>
-                <a:effectLst/>
-                <a:latin typeface="Arial" panose="020B0604020202020204" pitchFamily="34" charset="0"/>
+              <a:rPr lang="es-MX" altLang="es-MX" sz="2000" dirty="0" err="1">
+                <a:latin typeface="Arial Narrow" panose="020B0606020202030204" pitchFamily="34" charset="0"/>
                 <a:ea typeface="Calibri" panose="020F0502020204030204" pitchFamily="34" charset="0"/>
                 <a:cs typeface="Arial" panose="020B0604020202020204" pitchFamily="34" charset="0"/>
               </a:rPr>
               <a:t>lw</a:t>
             </a:r>
             <a:r>
-              <a:rPr kumimoji="0" lang="es-MX" altLang="es-MX" sz="1400" b="0" i="0" u="none" strike="noStrike" cap="none" normalizeH="0" baseline="0" dirty="0">
-                <a:ln>
-                  <a:noFill/>
-                </a:ln>
-                <a:solidFill>
-                  <a:schemeClr val="tx1"/>
-                </a:solidFill>
-                <a:effectLst/>
-                <a:latin typeface="Arial" panose="020B0604020202020204" pitchFamily="34" charset="0"/>
+              <a:rPr lang="es-MX" altLang="es-MX" sz="2000" dirty="0">
+                <a:latin typeface="Arial Narrow" panose="020B0606020202030204" pitchFamily="34" charset="0"/>
                 <a:ea typeface="Calibri" panose="020F0502020204030204" pitchFamily="34" charset="0"/>
                 <a:cs typeface="Arial" panose="020B0604020202020204" pitchFamily="34" charset="0"/>
               </a:rPr>
               <a:t> y </a:t>
             </a:r>
             <a:r>
-              <a:rPr kumimoji="0" lang="es-MX" altLang="es-MX" sz="1400" b="0" i="0" u="none" strike="noStrike" cap="none" normalizeH="0" baseline="0" dirty="0" err="1">
-                <a:ln>
-                  <a:noFill/>
-                </a:ln>
-                <a:solidFill>
-                  <a:schemeClr val="tx1"/>
-                </a:solidFill>
-                <a:effectLst/>
-                <a:latin typeface="Arial" panose="020B0604020202020204" pitchFamily="34" charset="0"/>
+              <a:rPr lang="es-MX" altLang="es-MX" sz="2000" dirty="0" err="1">
+                <a:latin typeface="Arial Narrow" panose="020B0606020202030204" pitchFamily="34" charset="0"/>
                 <a:ea typeface="Calibri" panose="020F0502020204030204" pitchFamily="34" charset="0"/>
                 <a:cs typeface="Arial" panose="020B0604020202020204" pitchFamily="34" charset="0"/>
               </a:rPr>
               <a:t>sw</a:t>
             </a:r>
             <a:r>
-              <a:rPr kumimoji="0" lang="es-MX" altLang="es-MX" sz="1400" b="0" i="0" u="none" strike="noStrike" cap="none" normalizeH="0" baseline="0" dirty="0">
-                <a:ln>
-                  <a:noFill/>
-                </a:ln>
-                <a:solidFill>
-                  <a:schemeClr val="tx1"/>
-                </a:solidFill>
-                <a:effectLst/>
-                <a:latin typeface="Arial" panose="020B0604020202020204" pitchFamily="34" charset="0"/>
+              <a:rPr lang="es-MX" altLang="es-MX" sz="2000" dirty="0">
+                <a:latin typeface="Arial Narrow" panose="020B0606020202030204" pitchFamily="34" charset="0"/>
                 <a:ea typeface="Calibri" panose="020F0502020204030204" pitchFamily="34" charset="0"/>
                 <a:cs typeface="Arial" panose="020B0604020202020204" pitchFamily="34" charset="0"/>
               </a:rPr>
               <a:t>, en la figura 8 podemos ver los datos que hay precargados en nuestra memoria de datos.</a:t>
             </a:r>
-            <a:endParaRPr kumimoji="0" lang="es-MX" altLang="es-MX" sz="1200" b="0" i="0" u="none" strike="noStrike" cap="none" normalizeH="0" baseline="0" dirty="0">
-              <a:ln>
-                <a:noFill/>
-              </a:ln>
-              <a:solidFill>
-                <a:schemeClr val="tx1"/>
-              </a:solidFill>
-              <a:effectLst/>
-            </a:endParaRPr>
           </a:p>
           <a:p>
             <a:pPr marL="0" marR="0" lvl="0" indent="0" algn="l" defTabSz="914400" rtl="0" eaLnBrk="0" fontAlgn="base" latinLnBrk="0" hangingPunct="0">
@@ -8846,7 +8119,7 @@
           <p:cNvPr id="6" name="Rectangle 5">
             <a:extLst>
               <a:ext uri="{FF2B5EF4-FFF2-40B4-BE49-F238E27FC236}">
-                <a16:creationId xmlns:a16="http://schemas.microsoft.com/office/drawing/2014/main" id="{6F219B13-5C1C-4683-A1A6-BE042C05F9A8}"/>
+                <a16:creationId xmlns:a16="http://schemas.microsoft.com/office/drawing/2014/main" xmlns="" id="{6F219B13-5C1C-4683-A1A6-BE042C05F9A8}"/>
               </a:ext>
             </a:extLst>
           </p:cNvPr>
@@ -8857,8 +8130,8 @@
         </p:nvSpPr>
         <p:spPr bwMode="auto">
           <a:xfrm>
-            <a:off x="442912" y="2743406"/>
-            <a:ext cx="11115676" cy="661720"/>
+            <a:off x="442912" y="3048206"/>
+            <a:ext cx="11115676" cy="1154162"/>
           </a:xfrm>
           <a:prstGeom prst="rect">
             <a:avLst/>
@@ -8870,14 +8143,14 @@
           <a:effectLst/>
           <a:extLst>
             <a:ext uri="{909E8E84-426E-40DD-AFC4-6F175D3DCCD1}">
-              <a14:hiddenFill xmlns:a14="http://schemas.microsoft.com/office/drawing/2010/main">
+              <a14:hiddenFill xmlns:a14="http://schemas.microsoft.com/office/drawing/2010/main" xmlns="">
                 <a:solidFill>
                   <a:schemeClr val="accent1"/>
                 </a:solidFill>
               </a14:hiddenFill>
             </a:ext>
             <a:ext uri="{91240B29-F687-4F45-9708-019B960494DF}">
-              <a14:hiddenLine xmlns:a14="http://schemas.microsoft.com/office/drawing/2010/main" w="9525">
+              <a14:hiddenLine xmlns:a14="http://schemas.microsoft.com/office/drawing/2010/main" xmlns="" w="9525">
                 <a:solidFill>
                   <a:schemeClr val="tx1"/>
                 </a:solidFill>
@@ -8887,7 +8160,7 @@
               </a14:hiddenLine>
             </a:ext>
             <a:ext uri="{AF507438-7753-43E0-B8FC-AC1667EBCBE1}">
-              <a14:hiddenEffects xmlns:a14="http://schemas.microsoft.com/office/drawing/2010/main">
+              <a14:hiddenEffects xmlns:a14="http://schemas.microsoft.com/office/drawing/2010/main" xmlns="">
                 <a:effectLst>
                   <a:outerShdw dist="35921" dir="2700000" algn="ctr" rotWithShape="0">
                     <a:schemeClr val="bg2"/>
@@ -8948,227 +8221,46 @@
             </a:endParaRPr>
           </a:p>
           <a:p>
-            <a:pPr marL="0" marR="0" lvl="0" indent="0" algn="just" defTabSz="914400" rtl="0" eaLnBrk="0" fontAlgn="base" latinLnBrk="0" hangingPunct="0">
-              <a:lnSpc>
-                <a:spcPct val="100000"/>
-              </a:lnSpc>
+            <a:pPr algn="just" defTabSz="914400" eaLnBrk="0" fontAlgn="base" hangingPunct="0">
               <a:spcBef>
                 <a:spcPct val="0"/>
               </a:spcBef>
               <a:spcAft>
                 <a:spcPct val="0"/>
               </a:spcAft>
-              <a:buClrTx/>
-              <a:buSzTx/>
-              <a:buFontTx/>
-              <a:buNone/>
-              <a:tabLst/>
             </a:pPr>
             <a:r>
-              <a:rPr kumimoji="0" lang="es-MX" altLang="es-MX" sz="1400" b="0" i="0" u="none" strike="noStrike" cap="none" normalizeH="0" baseline="0" dirty="0">
-                <a:ln>
-                  <a:noFill/>
-                </a:ln>
-                <a:solidFill>
-                  <a:schemeClr val="tx1"/>
-                </a:solidFill>
-                <a:effectLst/>
-                <a:latin typeface="Arial" panose="020B0604020202020204" pitchFamily="34" charset="0"/>
+              <a:rPr lang="es-MX" altLang="es-MX" sz="2000" dirty="0">
+                <a:latin typeface="Arial Narrow" panose="020B0606020202030204" pitchFamily="34" charset="0"/>
                 <a:ea typeface="Calibri" panose="020F0502020204030204" pitchFamily="34" charset="0"/>
                 <a:cs typeface="Arial" panose="020B0604020202020204" pitchFamily="34" charset="0"/>
               </a:rPr>
-              <a:t>En la figura 9 podemos ver la operaci</a:t>
-            </a:r>
-            <a:r>
-              <a:rPr kumimoji="0" lang="es-MX" altLang="es-MX" sz="1400" b="0" i="0" u="none" strike="noStrike" cap="none" normalizeH="0" baseline="0" dirty="0">
-                <a:ln>
-                  <a:noFill/>
-                </a:ln>
-                <a:solidFill>
-                  <a:schemeClr val="tx1"/>
-                </a:solidFill>
-                <a:effectLst/>
-                <a:latin typeface="Calibri" panose="020F0502020204030204" pitchFamily="34" charset="0"/>
-                <a:ea typeface="Calibri" panose="020F0502020204030204" pitchFamily="34" charset="0"/>
-                <a:cs typeface="Arial" panose="020B0604020202020204" pitchFamily="34" charset="0"/>
-              </a:rPr>
-              <a:t>ó</a:t>
-            </a:r>
-            <a:r>
-              <a:rPr kumimoji="0" lang="es-MX" altLang="es-MX" sz="1400" b="0" i="0" u="none" strike="noStrike" cap="none" normalizeH="0" baseline="0" dirty="0">
-                <a:ln>
-                  <a:noFill/>
-                </a:ln>
-                <a:solidFill>
-                  <a:schemeClr val="tx1"/>
-                </a:solidFill>
-                <a:effectLst/>
-                <a:latin typeface="Arial" panose="020B0604020202020204" pitchFamily="34" charset="0"/>
-                <a:ea typeface="Calibri" panose="020F0502020204030204" pitchFamily="34" charset="0"/>
-                <a:cs typeface="Arial" panose="020B0604020202020204" pitchFamily="34" charset="0"/>
-              </a:rPr>
-              <a:t>n </a:t>
-            </a:r>
-            <a:r>
-              <a:rPr kumimoji="0" lang="es-MX" altLang="es-MX" sz="1400" b="0" i="0" u="none" strike="noStrike" cap="none" normalizeH="0" baseline="0" dirty="0" err="1">
-                <a:ln>
-                  <a:noFill/>
-                </a:ln>
-                <a:solidFill>
-                  <a:schemeClr val="tx1"/>
-                </a:solidFill>
-                <a:effectLst/>
-                <a:latin typeface="Arial" panose="020B0604020202020204" pitchFamily="34" charset="0"/>
+              <a:t>En la figura 9 podemos ver la operación </a:t>
+            </a:r>
+            <a:r>
+              <a:rPr lang="es-MX" altLang="es-MX" sz="2000" dirty="0" err="1">
+                <a:latin typeface="Arial Narrow" panose="020B0606020202030204" pitchFamily="34" charset="0"/>
                 <a:ea typeface="Calibri" panose="020F0502020204030204" pitchFamily="34" charset="0"/>
                 <a:cs typeface="Arial" panose="020B0604020202020204" pitchFamily="34" charset="0"/>
               </a:rPr>
               <a:t>lw</a:t>
             </a:r>
             <a:r>
-              <a:rPr kumimoji="0" lang="es-MX" altLang="es-MX" sz="1400" b="0" i="0" u="none" strike="noStrike" cap="none" normalizeH="0" baseline="0" dirty="0">
-                <a:ln>
-                  <a:noFill/>
-                </a:ln>
-                <a:solidFill>
-                  <a:schemeClr val="tx1"/>
-                </a:solidFill>
-                <a:effectLst/>
-                <a:latin typeface="Arial" panose="020B0604020202020204" pitchFamily="34" charset="0"/>
+              <a:rPr lang="es-MX" altLang="es-MX" sz="2000" dirty="0">
+                <a:latin typeface="Arial Narrow" panose="020B0606020202030204" pitchFamily="34" charset="0"/>
                 <a:ea typeface="Calibri" panose="020F0502020204030204" pitchFamily="34" charset="0"/>
                 <a:cs typeface="Arial" panose="020B0604020202020204" pitchFamily="34" charset="0"/>
               </a:rPr>
-              <a:t>, la direcci</a:t>
-            </a:r>
-            <a:r>
-              <a:rPr kumimoji="0" lang="es-MX" altLang="es-MX" sz="1400" b="0" i="0" u="none" strike="noStrike" cap="none" normalizeH="0" baseline="0" dirty="0">
-                <a:ln>
-                  <a:noFill/>
-                </a:ln>
-                <a:solidFill>
-                  <a:schemeClr val="tx1"/>
-                </a:solidFill>
-                <a:effectLst/>
-                <a:latin typeface="Calibri" panose="020F0502020204030204" pitchFamily="34" charset="0"/>
+              <a:t>, la dirección base es 0, la dirección destino es la 4 y offset es igual a 6, entonces, el dato que se almacena en el banco de registros en la dirección 4 es el dato que se encuentra en la dirección 6 de la memoria de datos</a:t>
+            </a:r>
+            <a:r>
+              <a:rPr lang="es-MX" altLang="es-MX" sz="1600" dirty="0">
+                <a:latin typeface="Arial Narrow" panose="020B0606020202030204" pitchFamily="34" charset="0"/>
                 <a:ea typeface="Calibri" panose="020F0502020204030204" pitchFamily="34" charset="0"/>
                 <a:cs typeface="Arial" panose="020B0604020202020204" pitchFamily="34" charset="0"/>
               </a:rPr>
-              <a:t>ó</a:t>
-            </a:r>
-            <a:r>
-              <a:rPr kumimoji="0" lang="es-MX" altLang="es-MX" sz="1400" b="0" i="0" u="none" strike="noStrike" cap="none" normalizeH="0" baseline="0" dirty="0">
-                <a:ln>
-                  <a:noFill/>
-                </a:ln>
-                <a:solidFill>
-                  <a:schemeClr val="tx1"/>
-                </a:solidFill>
-                <a:effectLst/>
-                <a:latin typeface="Arial" panose="020B0604020202020204" pitchFamily="34" charset="0"/>
-                <a:ea typeface="Calibri" panose="020F0502020204030204" pitchFamily="34" charset="0"/>
-                <a:cs typeface="Arial" panose="020B0604020202020204" pitchFamily="34" charset="0"/>
-              </a:rPr>
-              <a:t>n base es 0, la direcci</a:t>
-            </a:r>
-            <a:r>
-              <a:rPr kumimoji="0" lang="es-MX" altLang="es-MX" sz="1400" b="0" i="0" u="none" strike="noStrike" cap="none" normalizeH="0" baseline="0" dirty="0">
-                <a:ln>
-                  <a:noFill/>
-                </a:ln>
-                <a:solidFill>
-                  <a:schemeClr val="tx1"/>
-                </a:solidFill>
-                <a:effectLst/>
-                <a:latin typeface="Calibri" panose="020F0502020204030204" pitchFamily="34" charset="0"/>
-                <a:ea typeface="Calibri" panose="020F0502020204030204" pitchFamily="34" charset="0"/>
-                <a:cs typeface="Arial" panose="020B0604020202020204" pitchFamily="34" charset="0"/>
-              </a:rPr>
-              <a:t>ó</a:t>
-            </a:r>
-            <a:r>
-              <a:rPr kumimoji="0" lang="es-MX" altLang="es-MX" sz="1400" b="0" i="0" u="none" strike="noStrike" cap="none" normalizeH="0" baseline="0" dirty="0">
-                <a:ln>
-                  <a:noFill/>
-                </a:ln>
-                <a:solidFill>
-                  <a:schemeClr val="tx1"/>
-                </a:solidFill>
-                <a:effectLst/>
-                <a:latin typeface="Arial" panose="020B0604020202020204" pitchFamily="34" charset="0"/>
-                <a:ea typeface="Calibri" panose="020F0502020204030204" pitchFamily="34" charset="0"/>
-                <a:cs typeface="Arial" panose="020B0604020202020204" pitchFamily="34" charset="0"/>
-              </a:rPr>
-              <a:t>n destino es la 4 y offset es igual a 6, entonces, el dato que se almacena en el banco de registros en la direcci</a:t>
-            </a:r>
-            <a:r>
-              <a:rPr kumimoji="0" lang="es-MX" altLang="es-MX" sz="1400" b="0" i="0" u="none" strike="noStrike" cap="none" normalizeH="0" baseline="0" dirty="0">
-                <a:ln>
-                  <a:noFill/>
-                </a:ln>
-                <a:solidFill>
-                  <a:schemeClr val="tx1"/>
-                </a:solidFill>
-                <a:effectLst/>
-                <a:latin typeface="Calibri" panose="020F0502020204030204" pitchFamily="34" charset="0"/>
-                <a:ea typeface="Calibri" panose="020F0502020204030204" pitchFamily="34" charset="0"/>
-                <a:cs typeface="Arial" panose="020B0604020202020204" pitchFamily="34" charset="0"/>
-              </a:rPr>
-              <a:t>ó</a:t>
-            </a:r>
-            <a:r>
-              <a:rPr kumimoji="0" lang="es-MX" altLang="es-MX" sz="1400" b="0" i="0" u="none" strike="noStrike" cap="none" normalizeH="0" baseline="0" dirty="0">
-                <a:ln>
-                  <a:noFill/>
-                </a:ln>
-                <a:solidFill>
-                  <a:schemeClr val="tx1"/>
-                </a:solidFill>
-                <a:effectLst/>
-                <a:latin typeface="Arial" panose="020B0604020202020204" pitchFamily="34" charset="0"/>
-                <a:ea typeface="Calibri" panose="020F0502020204030204" pitchFamily="34" charset="0"/>
-                <a:cs typeface="Arial" panose="020B0604020202020204" pitchFamily="34" charset="0"/>
-              </a:rPr>
-              <a:t>n 4 es el dato que se encuentra en la direcci</a:t>
-            </a:r>
-            <a:r>
-              <a:rPr kumimoji="0" lang="es-MX" altLang="es-MX" sz="1400" b="0" i="0" u="none" strike="noStrike" cap="none" normalizeH="0" baseline="0" dirty="0">
-                <a:ln>
-                  <a:noFill/>
-                </a:ln>
-                <a:solidFill>
-                  <a:schemeClr val="tx1"/>
-                </a:solidFill>
-                <a:effectLst/>
-                <a:latin typeface="Calibri" panose="020F0502020204030204" pitchFamily="34" charset="0"/>
-                <a:ea typeface="Calibri" panose="020F0502020204030204" pitchFamily="34" charset="0"/>
-                <a:cs typeface="Arial" panose="020B0604020202020204" pitchFamily="34" charset="0"/>
-              </a:rPr>
-              <a:t>ó</a:t>
-            </a:r>
-            <a:r>
-              <a:rPr kumimoji="0" lang="es-MX" altLang="es-MX" sz="1400" b="0" i="0" u="none" strike="noStrike" cap="none" normalizeH="0" baseline="0" dirty="0">
-                <a:ln>
-                  <a:noFill/>
-                </a:ln>
-                <a:solidFill>
-                  <a:schemeClr val="tx1"/>
-                </a:solidFill>
-                <a:effectLst/>
-                <a:latin typeface="Arial" panose="020B0604020202020204" pitchFamily="34" charset="0"/>
-                <a:ea typeface="Calibri" panose="020F0502020204030204" pitchFamily="34" charset="0"/>
-                <a:cs typeface="Arial" panose="020B0604020202020204" pitchFamily="34" charset="0"/>
-              </a:rPr>
-              <a:t>n 6 de la memoria de datos.</a:t>
-            </a:r>
-            <a:endParaRPr kumimoji="0" lang="es-MX" altLang="es-MX" sz="2000" b="0" i="0" u="none" strike="noStrike" cap="none" normalizeH="0" baseline="0" dirty="0">
-              <a:ln>
-                <a:noFill/>
-              </a:ln>
-              <a:solidFill>
-                <a:schemeClr val="tx1"/>
-              </a:solidFill>
-              <a:effectLst/>
-              <a:latin typeface="Arial" panose="020B0604020202020204" pitchFamily="34" charset="0"/>
-            </a:endParaRPr>
+              <a:t>.</a:t>
+            </a:r>
           </a:p>
         </p:txBody>
       </p:sp>
@@ -9177,7 +8269,7 @@
           <p:cNvPr id="7" name="Rectangle 7">
             <a:extLst>
               <a:ext uri="{FF2B5EF4-FFF2-40B4-BE49-F238E27FC236}">
-                <a16:creationId xmlns:a16="http://schemas.microsoft.com/office/drawing/2014/main" id="{7822878A-7E9A-45FC-A631-DE00695F459C}"/>
+                <a16:creationId xmlns:a16="http://schemas.microsoft.com/office/drawing/2014/main" xmlns="" id="{7822878A-7E9A-45FC-A631-DE00695F459C}"/>
               </a:ext>
             </a:extLst>
           </p:cNvPr>
@@ -9201,14 +8293,14 @@
           <a:effectLst/>
           <a:extLst>
             <a:ext uri="{909E8E84-426E-40DD-AFC4-6F175D3DCCD1}">
-              <a14:hiddenFill xmlns:a14="http://schemas.microsoft.com/office/drawing/2010/main">
+              <a14:hiddenFill xmlns:a14="http://schemas.microsoft.com/office/drawing/2010/main" xmlns="">
                 <a:solidFill>
                   <a:schemeClr val="accent1"/>
                 </a:solidFill>
               </a14:hiddenFill>
             </a:ext>
             <a:ext uri="{91240B29-F687-4F45-9708-019B960494DF}">
-              <a14:hiddenLine xmlns:a14="http://schemas.microsoft.com/office/drawing/2010/main" w="9525">
+              <a14:hiddenLine xmlns:a14="http://schemas.microsoft.com/office/drawing/2010/main" xmlns="" w="9525">
                 <a:solidFill>
                   <a:schemeClr val="tx1"/>
                 </a:solidFill>
@@ -9218,7 +8310,7 @@
               </a14:hiddenLine>
             </a:ext>
             <a:ext uri="{AF507438-7753-43E0-B8FC-AC1667EBCBE1}">
-              <a14:hiddenEffects xmlns:a14="http://schemas.microsoft.com/office/drawing/2010/main">
+              <a14:hiddenEffects xmlns:a14="http://schemas.microsoft.com/office/drawing/2010/main" xmlns="">
                 <a:effectLst>
                   <a:outerShdw dist="35921" dir="2700000" algn="ctr" rotWithShape="0">
                     <a:schemeClr val="bg2"/>
@@ -9246,7 +8338,7 @@
           <p:cNvPr id="4102" name="Imagen 36" descr="Interfaz de usuario gráfica, Aplicación&#10;&#10;Descripción generada automáticamente">
             <a:extLst>
               <a:ext uri="{FF2B5EF4-FFF2-40B4-BE49-F238E27FC236}">
-                <a16:creationId xmlns:a16="http://schemas.microsoft.com/office/drawing/2014/main" id="{7CC64A03-CA8C-48BB-8782-21988D5292FF}"/>
+                <a16:creationId xmlns:a16="http://schemas.microsoft.com/office/drawing/2014/main" xmlns="" id="{7CC64A03-CA8C-48BB-8782-21988D5292FF}"/>
               </a:ext>
             </a:extLst>
           </p:cNvPr>
@@ -9259,7 +8351,7 @@
           <a:blip r:embed="rId4">
             <a:extLst>
               <a:ext uri="{28A0092B-C50C-407E-A947-70E740481C1C}">
-                <a14:useLocalDpi xmlns:a14="http://schemas.microsoft.com/office/drawing/2010/main" val="0"/>
+                <a14:useLocalDpi xmlns:a14="http://schemas.microsoft.com/office/drawing/2010/main" xmlns="" val="0"/>
               </a:ext>
             </a:extLst>
           </a:blip>
@@ -9270,7 +8362,7 @@
         </p:blipFill>
         <p:spPr bwMode="auto">
           <a:xfrm>
-            <a:off x="442912" y="3405126"/>
+            <a:off x="442912" y="4458088"/>
             <a:ext cx="5610225" cy="1000125"/>
           </a:xfrm>
           <a:prstGeom prst="rect">
@@ -9279,7 +8371,7 @@
           <a:noFill/>
           <a:extLst>
             <a:ext uri="{909E8E84-426E-40DD-AFC4-6F175D3DCCD1}">
-              <a14:hiddenFill xmlns:a14="http://schemas.microsoft.com/office/drawing/2010/main">
+              <a14:hiddenFill xmlns:a14="http://schemas.microsoft.com/office/drawing/2010/main" xmlns="">
                 <a:solidFill>
                   <a:srgbClr val="FFFFFF"/>
                 </a:solidFill>
@@ -9293,7 +8385,7 @@
           <p:cNvPr id="8" name="Rectangle 8">
             <a:extLst>
               <a:ext uri="{FF2B5EF4-FFF2-40B4-BE49-F238E27FC236}">
-                <a16:creationId xmlns:a16="http://schemas.microsoft.com/office/drawing/2014/main" id="{1C225B36-E950-413A-A349-EED98CBEEE14}"/>
+                <a16:creationId xmlns:a16="http://schemas.microsoft.com/office/drawing/2014/main" xmlns="" id="{1C225B36-E950-413A-A349-EED98CBEEE14}"/>
               </a:ext>
             </a:extLst>
           </p:cNvPr>
@@ -9304,8 +8396,8 @@
         </p:nvSpPr>
         <p:spPr bwMode="auto">
           <a:xfrm>
-            <a:off x="442912" y="4405251"/>
-            <a:ext cx="11115676" cy="661720"/>
+            <a:off x="442912" y="5527483"/>
+            <a:ext cx="11115676" cy="846386"/>
           </a:xfrm>
           <a:prstGeom prst="rect">
             <a:avLst/>
@@ -9317,14 +8409,14 @@
           <a:effectLst/>
           <a:extLst>
             <a:ext uri="{909E8E84-426E-40DD-AFC4-6F175D3DCCD1}">
-              <a14:hiddenFill xmlns:a14="http://schemas.microsoft.com/office/drawing/2010/main">
+              <a14:hiddenFill xmlns:a14="http://schemas.microsoft.com/office/drawing/2010/main" xmlns="">
                 <a:solidFill>
                   <a:schemeClr val="accent1"/>
                 </a:solidFill>
               </a14:hiddenFill>
             </a:ext>
             <a:ext uri="{91240B29-F687-4F45-9708-019B960494DF}">
-              <a14:hiddenLine xmlns:a14="http://schemas.microsoft.com/office/drawing/2010/main" w="9525">
+              <a14:hiddenLine xmlns:a14="http://schemas.microsoft.com/office/drawing/2010/main" xmlns="" w="9525">
                 <a:solidFill>
                   <a:schemeClr val="tx1"/>
                 </a:solidFill>
@@ -9334,7 +8426,7 @@
               </a14:hiddenLine>
             </a:ext>
             <a:ext uri="{AF507438-7753-43E0-B8FC-AC1667EBCBE1}">
-              <a14:hiddenEffects xmlns:a14="http://schemas.microsoft.com/office/drawing/2010/main">
+              <a14:hiddenEffects xmlns:a14="http://schemas.microsoft.com/office/drawing/2010/main" xmlns="">
                 <a:effectLst>
                   <a:outerShdw dist="35921" dir="2700000" algn="ctr" rotWithShape="0">
                     <a:schemeClr val="bg2"/>
@@ -9412,217 +8504,36 @@
               <a:tabLst/>
             </a:pPr>
             <a:r>
-              <a:rPr kumimoji="0" lang="es-MX" altLang="es-MX" sz="1400" b="0" i="0" u="none" strike="noStrike" cap="none" normalizeH="0" baseline="0" dirty="0">
-                <a:ln>
-                  <a:noFill/>
-                </a:ln>
-                <a:solidFill>
-                  <a:schemeClr val="tx1"/>
-                </a:solidFill>
-                <a:effectLst/>
-                <a:latin typeface="Arial" panose="020B0604020202020204" pitchFamily="34" charset="0"/>
+              <a:rPr lang="es-MX" altLang="es-MX" sz="2000" dirty="0">
+                <a:latin typeface="Arial Narrow" panose="020B0606020202030204" pitchFamily="34" charset="0"/>
                 <a:ea typeface="Calibri" panose="020F0502020204030204" pitchFamily="34" charset="0"/>
                 <a:cs typeface="Arial" panose="020B0604020202020204" pitchFamily="34" charset="0"/>
               </a:rPr>
-              <a:t>La siguiente operaci</a:t>
-            </a:r>
-            <a:r>
-              <a:rPr kumimoji="0" lang="es-MX" altLang="es-MX" sz="1400" b="0" i="0" u="none" strike="noStrike" cap="none" normalizeH="0" baseline="0" dirty="0">
-                <a:ln>
-                  <a:noFill/>
-                </a:ln>
-                <a:solidFill>
-                  <a:schemeClr val="tx1"/>
-                </a:solidFill>
-                <a:effectLst/>
-                <a:latin typeface="Calibri" panose="020F0502020204030204" pitchFamily="34" charset="0"/>
-                <a:ea typeface="Calibri" panose="020F0502020204030204" pitchFamily="34" charset="0"/>
-                <a:cs typeface="Arial" panose="020B0604020202020204" pitchFamily="34" charset="0"/>
-              </a:rPr>
-              <a:t>ó</a:t>
-            </a:r>
-            <a:r>
-              <a:rPr kumimoji="0" lang="es-MX" altLang="es-MX" sz="1400" b="0" i="0" u="none" strike="noStrike" cap="none" normalizeH="0" baseline="0" dirty="0">
-                <a:ln>
-                  <a:noFill/>
-                </a:ln>
-                <a:solidFill>
-                  <a:schemeClr val="tx1"/>
-                </a:solidFill>
-                <a:effectLst/>
-                <a:latin typeface="Arial" panose="020B0604020202020204" pitchFamily="34" charset="0"/>
-                <a:ea typeface="Calibri" panose="020F0502020204030204" pitchFamily="34" charset="0"/>
-                <a:cs typeface="Arial" panose="020B0604020202020204" pitchFamily="34" charset="0"/>
-              </a:rPr>
-              <a:t>n es </a:t>
-            </a:r>
-            <a:r>
-              <a:rPr kumimoji="0" lang="es-MX" altLang="es-MX" sz="1400" b="0" i="0" u="none" strike="noStrike" cap="none" normalizeH="0" baseline="0" dirty="0" err="1">
-                <a:ln>
-                  <a:noFill/>
-                </a:ln>
-                <a:solidFill>
-                  <a:schemeClr val="tx1"/>
-                </a:solidFill>
-                <a:effectLst/>
-                <a:latin typeface="Arial" panose="020B0604020202020204" pitchFamily="34" charset="0"/>
+              <a:t>La siguiente operación es </a:t>
+            </a:r>
+            <a:r>
+              <a:rPr lang="es-MX" altLang="es-MX" sz="2000" dirty="0" err="1">
+                <a:latin typeface="Arial Narrow" panose="020B0606020202030204" pitchFamily="34" charset="0"/>
                 <a:ea typeface="Calibri" panose="020F0502020204030204" pitchFamily="34" charset="0"/>
                 <a:cs typeface="Arial" panose="020B0604020202020204" pitchFamily="34" charset="0"/>
               </a:rPr>
               <a:t>sw</a:t>
             </a:r>
             <a:r>
-              <a:rPr kumimoji="0" lang="es-MX" altLang="es-MX" sz="1400" b="0" i="0" u="none" strike="noStrike" cap="none" normalizeH="0" baseline="0" dirty="0">
-                <a:ln>
-                  <a:noFill/>
-                </a:ln>
-                <a:solidFill>
-                  <a:schemeClr val="tx1"/>
-                </a:solidFill>
-                <a:effectLst/>
-                <a:latin typeface="Arial" panose="020B0604020202020204" pitchFamily="34" charset="0"/>
+              <a:rPr lang="es-MX" altLang="es-MX" sz="2000" dirty="0">
+                <a:latin typeface="Arial Narrow" panose="020B0606020202030204" pitchFamily="34" charset="0"/>
                 <a:ea typeface="Calibri" panose="020F0502020204030204" pitchFamily="34" charset="0"/>
                 <a:cs typeface="Arial" panose="020B0604020202020204" pitchFamily="34" charset="0"/>
               </a:rPr>
-              <a:t>, se muestra en la figura 10, la direcci</a:t>
-            </a:r>
-            <a:r>
-              <a:rPr kumimoji="0" lang="es-MX" altLang="es-MX" sz="1400" b="0" i="0" u="none" strike="noStrike" cap="none" normalizeH="0" baseline="0" dirty="0">
-                <a:ln>
-                  <a:noFill/>
-                </a:ln>
-                <a:solidFill>
-                  <a:schemeClr val="tx1"/>
-                </a:solidFill>
-                <a:effectLst/>
-                <a:latin typeface="Calibri" panose="020F0502020204030204" pitchFamily="34" charset="0"/>
-                <a:ea typeface="Calibri" panose="020F0502020204030204" pitchFamily="34" charset="0"/>
-                <a:cs typeface="Arial" panose="020B0604020202020204" pitchFamily="34" charset="0"/>
-              </a:rPr>
-              <a:t>ó</a:t>
-            </a:r>
-            <a:r>
-              <a:rPr kumimoji="0" lang="es-MX" altLang="es-MX" sz="1400" b="0" i="0" u="none" strike="noStrike" cap="none" normalizeH="0" baseline="0" dirty="0">
-                <a:ln>
-                  <a:noFill/>
-                </a:ln>
-                <a:solidFill>
-                  <a:schemeClr val="tx1"/>
-                </a:solidFill>
-                <a:effectLst/>
-                <a:latin typeface="Arial" panose="020B0604020202020204" pitchFamily="34" charset="0"/>
-                <a:ea typeface="Calibri" panose="020F0502020204030204" pitchFamily="34" charset="0"/>
-                <a:cs typeface="Arial" panose="020B0604020202020204" pitchFamily="34" charset="0"/>
-              </a:rPr>
-              <a:t>n base tambi</a:t>
-            </a:r>
-            <a:r>
-              <a:rPr kumimoji="0" lang="es-MX" altLang="es-MX" sz="1400" b="0" i="0" u="none" strike="noStrike" cap="none" normalizeH="0" baseline="0" dirty="0">
-                <a:ln>
-                  <a:noFill/>
-                </a:ln>
-                <a:solidFill>
-                  <a:schemeClr val="tx1"/>
-                </a:solidFill>
-                <a:effectLst/>
-                <a:latin typeface="Calibri" panose="020F0502020204030204" pitchFamily="34" charset="0"/>
-                <a:ea typeface="Calibri" panose="020F0502020204030204" pitchFamily="34" charset="0"/>
-                <a:cs typeface="Arial" panose="020B0604020202020204" pitchFamily="34" charset="0"/>
-              </a:rPr>
-              <a:t>é</a:t>
-            </a:r>
-            <a:r>
-              <a:rPr kumimoji="0" lang="es-MX" altLang="es-MX" sz="1400" b="0" i="0" u="none" strike="noStrike" cap="none" normalizeH="0" baseline="0" dirty="0">
-                <a:ln>
-                  <a:noFill/>
-                </a:ln>
-                <a:solidFill>
-                  <a:schemeClr val="tx1"/>
-                </a:solidFill>
-                <a:effectLst/>
-                <a:latin typeface="Arial" panose="020B0604020202020204" pitchFamily="34" charset="0"/>
-                <a:ea typeface="Calibri" panose="020F0502020204030204" pitchFamily="34" charset="0"/>
-                <a:cs typeface="Arial" panose="020B0604020202020204" pitchFamily="34" charset="0"/>
-              </a:rPr>
-              <a:t>n es la 0, la direcci</a:t>
-            </a:r>
-            <a:r>
-              <a:rPr kumimoji="0" lang="es-MX" altLang="es-MX" sz="1400" b="0" i="0" u="none" strike="noStrike" cap="none" normalizeH="0" baseline="0" dirty="0">
-                <a:ln>
-                  <a:noFill/>
-                </a:ln>
-                <a:solidFill>
-                  <a:schemeClr val="tx1"/>
-                </a:solidFill>
-                <a:effectLst/>
-                <a:latin typeface="Calibri" panose="020F0502020204030204" pitchFamily="34" charset="0"/>
-                <a:ea typeface="Calibri" panose="020F0502020204030204" pitchFamily="34" charset="0"/>
-                <a:cs typeface="Arial" panose="020B0604020202020204" pitchFamily="34" charset="0"/>
-              </a:rPr>
-              <a:t>ó</a:t>
-            </a:r>
-            <a:r>
-              <a:rPr kumimoji="0" lang="es-MX" altLang="es-MX" sz="1400" b="0" i="0" u="none" strike="noStrike" cap="none" normalizeH="0" baseline="0" dirty="0">
-                <a:ln>
-                  <a:noFill/>
-                </a:ln>
-                <a:solidFill>
-                  <a:schemeClr val="tx1"/>
-                </a:solidFill>
-                <a:effectLst/>
-                <a:latin typeface="Arial" panose="020B0604020202020204" pitchFamily="34" charset="0"/>
-                <a:ea typeface="Calibri" panose="020F0502020204030204" pitchFamily="34" charset="0"/>
-                <a:cs typeface="Arial" panose="020B0604020202020204" pitchFamily="34" charset="0"/>
-              </a:rPr>
-              <a:t>n del banco de registros cuyo valor se va a guardar en la memoria de datos es la 8, el valor se va a guardar en la direcci</a:t>
-            </a:r>
-            <a:r>
-              <a:rPr kumimoji="0" lang="es-MX" altLang="es-MX" sz="1400" b="0" i="0" u="none" strike="noStrike" cap="none" normalizeH="0" baseline="0" dirty="0">
-                <a:ln>
-                  <a:noFill/>
-                </a:ln>
-                <a:solidFill>
-                  <a:schemeClr val="tx1"/>
-                </a:solidFill>
-                <a:effectLst/>
-                <a:latin typeface="Calibri" panose="020F0502020204030204" pitchFamily="34" charset="0"/>
-                <a:ea typeface="Calibri" panose="020F0502020204030204" pitchFamily="34" charset="0"/>
-                <a:cs typeface="Arial" panose="020B0604020202020204" pitchFamily="34" charset="0"/>
-              </a:rPr>
-              <a:t>ó</a:t>
-            </a:r>
-            <a:r>
-              <a:rPr kumimoji="0" lang="es-MX" altLang="es-MX" sz="1400" b="0" i="0" u="none" strike="noStrike" cap="none" normalizeH="0" baseline="0" dirty="0">
-                <a:ln>
-                  <a:noFill/>
-                </a:ln>
-                <a:solidFill>
-                  <a:schemeClr val="tx1"/>
-                </a:solidFill>
-                <a:effectLst/>
-                <a:latin typeface="Arial" panose="020B0604020202020204" pitchFamily="34" charset="0"/>
-                <a:ea typeface="Calibri" panose="020F0502020204030204" pitchFamily="34" charset="0"/>
-                <a:cs typeface="Arial" panose="020B0604020202020204" pitchFamily="34" charset="0"/>
-              </a:rPr>
-              <a:t>n 1.</a:t>
-            </a:r>
-            <a:endParaRPr kumimoji="0" lang="es-MX" altLang="es-MX" sz="2000" b="0" i="0" u="none" strike="noStrike" cap="none" normalizeH="0" baseline="0" dirty="0">
-              <a:ln>
-                <a:noFill/>
-              </a:ln>
-              <a:solidFill>
-                <a:schemeClr val="tx1"/>
-              </a:solidFill>
-              <a:effectLst/>
-              <a:latin typeface="Arial" panose="020B0604020202020204" pitchFamily="34" charset="0"/>
-            </a:endParaRPr>
+              <a:t>, se muestra en la figura 10, la dirección base también es la 0, la dirección del banco de registros cuyo valor se va a guardar en la memoria de datos es la 8, el valor se va a guardar en la dirección 1.</a:t>
+            </a:r>
           </a:p>
         </p:txBody>
       </p:sp>
     </p:spTree>
     <p:extLst>
       <p:ext uri="{BB962C8B-B14F-4D97-AF65-F5344CB8AC3E}">
-        <p14:creationId xmlns:p14="http://schemas.microsoft.com/office/powerpoint/2010/main" val="3599185815"/>
+        <p14:creationId xmlns:p14="http://schemas.microsoft.com/office/powerpoint/2010/main" xmlns="" val="3599185815"/>
       </p:ext>
     </p:extLst>
   </p:cSld>
@@ -9654,7 +8565,7 @@
           <p:cNvPr id="5122" name="Imagen 37" descr="Interfaz de usuario gráfica&#10;&#10;Descripción generada automáticamente">
             <a:extLst>
               <a:ext uri="{FF2B5EF4-FFF2-40B4-BE49-F238E27FC236}">
-                <a16:creationId xmlns:a16="http://schemas.microsoft.com/office/drawing/2014/main" id="{9AEAAB15-E270-4E40-A652-6A708AFB460B}"/>
+                <a16:creationId xmlns:a16="http://schemas.microsoft.com/office/drawing/2014/main" xmlns="" id="{9AEAAB15-E270-4E40-A652-6A708AFB460B}"/>
               </a:ext>
             </a:extLst>
           </p:cNvPr>
@@ -9667,7 +8578,7 @@
           <a:blip r:embed="rId2">
             <a:extLst>
               <a:ext uri="{28A0092B-C50C-407E-A947-70E740481C1C}">
-                <a14:useLocalDpi xmlns:a14="http://schemas.microsoft.com/office/drawing/2010/main" val="0"/>
+                <a14:useLocalDpi xmlns:a14="http://schemas.microsoft.com/office/drawing/2010/main" xmlns="" val="0"/>
               </a:ext>
             </a:extLst>
           </a:blip>
@@ -9687,7 +8598,7 @@
           <a:noFill/>
           <a:extLst>
             <a:ext uri="{909E8E84-426E-40DD-AFC4-6F175D3DCCD1}">
-              <a14:hiddenFill xmlns:a14="http://schemas.microsoft.com/office/drawing/2010/main">
+              <a14:hiddenFill xmlns:a14="http://schemas.microsoft.com/office/drawing/2010/main" xmlns="">
                 <a:solidFill>
                   <a:srgbClr val="FFFFFF"/>
                 </a:solidFill>
@@ -9701,7 +8612,7 @@
           <p:cNvPr id="5121" name="Imagen 38" descr="Interfaz de usuario gráfica, Texto, Aplicación&#10;&#10;Descripción generada automáticamente">
             <a:extLst>
               <a:ext uri="{FF2B5EF4-FFF2-40B4-BE49-F238E27FC236}">
-                <a16:creationId xmlns:a16="http://schemas.microsoft.com/office/drawing/2014/main" id="{2D032C1F-E317-4D1A-AF2E-8E90692257BC}"/>
+                <a16:creationId xmlns:a16="http://schemas.microsoft.com/office/drawing/2014/main" xmlns="" id="{2D032C1F-E317-4D1A-AF2E-8E90692257BC}"/>
               </a:ext>
             </a:extLst>
           </p:cNvPr>
@@ -9714,7 +8625,7 @@
           <a:blip r:embed="rId3">
             <a:extLst>
               <a:ext uri="{28A0092B-C50C-407E-A947-70E740481C1C}">
-                <a14:useLocalDpi xmlns:a14="http://schemas.microsoft.com/office/drawing/2010/main" val="0"/>
+                <a14:useLocalDpi xmlns:a14="http://schemas.microsoft.com/office/drawing/2010/main" xmlns="" val="0"/>
               </a:ext>
             </a:extLst>
           </a:blip>
@@ -9734,7 +8645,7 @@
           <a:noFill/>
           <a:extLst>
             <a:ext uri="{909E8E84-426E-40DD-AFC4-6F175D3DCCD1}">
-              <a14:hiddenFill xmlns:a14="http://schemas.microsoft.com/office/drawing/2010/main">
+              <a14:hiddenFill xmlns:a14="http://schemas.microsoft.com/office/drawing/2010/main" xmlns="">
                 <a:solidFill>
                   <a:srgbClr val="FFFFFF"/>
                 </a:solidFill>
@@ -9748,7 +8659,7 @@
           <p:cNvPr id="4" name="Rectangle 3">
             <a:extLst>
               <a:ext uri="{FF2B5EF4-FFF2-40B4-BE49-F238E27FC236}">
-                <a16:creationId xmlns:a16="http://schemas.microsoft.com/office/drawing/2014/main" id="{BDA8FED1-8D00-43B4-8AF2-716A9BF36784}"/>
+                <a16:creationId xmlns:a16="http://schemas.microsoft.com/office/drawing/2014/main" xmlns="" id="{BDA8FED1-8D00-43B4-8AF2-716A9BF36784}"/>
               </a:ext>
             </a:extLst>
           </p:cNvPr>
@@ -9772,14 +8683,14 @@
           <a:effectLst/>
           <a:extLst>
             <a:ext uri="{909E8E84-426E-40DD-AFC4-6F175D3DCCD1}">
-              <a14:hiddenFill xmlns:a14="http://schemas.microsoft.com/office/drawing/2010/main">
+              <a14:hiddenFill xmlns:a14="http://schemas.microsoft.com/office/drawing/2010/main" xmlns="">
                 <a:solidFill>
                   <a:schemeClr val="accent1"/>
                 </a:solidFill>
               </a14:hiddenFill>
             </a:ext>
             <a:ext uri="{91240B29-F687-4F45-9708-019B960494DF}">
-              <a14:hiddenLine xmlns:a14="http://schemas.microsoft.com/office/drawing/2010/main" w="9525">
+              <a14:hiddenLine xmlns:a14="http://schemas.microsoft.com/office/drawing/2010/main" xmlns="" w="9525">
                 <a:solidFill>
                   <a:schemeClr val="tx1"/>
                 </a:solidFill>
@@ -9789,7 +8700,7 @@
               </a14:hiddenLine>
             </a:ext>
             <a:ext uri="{AF507438-7753-43E0-B8FC-AC1667EBCBE1}">
-              <a14:hiddenEffects xmlns:a14="http://schemas.microsoft.com/office/drawing/2010/main">
+              <a14:hiddenEffects xmlns:a14="http://schemas.microsoft.com/office/drawing/2010/main" xmlns="">
                 <a:effectLst>
                   <a:outerShdw dist="35921" dir="2700000" algn="ctr" rotWithShape="0">
                     <a:schemeClr val="bg2"/>
@@ -9817,7 +8728,7 @@
           <p:cNvPr id="5" name="Rectangle 4">
             <a:extLst>
               <a:ext uri="{FF2B5EF4-FFF2-40B4-BE49-F238E27FC236}">
-                <a16:creationId xmlns:a16="http://schemas.microsoft.com/office/drawing/2014/main" id="{7996AFD1-6878-43E4-8FC9-A966E79814B5}"/>
+                <a16:creationId xmlns:a16="http://schemas.microsoft.com/office/drawing/2014/main" xmlns="" id="{7996AFD1-6878-43E4-8FC9-A966E79814B5}"/>
               </a:ext>
             </a:extLst>
           </p:cNvPr>
@@ -9841,14 +8752,14 @@
           <a:effectLst/>
           <a:extLst>
             <a:ext uri="{909E8E84-426E-40DD-AFC4-6F175D3DCCD1}">
-              <a14:hiddenFill xmlns:a14="http://schemas.microsoft.com/office/drawing/2010/main">
+              <a14:hiddenFill xmlns:a14="http://schemas.microsoft.com/office/drawing/2010/main" xmlns="">
                 <a:solidFill>
                   <a:schemeClr val="accent1"/>
                 </a:solidFill>
               </a14:hiddenFill>
             </a:ext>
             <a:ext uri="{91240B29-F687-4F45-9708-019B960494DF}">
-              <a14:hiddenLine xmlns:a14="http://schemas.microsoft.com/office/drawing/2010/main" w="9525">
+              <a14:hiddenLine xmlns:a14="http://schemas.microsoft.com/office/drawing/2010/main" xmlns="" w="9525">
                 <a:solidFill>
                   <a:schemeClr val="tx1"/>
                 </a:solidFill>
@@ -9858,7 +8769,7 @@
               </a14:hiddenLine>
             </a:ext>
             <a:ext uri="{AF507438-7753-43E0-B8FC-AC1667EBCBE1}">
-              <a14:hiddenEffects xmlns:a14="http://schemas.microsoft.com/office/drawing/2010/main">
+              <a14:hiddenEffects xmlns:a14="http://schemas.microsoft.com/office/drawing/2010/main" xmlns="">
                 <a:effectLst>
                   <a:outerShdw dist="35921" dir="2700000" algn="ctr" rotWithShape="0">
                     <a:schemeClr val="bg2"/>
@@ -9953,7 +8864,7 @@
           <p:cNvPr id="6" name="Rectangle 5">
             <a:extLst>
               <a:ext uri="{FF2B5EF4-FFF2-40B4-BE49-F238E27FC236}">
-                <a16:creationId xmlns:a16="http://schemas.microsoft.com/office/drawing/2014/main" id="{04FD3207-AA12-4E67-9552-4940934B80B8}"/>
+                <a16:creationId xmlns:a16="http://schemas.microsoft.com/office/drawing/2014/main" xmlns="" id="{04FD3207-AA12-4E67-9552-4940934B80B8}"/>
               </a:ext>
             </a:extLst>
           </p:cNvPr>
@@ -9964,8 +8875,8 @@
         </p:nvSpPr>
         <p:spPr bwMode="auto">
           <a:xfrm>
-            <a:off x="485775" y="3149867"/>
-            <a:ext cx="10568912" cy="1708160"/>
+            <a:off x="485775" y="3274562"/>
+            <a:ext cx="10568912" cy="2077492"/>
           </a:xfrm>
           <a:prstGeom prst="rect">
             <a:avLst/>
@@ -9977,14 +8888,14 @@
           <a:effectLst/>
           <a:extLst>
             <a:ext uri="{909E8E84-426E-40DD-AFC4-6F175D3DCCD1}">
-              <a14:hiddenFill xmlns:a14="http://schemas.microsoft.com/office/drawing/2010/main">
+              <a14:hiddenFill xmlns:a14="http://schemas.microsoft.com/office/drawing/2010/main" xmlns="">
                 <a:solidFill>
                   <a:schemeClr val="accent1"/>
                 </a:solidFill>
               </a14:hiddenFill>
             </a:ext>
             <a:ext uri="{91240B29-F687-4F45-9708-019B960494DF}">
-              <a14:hiddenLine xmlns:a14="http://schemas.microsoft.com/office/drawing/2010/main" w="9525">
+              <a14:hiddenLine xmlns:a14="http://schemas.microsoft.com/office/drawing/2010/main" xmlns="" w="9525">
                 <a:solidFill>
                   <a:schemeClr val="tx1"/>
                 </a:solidFill>
@@ -9994,7 +8905,7 @@
               </a14:hiddenLine>
             </a:ext>
             <a:ext uri="{AF507438-7753-43E0-B8FC-AC1667EBCBE1}">
-              <a14:hiddenEffects xmlns:a14="http://schemas.microsoft.com/office/drawing/2010/main">
+              <a14:hiddenEffects xmlns:a14="http://schemas.microsoft.com/office/drawing/2010/main" xmlns="">
                 <a:effectLst>
                   <a:outerShdw dist="35921" dir="2700000" algn="ctr" rotWithShape="0">
                     <a:schemeClr val="bg2"/>
@@ -10030,7 +8941,7 @@
               <a:tabLst/>
             </a:pPr>
             <a:r>
-              <a:rPr kumimoji="0" lang="es-MX" altLang="es-MX" sz="900" b="0" i="1" u="none" strike="noStrike" cap="none" normalizeH="0" baseline="0" dirty="0">
+              <a:rPr kumimoji="0" lang="es-MX" altLang="es-MX" sz="900" b="0" i="1" u="none" strike="noStrike" cap="none" normalizeH="0" baseline="0" dirty="0" smtClean="0">
                 <a:ln>
                   <a:noFill/>
                 </a:ln>
@@ -10044,15 +8955,6 @@
               </a:rPr>
               <a:t>Figura 12</a:t>
             </a:r>
-            <a:endParaRPr kumimoji="0" lang="es-MX" altLang="es-MX" sz="1100" b="0" i="0" u="none" strike="noStrike" cap="none" normalizeH="0" baseline="0" dirty="0">
-              <a:ln>
-                <a:noFill/>
-              </a:ln>
-              <a:solidFill>
-                <a:schemeClr val="tx1"/>
-              </a:solidFill>
-              <a:effectLst/>
-            </a:endParaRPr>
           </a:p>
           <a:p>
             <a:pPr marL="0" marR="0" lvl="0" indent="0" algn="just" defTabSz="914400" rtl="0" eaLnBrk="0" fontAlgn="base" latinLnBrk="0" hangingPunct="0">
@@ -10072,419 +8974,65 @@
               <a:tabLst/>
             </a:pPr>
             <a:r>
-              <a:rPr kumimoji="0" lang="es-MX" altLang="es-MX" sz="1600" b="0" i="0" u="none" strike="noStrike" cap="none" normalizeH="0" baseline="0" dirty="0">
-                <a:ln>
-                  <a:noFill/>
-                </a:ln>
-                <a:solidFill>
-                  <a:schemeClr val="tx1"/>
-                </a:solidFill>
-                <a:effectLst/>
-                <a:latin typeface="Arial" panose="020B0604020202020204" pitchFamily="34" charset="0"/>
+              <a:rPr lang="es-MX" altLang="es-MX" sz="2000" dirty="0" smtClean="0">
+                <a:latin typeface="Arial Narrow" panose="020B0606020202030204" pitchFamily="34" charset="0"/>
                 <a:ea typeface="Calibri" panose="020F0502020204030204" pitchFamily="34" charset="0"/>
                 <a:cs typeface="Arial" panose="020B0604020202020204" pitchFamily="34" charset="0"/>
               </a:rPr>
-              <a:t>La </a:t>
-            </a:r>
-            <a:r>
-              <a:rPr kumimoji="0" lang="es-MX" altLang="es-MX" sz="1600" b="0" i="0" u="none" strike="noStrike" cap="none" normalizeH="0" baseline="0" dirty="0">
-                <a:ln>
-                  <a:noFill/>
-                </a:ln>
-                <a:solidFill>
-                  <a:schemeClr val="tx1"/>
-                </a:solidFill>
-                <a:effectLst/>
-                <a:latin typeface="Calibri" panose="020F0502020204030204" pitchFamily="34" charset="0"/>
-                <a:ea typeface="Calibri" panose="020F0502020204030204" pitchFamily="34" charset="0"/>
-                <a:cs typeface="Arial" panose="020B0604020202020204" pitchFamily="34" charset="0"/>
-              </a:rPr>
-              <a:t>ú</a:t>
-            </a:r>
-            <a:r>
-              <a:rPr kumimoji="0" lang="es-MX" altLang="es-MX" sz="1600" b="0" i="0" u="none" strike="noStrike" cap="none" normalizeH="0" baseline="0" dirty="0">
-                <a:ln>
-                  <a:noFill/>
-                </a:ln>
-                <a:solidFill>
-                  <a:schemeClr val="tx1"/>
-                </a:solidFill>
-                <a:effectLst/>
-                <a:latin typeface="Arial" panose="020B0604020202020204" pitchFamily="34" charset="0"/>
-                <a:ea typeface="Calibri" panose="020F0502020204030204" pitchFamily="34" charset="0"/>
-                <a:cs typeface="Arial" panose="020B0604020202020204" pitchFamily="34" charset="0"/>
-              </a:rPr>
-              <a:t>ltima operaci</a:t>
-            </a:r>
-            <a:r>
-              <a:rPr kumimoji="0" lang="es-MX" altLang="es-MX" sz="1600" b="0" i="0" u="none" strike="noStrike" cap="none" normalizeH="0" baseline="0" dirty="0">
-                <a:ln>
-                  <a:noFill/>
-                </a:ln>
-                <a:solidFill>
-                  <a:schemeClr val="tx1"/>
-                </a:solidFill>
-                <a:effectLst/>
-                <a:latin typeface="Calibri" panose="020F0502020204030204" pitchFamily="34" charset="0"/>
-                <a:ea typeface="Calibri" panose="020F0502020204030204" pitchFamily="34" charset="0"/>
-                <a:cs typeface="Arial" panose="020B0604020202020204" pitchFamily="34" charset="0"/>
-              </a:rPr>
-              <a:t>ó</a:t>
-            </a:r>
-            <a:r>
-              <a:rPr kumimoji="0" lang="es-MX" altLang="es-MX" sz="1600" b="0" i="0" u="none" strike="noStrike" cap="none" normalizeH="0" baseline="0" dirty="0">
-                <a:ln>
-                  <a:noFill/>
-                </a:ln>
-                <a:solidFill>
-                  <a:schemeClr val="tx1"/>
-                </a:solidFill>
-                <a:effectLst/>
-                <a:latin typeface="Arial" panose="020B0604020202020204" pitchFamily="34" charset="0"/>
-                <a:ea typeface="Calibri" panose="020F0502020204030204" pitchFamily="34" charset="0"/>
-                <a:cs typeface="Arial" panose="020B0604020202020204" pitchFamily="34" charset="0"/>
-              </a:rPr>
-              <a:t>n es </a:t>
-            </a:r>
-            <a:r>
-              <a:rPr kumimoji="0" lang="es-MX" altLang="es-MX" sz="1600" b="0" i="0" u="none" strike="noStrike" cap="none" normalizeH="0" baseline="0" dirty="0" err="1">
-                <a:ln>
-                  <a:noFill/>
-                </a:ln>
-                <a:solidFill>
-                  <a:schemeClr val="tx1"/>
-                </a:solidFill>
-                <a:effectLst/>
-                <a:latin typeface="Arial" panose="020B0604020202020204" pitchFamily="34" charset="0"/>
+              <a:t>La última operación es </a:t>
+            </a:r>
+            <a:r>
+              <a:rPr lang="es-MX" altLang="es-MX" sz="2000" dirty="0" err="1" smtClean="0">
+                <a:latin typeface="Arial Narrow" panose="020B0606020202030204" pitchFamily="34" charset="0"/>
                 <a:ea typeface="Calibri" panose="020F0502020204030204" pitchFamily="34" charset="0"/>
                 <a:cs typeface="Arial" panose="020B0604020202020204" pitchFamily="34" charset="0"/>
               </a:rPr>
               <a:t>Beq</a:t>
             </a:r>
             <a:r>
-              <a:rPr kumimoji="0" lang="es-MX" altLang="es-MX" sz="1600" b="0" i="0" u="none" strike="noStrike" cap="none" normalizeH="0" baseline="0" dirty="0">
-                <a:ln>
-                  <a:noFill/>
-                </a:ln>
-                <a:solidFill>
-                  <a:schemeClr val="tx1"/>
-                </a:solidFill>
-                <a:effectLst/>
-                <a:latin typeface="Arial" panose="020B0604020202020204" pitchFamily="34" charset="0"/>
+              <a:rPr lang="es-MX" altLang="es-MX" sz="2000" dirty="0" smtClean="0">
+                <a:latin typeface="Arial Narrow" panose="020B0606020202030204" pitchFamily="34" charset="0"/>
                 <a:ea typeface="Calibri" panose="020F0502020204030204" pitchFamily="34" charset="0"/>
                 <a:cs typeface="Arial" panose="020B0604020202020204" pitchFamily="34" charset="0"/>
               </a:rPr>
-              <a:t>, en la figura 11 podemos ver que se realizaron todas las instrucciones que expliqu</a:t>
-            </a:r>
-            <a:r>
-              <a:rPr kumimoji="0" lang="es-MX" altLang="es-MX" sz="1600" b="0" i="0" u="none" strike="noStrike" cap="none" normalizeH="0" baseline="0" dirty="0">
-                <a:ln>
-                  <a:noFill/>
-                </a:ln>
-                <a:solidFill>
-                  <a:schemeClr val="tx1"/>
-                </a:solidFill>
-                <a:effectLst/>
-                <a:latin typeface="Calibri" panose="020F0502020204030204" pitchFamily="34" charset="0"/>
-                <a:ea typeface="Calibri" panose="020F0502020204030204" pitchFamily="34" charset="0"/>
-                <a:cs typeface="Arial" panose="020B0604020202020204" pitchFamily="34" charset="0"/>
-              </a:rPr>
-              <a:t>é</a:t>
-            </a:r>
-            <a:r>
-              <a:rPr kumimoji="0" lang="es-MX" altLang="es-MX" sz="1600" b="0" i="0" u="none" strike="noStrike" cap="none" normalizeH="0" baseline="0" dirty="0">
-                <a:ln>
-                  <a:noFill/>
-                </a:ln>
-                <a:solidFill>
-                  <a:schemeClr val="tx1"/>
-                </a:solidFill>
-                <a:effectLst/>
-                <a:latin typeface="Arial" panose="020B0604020202020204" pitchFamily="34" charset="0"/>
-                <a:ea typeface="Calibri" panose="020F0502020204030204" pitchFamily="34" charset="0"/>
-                <a:cs typeface="Arial" panose="020B0604020202020204" pitchFamily="34" charset="0"/>
-              </a:rPr>
-              <a:t> de forma secuencial, la primera instrucci</a:t>
-            </a:r>
-            <a:r>
-              <a:rPr kumimoji="0" lang="es-MX" altLang="es-MX" sz="1600" b="0" i="0" u="none" strike="noStrike" cap="none" normalizeH="0" baseline="0" dirty="0">
-                <a:ln>
-                  <a:noFill/>
-                </a:ln>
-                <a:solidFill>
-                  <a:schemeClr val="tx1"/>
-                </a:solidFill>
-                <a:effectLst/>
-                <a:latin typeface="Calibri" panose="020F0502020204030204" pitchFamily="34" charset="0"/>
-                <a:ea typeface="Calibri" panose="020F0502020204030204" pitchFamily="34" charset="0"/>
-                <a:cs typeface="Arial" panose="020B0604020202020204" pitchFamily="34" charset="0"/>
-              </a:rPr>
-              <a:t>ó</a:t>
-            </a:r>
-            <a:r>
-              <a:rPr kumimoji="0" lang="es-MX" altLang="es-MX" sz="1600" b="0" i="0" u="none" strike="noStrike" cap="none" normalizeH="0" baseline="0" dirty="0">
-                <a:ln>
-                  <a:noFill/>
-                </a:ln>
-                <a:solidFill>
-                  <a:schemeClr val="tx1"/>
-                </a:solidFill>
-                <a:effectLst/>
-                <a:latin typeface="Arial" panose="020B0604020202020204" pitchFamily="34" charset="0"/>
-                <a:ea typeface="Calibri" panose="020F0502020204030204" pitchFamily="34" charset="0"/>
-                <a:cs typeface="Arial" panose="020B0604020202020204" pitchFamily="34" charset="0"/>
-              </a:rPr>
-              <a:t>n que agregu</a:t>
-            </a:r>
-            <a:r>
-              <a:rPr kumimoji="0" lang="es-MX" altLang="es-MX" sz="1600" b="0" i="0" u="none" strike="noStrike" cap="none" normalizeH="0" baseline="0" dirty="0">
-                <a:ln>
-                  <a:noFill/>
-                </a:ln>
-                <a:solidFill>
-                  <a:schemeClr val="tx1"/>
-                </a:solidFill>
-                <a:effectLst/>
-                <a:latin typeface="Calibri" panose="020F0502020204030204" pitchFamily="34" charset="0"/>
-                <a:ea typeface="Calibri" panose="020F0502020204030204" pitchFamily="34" charset="0"/>
-                <a:cs typeface="Arial" panose="020B0604020202020204" pitchFamily="34" charset="0"/>
-              </a:rPr>
-              <a:t>é</a:t>
-            </a:r>
-            <a:r>
-              <a:rPr kumimoji="0" lang="es-MX" altLang="es-MX" sz="1600" b="0" i="0" u="none" strike="noStrike" cap="none" normalizeH="0" baseline="0" dirty="0">
-                <a:ln>
-                  <a:noFill/>
-                </a:ln>
-                <a:solidFill>
-                  <a:schemeClr val="tx1"/>
-                </a:solidFill>
-                <a:effectLst/>
-                <a:latin typeface="Arial" panose="020B0604020202020204" pitchFamily="34" charset="0"/>
-                <a:ea typeface="Calibri" panose="020F0502020204030204" pitchFamily="34" charset="0"/>
-                <a:cs typeface="Arial" panose="020B0604020202020204" pitchFamily="34" charset="0"/>
-              </a:rPr>
-              <a:t> en esta simulaci</a:t>
-            </a:r>
-            <a:r>
-              <a:rPr kumimoji="0" lang="es-MX" altLang="es-MX" sz="1600" b="0" i="0" u="none" strike="noStrike" cap="none" normalizeH="0" baseline="0" dirty="0">
-                <a:ln>
-                  <a:noFill/>
-                </a:ln>
-                <a:solidFill>
-                  <a:schemeClr val="tx1"/>
-                </a:solidFill>
-                <a:effectLst/>
-                <a:latin typeface="Calibri" panose="020F0502020204030204" pitchFamily="34" charset="0"/>
-                <a:ea typeface="Calibri" panose="020F0502020204030204" pitchFamily="34" charset="0"/>
-                <a:cs typeface="Arial" panose="020B0604020202020204" pitchFamily="34" charset="0"/>
-              </a:rPr>
-              <a:t>ó</a:t>
-            </a:r>
-            <a:r>
-              <a:rPr kumimoji="0" lang="es-MX" altLang="es-MX" sz="1600" b="0" i="0" u="none" strike="noStrike" cap="none" normalizeH="0" baseline="0" dirty="0">
-                <a:ln>
-                  <a:noFill/>
-                </a:ln>
-                <a:solidFill>
-                  <a:schemeClr val="tx1"/>
-                </a:solidFill>
-                <a:effectLst/>
-                <a:latin typeface="Arial" panose="020B0604020202020204" pitchFamily="34" charset="0"/>
-                <a:ea typeface="Calibri" panose="020F0502020204030204" pitchFamily="34" charset="0"/>
-                <a:cs typeface="Arial" panose="020B0604020202020204" pitchFamily="34" charset="0"/>
-              </a:rPr>
-              <a:t>n fue un </a:t>
-            </a:r>
-            <a:r>
-              <a:rPr kumimoji="0" lang="es-MX" altLang="es-MX" sz="1600" b="0" i="0" u="none" strike="noStrike" cap="none" normalizeH="0" baseline="0" dirty="0" err="1">
-                <a:ln>
-                  <a:noFill/>
-                </a:ln>
-                <a:solidFill>
-                  <a:schemeClr val="tx1"/>
-                </a:solidFill>
-                <a:effectLst/>
-                <a:latin typeface="Arial" panose="020B0604020202020204" pitchFamily="34" charset="0"/>
+              <a:t>, en la figura 11 podemos ver que se realizaron todas las instrucciones que expliqué de forma secuencial, la primera instrucción que agregué en esta simulación fue un </a:t>
+            </a:r>
+            <a:r>
+              <a:rPr lang="es-MX" altLang="es-MX" sz="2000" dirty="0" err="1" smtClean="0">
+                <a:latin typeface="Arial Narrow" panose="020B0606020202030204" pitchFamily="34" charset="0"/>
                 <a:ea typeface="Calibri" panose="020F0502020204030204" pitchFamily="34" charset="0"/>
                 <a:cs typeface="Arial" panose="020B0604020202020204" pitchFamily="34" charset="0"/>
               </a:rPr>
               <a:t>beq</a:t>
             </a:r>
             <a:r>
-              <a:rPr kumimoji="0" lang="es-MX" altLang="es-MX" sz="1600" b="0" i="0" u="none" strike="noStrike" cap="none" normalizeH="0" baseline="0" dirty="0">
-                <a:ln>
-                  <a:noFill/>
-                </a:ln>
-                <a:solidFill>
-                  <a:schemeClr val="tx1"/>
-                </a:solidFill>
-                <a:effectLst/>
-                <a:latin typeface="Arial" panose="020B0604020202020204" pitchFamily="34" charset="0"/>
+              <a:rPr lang="es-MX" altLang="es-MX" sz="2000" dirty="0" smtClean="0">
+                <a:latin typeface="Arial Narrow" panose="020B0606020202030204" pitchFamily="34" charset="0"/>
                 <a:ea typeface="Calibri" panose="020F0502020204030204" pitchFamily="34" charset="0"/>
                 <a:cs typeface="Arial" panose="020B0604020202020204" pitchFamily="34" charset="0"/>
               </a:rPr>
-              <a:t> que va a comparar el registro 0 con el 0 y como son iguales se va a saltar dos instrucciones, estas dos instrucciones que se va a saltar tendr</a:t>
-            </a:r>
-            <a:r>
-              <a:rPr kumimoji="0" lang="es-MX" altLang="es-MX" sz="1600" b="0" i="0" u="none" strike="noStrike" cap="none" normalizeH="0" baseline="0" dirty="0">
-                <a:ln>
-                  <a:noFill/>
-                </a:ln>
-                <a:solidFill>
-                  <a:schemeClr val="tx1"/>
-                </a:solidFill>
-                <a:effectLst/>
-                <a:latin typeface="Calibri" panose="020F0502020204030204" pitchFamily="34" charset="0"/>
-                <a:ea typeface="Calibri" panose="020F0502020204030204" pitchFamily="34" charset="0"/>
-                <a:cs typeface="Arial" panose="020B0604020202020204" pitchFamily="34" charset="0"/>
-              </a:rPr>
-              <a:t>í</a:t>
-            </a:r>
-            <a:r>
-              <a:rPr kumimoji="0" lang="es-MX" altLang="es-MX" sz="1600" b="0" i="0" u="none" strike="noStrike" cap="none" normalizeH="0" baseline="0" dirty="0">
-                <a:ln>
-                  <a:noFill/>
-                </a:ln>
-                <a:solidFill>
-                  <a:schemeClr val="tx1"/>
-                </a:solidFill>
-                <a:effectLst/>
-                <a:latin typeface="Arial" panose="020B0604020202020204" pitchFamily="34" charset="0"/>
-                <a:ea typeface="Calibri" panose="020F0502020204030204" pitchFamily="34" charset="0"/>
-                <a:cs typeface="Arial" panose="020B0604020202020204" pitchFamily="34" charset="0"/>
-              </a:rPr>
-              <a:t>an que almacenarse en las direcciones 1 y 2 (en caso de que no se saltaran) y como se puede ver en la figura, los datos en estas dos direcciones permanecen iguales que al principio. La figura 12 muestra la memoria de datos para comprobar que se realiz</a:t>
-            </a:r>
-            <a:r>
-              <a:rPr kumimoji="0" lang="es-MX" altLang="es-MX" sz="1600" b="0" i="0" u="none" strike="noStrike" cap="none" normalizeH="0" baseline="0" dirty="0">
-                <a:ln>
-                  <a:noFill/>
-                </a:ln>
-                <a:solidFill>
-                  <a:schemeClr val="tx1"/>
-                </a:solidFill>
-                <a:effectLst/>
-                <a:latin typeface="Calibri" panose="020F0502020204030204" pitchFamily="34" charset="0"/>
-                <a:ea typeface="Calibri" panose="020F0502020204030204" pitchFamily="34" charset="0"/>
-                <a:cs typeface="Arial" panose="020B0604020202020204" pitchFamily="34" charset="0"/>
-              </a:rPr>
-              <a:t>ó</a:t>
-            </a:r>
-            <a:r>
-              <a:rPr kumimoji="0" lang="es-MX" altLang="es-MX" sz="1600" b="0" i="0" u="none" strike="noStrike" cap="none" normalizeH="0" baseline="0" dirty="0">
-                <a:ln>
-                  <a:noFill/>
-                </a:ln>
-                <a:solidFill>
-                  <a:schemeClr val="tx1"/>
-                </a:solidFill>
-                <a:effectLst/>
-                <a:latin typeface="Arial" panose="020B0604020202020204" pitchFamily="34" charset="0"/>
-                <a:ea typeface="Calibri" panose="020F0502020204030204" pitchFamily="34" charset="0"/>
-                <a:cs typeface="Arial" panose="020B0604020202020204" pitchFamily="34" charset="0"/>
-              </a:rPr>
-              <a:t> tambi</a:t>
-            </a:r>
-            <a:r>
-              <a:rPr kumimoji="0" lang="es-MX" altLang="es-MX" sz="1600" b="0" i="0" u="none" strike="noStrike" cap="none" normalizeH="0" baseline="0" dirty="0">
-                <a:ln>
-                  <a:noFill/>
-                </a:ln>
-                <a:solidFill>
-                  <a:schemeClr val="tx1"/>
-                </a:solidFill>
-                <a:effectLst/>
-                <a:latin typeface="Calibri" panose="020F0502020204030204" pitchFamily="34" charset="0"/>
-                <a:ea typeface="Calibri" panose="020F0502020204030204" pitchFamily="34" charset="0"/>
-                <a:cs typeface="Arial" panose="020B0604020202020204" pitchFamily="34" charset="0"/>
-              </a:rPr>
-              <a:t>é</a:t>
-            </a:r>
-            <a:r>
-              <a:rPr kumimoji="0" lang="es-MX" altLang="es-MX" sz="1600" b="0" i="0" u="none" strike="noStrike" cap="none" normalizeH="0" baseline="0" dirty="0">
-                <a:ln>
-                  <a:noFill/>
-                </a:ln>
-                <a:solidFill>
-                  <a:schemeClr val="tx1"/>
-                </a:solidFill>
-                <a:effectLst/>
-                <a:latin typeface="Arial" panose="020B0604020202020204" pitchFamily="34" charset="0"/>
-                <a:ea typeface="Calibri" panose="020F0502020204030204" pitchFamily="34" charset="0"/>
-                <a:cs typeface="Arial" panose="020B0604020202020204" pitchFamily="34" charset="0"/>
-              </a:rPr>
-              <a:t>n la operaci</a:t>
-            </a:r>
-            <a:r>
-              <a:rPr kumimoji="0" lang="es-MX" altLang="es-MX" sz="1600" b="0" i="0" u="none" strike="noStrike" cap="none" normalizeH="0" baseline="0" dirty="0">
-                <a:ln>
-                  <a:noFill/>
-                </a:ln>
-                <a:solidFill>
-                  <a:schemeClr val="tx1"/>
-                </a:solidFill>
-                <a:effectLst/>
-                <a:latin typeface="Calibri" panose="020F0502020204030204" pitchFamily="34" charset="0"/>
-                <a:ea typeface="Calibri" panose="020F0502020204030204" pitchFamily="34" charset="0"/>
-                <a:cs typeface="Arial" panose="020B0604020202020204" pitchFamily="34" charset="0"/>
-              </a:rPr>
-              <a:t>ó</a:t>
-            </a:r>
-            <a:r>
-              <a:rPr kumimoji="0" lang="es-MX" altLang="es-MX" sz="1600" b="0" i="0" u="none" strike="noStrike" cap="none" normalizeH="0" baseline="0" dirty="0">
-                <a:ln>
-                  <a:noFill/>
-                </a:ln>
-                <a:solidFill>
-                  <a:schemeClr val="tx1"/>
-                </a:solidFill>
-                <a:effectLst/>
-                <a:latin typeface="Arial" panose="020B0604020202020204" pitchFamily="34" charset="0"/>
-                <a:ea typeface="Calibri" panose="020F0502020204030204" pitchFamily="34" charset="0"/>
-                <a:cs typeface="Arial" panose="020B0604020202020204" pitchFamily="34" charset="0"/>
-              </a:rPr>
-              <a:t>n </a:t>
-            </a:r>
-            <a:r>
-              <a:rPr kumimoji="0" lang="es-MX" altLang="es-MX" sz="1600" b="0" i="0" u="none" strike="noStrike" cap="none" normalizeH="0" baseline="0" dirty="0" err="1">
-                <a:ln>
-                  <a:noFill/>
-                </a:ln>
-                <a:solidFill>
-                  <a:schemeClr val="tx1"/>
-                </a:solidFill>
-                <a:effectLst/>
-                <a:latin typeface="Arial" panose="020B0604020202020204" pitchFamily="34" charset="0"/>
+              <a:t> que va a comparar el registro 0 con el 0 y como son iguales se va a saltar dos instrucciones, estas dos instrucciones que se va a saltar tendrían que almacenarse en las direcciones 1 y 2 (en caso de que no se saltaran) y como se puede ver en la figura, los datos en estas dos direcciones permanecen iguales que al principio. La figura 12 muestra la memoria de datos para comprobar que se realizó también la operación </a:t>
+            </a:r>
+            <a:r>
+              <a:rPr lang="es-MX" altLang="es-MX" sz="2000" dirty="0" err="1" smtClean="0">
+                <a:latin typeface="Arial Narrow" panose="020B0606020202030204" pitchFamily="34" charset="0"/>
                 <a:ea typeface="Calibri" panose="020F0502020204030204" pitchFamily="34" charset="0"/>
                 <a:cs typeface="Arial" panose="020B0604020202020204" pitchFamily="34" charset="0"/>
               </a:rPr>
               <a:t>sw</a:t>
             </a:r>
             <a:r>
-              <a:rPr kumimoji="0" lang="es-MX" altLang="es-MX" sz="1600" b="0" i="0" u="none" strike="noStrike" cap="none" normalizeH="0" baseline="0" dirty="0">
-                <a:ln>
-                  <a:noFill/>
-                </a:ln>
-                <a:solidFill>
-                  <a:schemeClr val="tx1"/>
-                </a:solidFill>
-                <a:effectLst/>
-                <a:latin typeface="Arial" panose="020B0604020202020204" pitchFamily="34" charset="0"/>
+              <a:rPr lang="es-MX" altLang="es-MX" sz="2000" dirty="0" smtClean="0">
+                <a:latin typeface="Arial Narrow" panose="020B0606020202030204" pitchFamily="34" charset="0"/>
                 <a:ea typeface="Calibri" panose="020F0502020204030204" pitchFamily="34" charset="0"/>
                 <a:cs typeface="Arial" panose="020B0604020202020204" pitchFamily="34" charset="0"/>
               </a:rPr>
               <a:t>.</a:t>
             </a:r>
-            <a:endParaRPr kumimoji="0" lang="es-MX" altLang="es-MX" sz="2400" b="0" i="0" u="none" strike="noStrike" cap="none" normalizeH="0" baseline="0" dirty="0">
-              <a:ln>
-                <a:noFill/>
-              </a:ln>
-              <a:solidFill>
-                <a:schemeClr val="tx1"/>
-              </a:solidFill>
-              <a:effectLst/>
-              <a:latin typeface="Arial" panose="020B0604020202020204" pitchFamily="34" charset="0"/>
+            <a:endParaRPr lang="es-MX" altLang="es-MX" sz="2000" dirty="0">
+              <a:latin typeface="Arial Narrow" panose="020B0606020202030204" pitchFamily="34" charset="0"/>
+              <a:ea typeface="Calibri" panose="020F0502020204030204" pitchFamily="34" charset="0"/>
+              <a:cs typeface="Arial" panose="020B0604020202020204" pitchFamily="34" charset="0"/>
             </a:endParaRPr>
           </a:p>
         </p:txBody>
@@ -10492,7 +9040,7 @@
     </p:spTree>
     <p:extLst>
       <p:ext uri="{BB962C8B-B14F-4D97-AF65-F5344CB8AC3E}">
-        <p14:creationId xmlns:p14="http://schemas.microsoft.com/office/powerpoint/2010/main" val="7508107"/>
+        <p14:creationId xmlns:p14="http://schemas.microsoft.com/office/powerpoint/2010/main" xmlns="" val="7508107"/>
       </p:ext>
     </p:extLst>
   </p:cSld>
@@ -10524,7 +9072,7 @@
           <p:cNvPr id="2" name="Título 1">
             <a:extLst>
               <a:ext uri="{FF2B5EF4-FFF2-40B4-BE49-F238E27FC236}">
-                <a16:creationId xmlns:a16="http://schemas.microsoft.com/office/drawing/2014/main" id="{76E16F4D-7031-4BC5-B2B3-0F1BD81D91E8}"/>
+                <a16:creationId xmlns:a16="http://schemas.microsoft.com/office/drawing/2014/main" xmlns="" id="{76E16F4D-7031-4BC5-B2B3-0F1BD81D91E8}"/>
               </a:ext>
             </a:extLst>
           </p:cNvPr>
@@ -10553,7 +9101,7 @@
           <p:cNvPr id="3" name="Marcador de contenido 2">
             <a:extLst>
               <a:ext uri="{FF2B5EF4-FFF2-40B4-BE49-F238E27FC236}">
-                <a16:creationId xmlns:a16="http://schemas.microsoft.com/office/drawing/2014/main" id="{3E74E6E2-770C-4500-B4CF-43AD9E31C070}"/>
+                <a16:creationId xmlns:a16="http://schemas.microsoft.com/office/drawing/2014/main" xmlns="" id="{3E74E6E2-770C-4500-B4CF-43AD9E31C070}"/>
               </a:ext>
             </a:extLst>
           </p:cNvPr>
@@ -10566,48 +9114,78 @@
         </p:nvSpPr>
         <p:spPr/>
         <p:txBody>
-          <a:bodyPr/>
+          <a:bodyPr>
+            <a:normAutofit/>
+          </a:bodyPr>
           <a:lstStyle/>
           <a:p>
             <a:r>
-              <a:rPr lang="es-ES" dirty="0"/>
+              <a:rPr lang="es-ES" sz="2400" dirty="0">
+                <a:latin typeface="Arial Narrow" panose="020B0606020202030204" pitchFamily="34" charset="0"/>
+                <a:ea typeface="Calibri" panose="020F0502020204030204" pitchFamily="34" charset="0"/>
+                <a:cs typeface="Arial" panose="020B0604020202020204" pitchFamily="34" charset="0"/>
+              </a:rPr>
               <a:t>REUNIONES: </a:t>
             </a:r>
           </a:p>
           <a:p>
             <a:r>
-              <a:rPr lang="es-ES" dirty="0"/>
+              <a:rPr lang="es-ES" sz="2400" dirty="0">
+                <a:latin typeface="Arial Narrow" panose="020B0606020202030204" pitchFamily="34" charset="0"/>
+                <a:ea typeface="Calibri" panose="020F0502020204030204" pitchFamily="34" charset="0"/>
+                <a:cs typeface="Arial" panose="020B0604020202020204" pitchFamily="34" charset="0"/>
+              </a:rPr>
               <a:t>Esta vez nos reunimos 2 veces, puesto que esta vez no se nos presentaron muchas complicaciones </a:t>
             </a:r>
           </a:p>
           <a:p>
             <a:r>
-              <a:rPr lang="es-ES" dirty="0"/>
+              <a:rPr lang="es-ES" sz="2400" dirty="0">
+                <a:latin typeface="Arial Narrow" panose="020B0606020202030204" pitchFamily="34" charset="0"/>
+                <a:ea typeface="Calibri" panose="020F0502020204030204" pitchFamily="34" charset="0"/>
+                <a:cs typeface="Arial" panose="020B0604020202020204" pitchFamily="34" charset="0"/>
+              </a:rPr>
               <a:t>1. 24/05/2021 </a:t>
             </a:r>
           </a:p>
           <a:p>
             <a:r>
-              <a:rPr lang="es-ES" dirty="0"/>
+              <a:rPr lang="es-ES" sz="2400" dirty="0">
+                <a:latin typeface="Arial Narrow" panose="020B0606020202030204" pitchFamily="34" charset="0"/>
+                <a:ea typeface="Calibri" panose="020F0502020204030204" pitchFamily="34" charset="0"/>
+                <a:cs typeface="Arial" panose="020B0604020202020204" pitchFamily="34" charset="0"/>
+              </a:rPr>
               <a:t>2. 1/06/2021</a:t>
             </a:r>
           </a:p>
           <a:p>
-            <a:endParaRPr lang="es-MX" dirty="0"/>
-          </a:p>
-          <a:p>
-            <a:r>
-              <a:rPr lang="es-MX" dirty="0"/>
+            <a:endParaRPr lang="es-MX" sz="2400" dirty="0">
+              <a:latin typeface="Arial Narrow" panose="020B0606020202030204" pitchFamily="34" charset="0"/>
+              <a:ea typeface="Calibri" panose="020F0502020204030204" pitchFamily="34" charset="0"/>
+              <a:cs typeface="Arial" panose="020B0604020202020204" pitchFamily="34" charset="0"/>
+            </a:endParaRPr>
+          </a:p>
+          <a:p>
+            <a:r>
+              <a:rPr lang="es-MX" sz="2400" dirty="0">
+                <a:latin typeface="Arial Narrow" panose="020B0606020202030204" pitchFamily="34" charset="0"/>
+                <a:ea typeface="Calibri" panose="020F0502020204030204" pitchFamily="34" charset="0"/>
+                <a:cs typeface="Arial" panose="020B0604020202020204" pitchFamily="34" charset="0"/>
+              </a:rPr>
               <a:t>Las cuales fueron para aclarar unas cuantas dudas y ponerse de acuerdo para lo que cada uno iba a realizar </a:t>
             </a:r>
-            <a:endParaRPr lang="es-ES" dirty="0"/>
+            <a:endParaRPr lang="es-ES" sz="2400" dirty="0">
+              <a:latin typeface="Arial Narrow" panose="020B0606020202030204" pitchFamily="34" charset="0"/>
+              <a:ea typeface="Calibri" panose="020F0502020204030204" pitchFamily="34" charset="0"/>
+              <a:cs typeface="Arial" panose="020B0604020202020204" pitchFamily="34" charset="0"/>
+            </a:endParaRPr>
           </a:p>
         </p:txBody>
       </p:sp>
     </p:spTree>
     <p:extLst>
       <p:ext uri="{BB962C8B-B14F-4D97-AF65-F5344CB8AC3E}">
-        <p14:creationId xmlns:p14="http://schemas.microsoft.com/office/powerpoint/2010/main" val="3147225269"/>
+        <p14:creationId xmlns:p14="http://schemas.microsoft.com/office/powerpoint/2010/main" xmlns="" val="3147225269"/>
       </p:ext>
     </p:extLst>
   </p:cSld>
@@ -10639,7 +9217,7 @@
           <p:cNvPr id="2" name="Título 1">
             <a:extLst>
               <a:ext uri="{FF2B5EF4-FFF2-40B4-BE49-F238E27FC236}">
-                <a16:creationId xmlns:a16="http://schemas.microsoft.com/office/drawing/2014/main" id="{79C65E6B-0E63-4713-A57C-4A8574BCC016}"/>
+                <a16:creationId xmlns:a16="http://schemas.microsoft.com/office/drawing/2014/main" xmlns="" id="{79C65E6B-0E63-4713-A57C-4A8574BCC016}"/>
               </a:ext>
             </a:extLst>
           </p:cNvPr>
@@ -10668,7 +9246,7 @@
           <p:cNvPr id="3" name="Marcador de contenido 2">
             <a:extLst>
               <a:ext uri="{FF2B5EF4-FFF2-40B4-BE49-F238E27FC236}">
-                <a16:creationId xmlns:a16="http://schemas.microsoft.com/office/drawing/2014/main" id="{B89EAE93-4EAF-4DC7-BB15-2E68623F7205}"/>
+                <a16:creationId xmlns:a16="http://schemas.microsoft.com/office/drawing/2014/main" xmlns="" id="{B89EAE93-4EAF-4DC7-BB15-2E68623F7205}"/>
               </a:ext>
             </a:extLst>
           </p:cNvPr>
@@ -10681,31 +9259,51 @@
         </p:nvSpPr>
         <p:spPr/>
         <p:txBody>
-          <a:bodyPr/>
+          <a:bodyPr>
+            <a:normAutofit/>
+          </a:bodyPr>
           <a:lstStyle/>
           <a:p>
-            <a:r>
-              <a:rPr lang="es-ES" dirty="0"/>
+            <a:pPr algn="just"/>
+            <a:r>
+              <a:rPr lang="es-ES" sz="2800" dirty="0">
+                <a:latin typeface="Arial Narrow" panose="020B0606020202030204" pitchFamily="34" charset="0"/>
+                <a:ea typeface="Calibri" panose="020F0502020204030204" pitchFamily="34" charset="0"/>
+                <a:cs typeface="Arial" panose="020B0604020202020204" pitchFamily="34" charset="0"/>
+              </a:rPr>
               <a:t>Para la siguiente y última fase trataremos de seguir con el mismo ritmo, y a medida de lo posible, ir incrementando el ritmo.</a:t>
             </a:r>
           </a:p>
           <a:p>
-            <a:r>
-              <a:rPr lang="es-ES" dirty="0"/>
+            <a:pPr algn="just"/>
+            <a:r>
+              <a:rPr lang="es-ES" sz="2800" dirty="0">
+                <a:latin typeface="Arial Narrow" panose="020B0606020202030204" pitchFamily="34" charset="0"/>
+                <a:ea typeface="Calibri" panose="020F0502020204030204" pitchFamily="34" charset="0"/>
+                <a:cs typeface="Arial" panose="020B0604020202020204" pitchFamily="34" charset="0"/>
+              </a:rPr>
               <a:t>No tenemos unos horarios definidos para reunirnos, pero siempre nos mantenemos en contacto por medio de WhatsApp y cuando surgen dudas, nos reunimos vía </a:t>
             </a:r>
             <a:r>
-              <a:rPr lang="es-ES" dirty="0" err="1"/>
+              <a:rPr lang="es-ES" sz="2800" dirty="0" err="1">
+                <a:latin typeface="Arial Narrow" panose="020B0606020202030204" pitchFamily="34" charset="0"/>
+                <a:ea typeface="Calibri" panose="020F0502020204030204" pitchFamily="34" charset="0"/>
+                <a:cs typeface="Arial" panose="020B0604020202020204" pitchFamily="34" charset="0"/>
+              </a:rPr>
               <a:t>Discord</a:t>
             </a:r>
-            <a:endParaRPr lang="es-MX" dirty="0"/>
+            <a:endParaRPr lang="es-MX" sz="2800" dirty="0">
+              <a:latin typeface="Arial Narrow" panose="020B0606020202030204" pitchFamily="34" charset="0"/>
+              <a:ea typeface="Calibri" panose="020F0502020204030204" pitchFamily="34" charset="0"/>
+              <a:cs typeface="Arial" panose="020B0604020202020204" pitchFamily="34" charset="0"/>
+            </a:endParaRPr>
           </a:p>
         </p:txBody>
       </p:sp>
     </p:spTree>
     <p:extLst>
       <p:ext uri="{BB962C8B-B14F-4D97-AF65-F5344CB8AC3E}">
-        <p14:creationId xmlns:p14="http://schemas.microsoft.com/office/powerpoint/2010/main" val="184325520"/>
+        <p14:creationId xmlns:p14="http://schemas.microsoft.com/office/powerpoint/2010/main" xmlns="" val="184325520"/>
       </p:ext>
     </p:extLst>
   </p:cSld>
@@ -10737,7 +9335,7 @@
           <p:cNvPr id="2" name="Título 1">
             <a:extLst>
               <a:ext uri="{FF2B5EF4-FFF2-40B4-BE49-F238E27FC236}">
-                <a16:creationId xmlns:a16="http://schemas.microsoft.com/office/drawing/2014/main" id="{AC892B3A-A44E-4335-89EC-D6DA518AEAEE}"/>
+                <a16:creationId xmlns:a16="http://schemas.microsoft.com/office/drawing/2014/main" xmlns="" id="{AC892B3A-A44E-4335-89EC-D6DA518AEAEE}"/>
               </a:ext>
             </a:extLst>
           </p:cNvPr>
@@ -10766,7 +9364,7 @@
           <p:cNvPr id="3" name="Marcador de contenido 2">
             <a:extLst>
               <a:ext uri="{FF2B5EF4-FFF2-40B4-BE49-F238E27FC236}">
-                <a16:creationId xmlns:a16="http://schemas.microsoft.com/office/drawing/2014/main" id="{239D3705-7FF2-4F02-80DC-779A46AA922D}"/>
+                <a16:creationId xmlns:a16="http://schemas.microsoft.com/office/drawing/2014/main" xmlns="" id="{239D3705-7FF2-4F02-80DC-779A46AA922D}"/>
               </a:ext>
             </a:extLst>
           </p:cNvPr>
@@ -10779,27 +9377,43 @@
         </p:nvSpPr>
         <p:spPr/>
         <p:txBody>
-          <a:bodyPr/>
+          <a:bodyPr>
+            <a:normAutofit/>
+          </a:bodyPr>
           <a:lstStyle/>
           <a:p>
-            <a:r>
-              <a:rPr lang="es-ES" dirty="0"/>
+            <a:pPr algn="just"/>
+            <a:r>
+              <a:rPr lang="es-ES" sz="2800" dirty="0">
+                <a:latin typeface="Arial Narrow" panose="020B0606020202030204" pitchFamily="34" charset="0"/>
+                <a:ea typeface="Calibri" panose="020F0502020204030204" pitchFamily="34" charset="0"/>
+                <a:cs typeface="Arial" panose="020B0604020202020204" pitchFamily="34" charset="0"/>
+              </a:rPr>
               <a:t>Debido a que la propuesta de la fórmula general resultó un tanto complicada, hemos pensado ahora en la fórmula de un binomio al cuadrado la cual es (a + b)^2 = a^2 + 2ab + b^2.</a:t>
             </a:r>
           </a:p>
           <a:p>
-            <a:r>
-              <a:rPr lang="es-ES" dirty="0"/>
+            <a:pPr algn="just"/>
+            <a:r>
+              <a:rPr lang="es-ES" sz="2800" dirty="0">
+                <a:latin typeface="Arial Narrow" panose="020B0606020202030204" pitchFamily="34" charset="0"/>
+                <a:ea typeface="Calibri" panose="020F0502020204030204" pitchFamily="34" charset="0"/>
+                <a:cs typeface="Arial" panose="020B0604020202020204" pitchFamily="34" charset="0"/>
+              </a:rPr>
               <a:t>A nuestro parecer, nos es posible realizar este programa. </a:t>
             </a:r>
-            <a:endParaRPr lang="es-MX" dirty="0"/>
+            <a:endParaRPr lang="es-MX" sz="2800" dirty="0">
+              <a:latin typeface="Arial Narrow" panose="020B0606020202030204" pitchFamily="34" charset="0"/>
+              <a:ea typeface="Calibri" panose="020F0502020204030204" pitchFamily="34" charset="0"/>
+              <a:cs typeface="Arial" panose="020B0604020202020204" pitchFamily="34" charset="0"/>
+            </a:endParaRPr>
           </a:p>
         </p:txBody>
       </p:sp>
     </p:spTree>
     <p:extLst>
       <p:ext uri="{BB962C8B-B14F-4D97-AF65-F5344CB8AC3E}">
-        <p14:creationId xmlns:p14="http://schemas.microsoft.com/office/powerpoint/2010/main" val="4086423866"/>
+        <p14:creationId xmlns:p14="http://schemas.microsoft.com/office/powerpoint/2010/main" xmlns="" val="4086423866"/>
       </p:ext>
     </p:extLst>
   </p:cSld>
@@ -10831,7 +9445,7 @@
           <p:cNvPr id="2" name="Título 1">
             <a:extLst>
               <a:ext uri="{FF2B5EF4-FFF2-40B4-BE49-F238E27FC236}">
-                <a16:creationId xmlns:a16="http://schemas.microsoft.com/office/drawing/2014/main" id="{5C375C11-29DC-4029-BB3E-23F825BAECEC}"/>
+                <a16:creationId xmlns:a16="http://schemas.microsoft.com/office/drawing/2014/main" xmlns="" id="{5C375C11-29DC-4029-BB3E-23F825BAECEC}"/>
               </a:ext>
             </a:extLst>
           </p:cNvPr>
@@ -10860,7 +9474,7 @@
           <p:cNvPr id="3" name="Marcador de contenido 2">
             <a:extLst>
               <a:ext uri="{FF2B5EF4-FFF2-40B4-BE49-F238E27FC236}">
-                <a16:creationId xmlns:a16="http://schemas.microsoft.com/office/drawing/2014/main" id="{735E7B92-C020-44A4-96DB-3BB354D160D8}"/>
+                <a16:creationId xmlns:a16="http://schemas.microsoft.com/office/drawing/2014/main" xmlns="" id="{735E7B92-C020-44A4-96DB-3BB354D160D8}"/>
               </a:ext>
             </a:extLst>
           </p:cNvPr>
@@ -10871,9 +9485,16 @@
             <p:ph idx="1"/>
           </p:nvPr>
         </p:nvSpPr>
-        <p:spPr/>
-        <p:txBody>
-          <a:bodyPr/>
+        <p:spPr>
+          <a:xfrm>
+            <a:off x="685800" y="2161309"/>
+            <a:ext cx="10820400" cy="4057376"/>
+          </a:xfrm>
+        </p:spPr>
+        <p:txBody>
+          <a:bodyPr>
+            <a:noAutofit/>
+          </a:bodyPr>
           <a:lstStyle/>
           <a:p>
             <a:pPr algn="just">
@@ -10885,7 +9506,7 @@
               </a:spcAft>
             </a:pPr>
             <a:r>
-              <a:rPr lang="es-MX" sz="1800" dirty="0">
+              <a:rPr lang="es-MX" sz="2000" dirty="0">
                 <a:effectLst/>
                 <a:latin typeface="Arial Narrow" panose="020B0606020202030204" pitchFamily="34" charset="0"/>
                 <a:ea typeface="Calibri" panose="020F0502020204030204" pitchFamily="34" charset="0"/>
@@ -10893,7 +9514,7 @@
               </a:rPr>
               <a:t>La realización de esta tarea fue algo compleja y complicada, en especial por el hecho de tener el tiempo contado al tener el atraso de la fase anterior, ya que se necesitaba complementar y lograr funcionar el código al 100%, no fue sencillo ni complejo, ya que todos tenemos una idea base de lo que se necesita realizar en cada uno de los módulos, pero al mismo tiempo, el plasmar las ideas es un tema complicado. (Félix Eduardo) </a:t>
             </a:r>
-            <a:endParaRPr lang="es-MX" sz="1800" dirty="0">
+            <a:endParaRPr lang="es-MX" sz="2000" dirty="0">
               <a:effectLst/>
               <a:latin typeface="Calibri" panose="020F0502020204030204" pitchFamily="34" charset="0"/>
               <a:ea typeface="Calibri" panose="020F0502020204030204" pitchFamily="34" charset="0"/>
@@ -10910,7 +9531,7 @@
               </a:spcAft>
             </a:pPr>
             <a:r>
-              <a:rPr lang="es-MX" sz="1800" dirty="0">
+              <a:rPr lang="es-MX" sz="2000" dirty="0">
                 <a:effectLst/>
                 <a:latin typeface="Arial Narrow" panose="020B0606020202030204" pitchFamily="34" charset="0"/>
                 <a:ea typeface="Calibri" panose="020F0502020204030204" pitchFamily="34" charset="0"/>
@@ -10918,7 +9539,7 @@
               </a:rPr>
               <a:t>Al terminar la fase 1, no se perdió el tiempo y directamente se comenzó a realizar la implementación de la fase 2, la cual en opinión personal fue de las más complicadas, ya que a diferencia de la fase 1 se necesitaba realizar la implementación de mayor cantidad de módulos, la mayoría de las de los errores que se encontraron en el desarrollo de este proyecto fueron al momento de realizar las interconexiones de los módulos, fue un gran reto, pero al final se logró terminar con buenos resultados. Dejando mucho aprendizaje del mismo. (Juan José)</a:t>
             </a:r>
-            <a:endParaRPr lang="es-MX" sz="1800" dirty="0">
+            <a:endParaRPr lang="es-MX" sz="2000" dirty="0">
               <a:effectLst/>
               <a:latin typeface="Calibri" panose="020F0502020204030204" pitchFamily="34" charset="0"/>
               <a:ea typeface="Calibri" panose="020F0502020204030204" pitchFamily="34" charset="0"/>
@@ -10926,14 +9547,14 @@
             </a:endParaRPr>
           </a:p>
           <a:p>
-            <a:endParaRPr lang="es-MX" dirty="0"/>
+            <a:endParaRPr lang="es-MX" sz="2400" dirty="0"/>
           </a:p>
         </p:txBody>
       </p:sp>
     </p:spTree>
     <p:extLst>
       <p:ext uri="{BB962C8B-B14F-4D97-AF65-F5344CB8AC3E}">
-        <p14:creationId xmlns:p14="http://schemas.microsoft.com/office/powerpoint/2010/main" val="1632425612"/>
+        <p14:creationId xmlns:p14="http://schemas.microsoft.com/office/powerpoint/2010/main" xmlns="" val="1632425612"/>
       </p:ext>
     </p:extLst>
   </p:cSld>
@@ -10965,7 +9586,7 @@
           <p:cNvPr id="3" name="Marcador de contenido 2">
             <a:extLst>
               <a:ext uri="{FF2B5EF4-FFF2-40B4-BE49-F238E27FC236}">
-                <a16:creationId xmlns:a16="http://schemas.microsoft.com/office/drawing/2014/main" id="{97AD9F96-50CF-4415-B868-E75EABC6B616}"/>
+                <a16:creationId xmlns:a16="http://schemas.microsoft.com/office/drawing/2014/main" xmlns="" id="{97AD9F96-50CF-4415-B868-E75EABC6B616}"/>
               </a:ext>
             </a:extLst>
           </p:cNvPr>
@@ -10983,21 +9604,31 @@
           </a:xfrm>
         </p:spPr>
         <p:txBody>
-          <a:bodyPr/>
+          <a:bodyPr>
+            <a:normAutofit/>
+          </a:bodyPr>
           <a:lstStyle/>
           <a:p>
             <a:r>
-              <a:rPr lang="es-ES" dirty="0"/>
+              <a:rPr lang="es-ES" sz="2400" dirty="0">
+                <a:latin typeface="Arial Narrow" panose="020B0606020202030204" pitchFamily="34" charset="0"/>
+                <a:ea typeface="Calibri" panose="020F0502020204030204" pitchFamily="34" charset="0"/>
+                <a:cs typeface="Arial" panose="020B0604020202020204" pitchFamily="34" charset="0"/>
+              </a:rPr>
               <a:t>Esta última fácil en mi opinión fue un poco más llevadera, aunque con las dificultades de no haber tenido la fase 1 concretada, supimos sacarla adelante e inmediatamente comenzar con la fase 2, para esta fase no fueron necesarias tantas reuniones como la fase anterior, ya que cada uno ya sabía bien lo que se tenía que hacer y fue más sencillo concretar la fase 2. El código resultó en cierta parte lo más complicado porque se tuvieron que implementar un mayor número de módulos. (Carlos Arturo)</a:t>
             </a:r>
-            <a:endParaRPr lang="es-MX" dirty="0"/>
+            <a:endParaRPr lang="es-MX" sz="2400" dirty="0">
+              <a:latin typeface="Arial Narrow" panose="020B0606020202030204" pitchFamily="34" charset="0"/>
+              <a:ea typeface="Calibri" panose="020F0502020204030204" pitchFamily="34" charset="0"/>
+              <a:cs typeface="Arial" panose="020B0604020202020204" pitchFamily="34" charset="0"/>
+            </a:endParaRPr>
           </a:p>
         </p:txBody>
       </p:sp>
     </p:spTree>
     <p:extLst>
       <p:ext uri="{BB962C8B-B14F-4D97-AF65-F5344CB8AC3E}">
-        <p14:creationId xmlns:p14="http://schemas.microsoft.com/office/powerpoint/2010/main" val="2832035130"/>
+        <p14:creationId xmlns:p14="http://schemas.microsoft.com/office/powerpoint/2010/main" xmlns="" val="2832035130"/>
       </p:ext>
     </p:extLst>
   </p:cSld>
@@ -11029,7 +9660,7 @@
           <p:cNvPr id="2" name="Título 1">
             <a:extLst>
               <a:ext uri="{FF2B5EF4-FFF2-40B4-BE49-F238E27FC236}">
-                <a16:creationId xmlns:a16="http://schemas.microsoft.com/office/drawing/2014/main" id="{E9702F7B-5A8D-4C12-B137-71A6D3681059}"/>
+                <a16:creationId xmlns:a16="http://schemas.microsoft.com/office/drawing/2014/main" xmlns="" id="{E9702F7B-5A8D-4C12-B137-71A6D3681059}"/>
               </a:ext>
             </a:extLst>
           </p:cNvPr>
@@ -11063,7 +9694,7 @@
           <p:cNvPr id="8" name="Marcador de contenido 7">
             <a:extLst>
               <a:ext uri="{FF2B5EF4-FFF2-40B4-BE49-F238E27FC236}">
-                <a16:creationId xmlns:a16="http://schemas.microsoft.com/office/drawing/2014/main" id="{3DF8702A-7AB1-4D39-A6DC-0AD7421F7BCB}"/>
+                <a16:creationId xmlns:a16="http://schemas.microsoft.com/office/drawing/2014/main" xmlns="" id="{3DF8702A-7AB1-4D39-A6DC-0AD7421F7BCB}"/>
               </a:ext>
             </a:extLst>
           </p:cNvPr>
@@ -11090,7 +9721,7 @@
     </p:spTree>
     <p:extLst>
       <p:ext uri="{BB962C8B-B14F-4D97-AF65-F5344CB8AC3E}">
-        <p14:creationId xmlns:p14="http://schemas.microsoft.com/office/powerpoint/2010/main" val="3084266389"/>
+        <p14:creationId xmlns:p14="http://schemas.microsoft.com/office/powerpoint/2010/main" xmlns="" val="3084266389"/>
       </p:ext>
     </p:extLst>
   </p:cSld>
@@ -11122,7 +9753,7 @@
           <p:cNvPr id="5" name="Imagen 4">
             <a:extLst>
               <a:ext uri="{FF2B5EF4-FFF2-40B4-BE49-F238E27FC236}">
-                <a16:creationId xmlns:a16="http://schemas.microsoft.com/office/drawing/2014/main" id="{BDCCBE73-5868-45DE-B8D8-693CD7DF75FF}"/>
+                <a16:creationId xmlns:a16="http://schemas.microsoft.com/office/drawing/2014/main" xmlns="" id="{BDCCBE73-5868-45DE-B8D8-693CD7DF75FF}"/>
               </a:ext>
             </a:extLst>
           </p:cNvPr>
@@ -11150,7 +9781,7 @@
     </p:spTree>
     <p:extLst>
       <p:ext uri="{BB962C8B-B14F-4D97-AF65-F5344CB8AC3E}">
-        <p14:creationId xmlns:p14="http://schemas.microsoft.com/office/powerpoint/2010/main" val="1904192547"/>
+        <p14:creationId xmlns:p14="http://schemas.microsoft.com/office/powerpoint/2010/main" xmlns="" val="1904192547"/>
       </p:ext>
     </p:extLst>
   </p:cSld>
@@ -11182,7 +9813,7 @@
           <p:cNvPr id="2" name="Título 1">
             <a:extLst>
               <a:ext uri="{FF2B5EF4-FFF2-40B4-BE49-F238E27FC236}">
-                <a16:creationId xmlns:a16="http://schemas.microsoft.com/office/drawing/2014/main" id="{5C65487D-C3F1-4413-8E68-ECF83E81D7BD}"/>
+                <a16:creationId xmlns:a16="http://schemas.microsoft.com/office/drawing/2014/main" xmlns="" id="{5C65487D-C3F1-4413-8E68-ECF83E81D7BD}"/>
               </a:ext>
             </a:extLst>
           </p:cNvPr>
@@ -11211,7 +9842,7 @@
           <p:cNvPr id="3" name="Marcador de contenido 2">
             <a:extLst>
               <a:ext uri="{FF2B5EF4-FFF2-40B4-BE49-F238E27FC236}">
-                <a16:creationId xmlns:a16="http://schemas.microsoft.com/office/drawing/2014/main" id="{3D0C1DD6-EA89-416A-A050-88661CC69E6A}"/>
+                <a16:creationId xmlns:a16="http://schemas.microsoft.com/office/drawing/2014/main" xmlns="" id="{3D0C1DD6-EA89-416A-A050-88661CC69E6A}"/>
               </a:ext>
             </a:extLst>
           </p:cNvPr>
@@ -11319,7 +9950,7 @@
     </p:spTree>
     <p:extLst>
       <p:ext uri="{BB962C8B-B14F-4D97-AF65-F5344CB8AC3E}">
-        <p14:creationId xmlns:p14="http://schemas.microsoft.com/office/powerpoint/2010/main" val="1016262567"/>
+        <p14:creationId xmlns:p14="http://schemas.microsoft.com/office/powerpoint/2010/main" xmlns="" val="1016262567"/>
       </p:ext>
     </p:extLst>
   </p:cSld>
@@ -11351,7 +9982,7 @@
           <p:cNvPr id="2" name="Título 1">
             <a:extLst>
               <a:ext uri="{FF2B5EF4-FFF2-40B4-BE49-F238E27FC236}">
-                <a16:creationId xmlns:a16="http://schemas.microsoft.com/office/drawing/2014/main" id="{9E9E4768-9956-4F8D-A404-6A929E9C77DF}"/>
+                <a16:creationId xmlns:a16="http://schemas.microsoft.com/office/drawing/2014/main" xmlns="" id="{9E9E4768-9956-4F8D-A404-6A929E9C77DF}"/>
               </a:ext>
             </a:extLst>
           </p:cNvPr>
@@ -11380,7 +10011,7 @@
           <p:cNvPr id="3" name="Marcador de contenido 2">
             <a:extLst>
               <a:ext uri="{FF2B5EF4-FFF2-40B4-BE49-F238E27FC236}">
-                <a16:creationId xmlns:a16="http://schemas.microsoft.com/office/drawing/2014/main" id="{EA2FD5A3-002E-48AE-A2A6-1332C20DCF9A}"/>
+                <a16:creationId xmlns:a16="http://schemas.microsoft.com/office/drawing/2014/main" xmlns="" id="{EA2FD5A3-002E-48AE-A2A6-1332C20DCF9A}"/>
               </a:ext>
             </a:extLst>
           </p:cNvPr>
@@ -11729,7 +10360,7 @@
     </p:spTree>
     <p:extLst>
       <p:ext uri="{BB962C8B-B14F-4D97-AF65-F5344CB8AC3E}">
-        <p14:creationId xmlns:p14="http://schemas.microsoft.com/office/powerpoint/2010/main" val="2859262119"/>
+        <p14:creationId xmlns:p14="http://schemas.microsoft.com/office/powerpoint/2010/main" xmlns="" val="2859262119"/>
       </p:ext>
     </p:extLst>
   </p:cSld>
@@ -11761,7 +10392,7 @@
           <p:cNvPr id="4" name="Marcador de contenido 3">
             <a:extLst>
               <a:ext uri="{FF2B5EF4-FFF2-40B4-BE49-F238E27FC236}">
-                <a16:creationId xmlns:a16="http://schemas.microsoft.com/office/drawing/2014/main" id="{5B67B277-7742-4E4E-A166-2CB0065EC355}"/>
+                <a16:creationId xmlns:a16="http://schemas.microsoft.com/office/drawing/2014/main" xmlns="" id="{5B67B277-7742-4E4E-A166-2CB0065EC355}"/>
               </a:ext>
             </a:extLst>
           </p:cNvPr>
@@ -11799,7 +10430,7 @@
     </p:spTree>
     <p:extLst>
       <p:ext uri="{BB962C8B-B14F-4D97-AF65-F5344CB8AC3E}">
-        <p14:creationId xmlns:p14="http://schemas.microsoft.com/office/powerpoint/2010/main" val="3691672773"/>
+        <p14:creationId xmlns:p14="http://schemas.microsoft.com/office/powerpoint/2010/main" xmlns="" val="3691672773"/>
       </p:ext>
     </p:extLst>
   </p:cSld>
@@ -11831,7 +10462,7 @@
           <p:cNvPr id="2" name="Título 1">
             <a:extLst>
               <a:ext uri="{FF2B5EF4-FFF2-40B4-BE49-F238E27FC236}">
-                <a16:creationId xmlns:a16="http://schemas.microsoft.com/office/drawing/2014/main" id="{C51DAB77-07A6-444E-99DF-FCB3576E9C0A}"/>
+                <a16:creationId xmlns:a16="http://schemas.microsoft.com/office/drawing/2014/main" xmlns="" id="{C51DAB77-07A6-444E-99DF-FCB3576E9C0A}"/>
               </a:ext>
             </a:extLst>
           </p:cNvPr>
@@ -11860,7 +10491,7 @@
           <p:cNvPr id="3" name="Marcador de contenido 2">
             <a:extLst>
               <a:ext uri="{FF2B5EF4-FFF2-40B4-BE49-F238E27FC236}">
-                <a16:creationId xmlns:a16="http://schemas.microsoft.com/office/drawing/2014/main" id="{7ED9C0E8-6299-45DD-9A98-F39FAA3500A9}"/>
+                <a16:creationId xmlns:a16="http://schemas.microsoft.com/office/drawing/2014/main" xmlns="" id="{7ED9C0E8-6299-45DD-9A98-F39FAA3500A9}"/>
               </a:ext>
             </a:extLst>
           </p:cNvPr>
@@ -11898,7 +10529,7 @@
           <p:cNvPr id="4" name="Tabla 3">
             <a:extLst>
               <a:ext uri="{FF2B5EF4-FFF2-40B4-BE49-F238E27FC236}">
-                <a16:creationId xmlns:a16="http://schemas.microsoft.com/office/drawing/2014/main" id="{193451C6-6970-4F97-842B-C50D028E128E}"/>
+                <a16:creationId xmlns:a16="http://schemas.microsoft.com/office/drawing/2014/main" xmlns="" id="{193451C6-6970-4F97-842B-C50D028E128E}"/>
               </a:ext>
             </a:extLst>
           </p:cNvPr>
@@ -11908,14 +10539,14 @@
           <p:nvPr>
             <p:extLst>
               <p:ext uri="{D42A27DB-BD31-4B8C-83A1-F6EECF244321}">
-                <p14:modId xmlns:p14="http://schemas.microsoft.com/office/powerpoint/2010/main" val="3673278772"/>
+                <p14:modId xmlns:p14="http://schemas.microsoft.com/office/powerpoint/2010/main" xmlns="" val="3673278772"/>
               </p:ext>
             </p:extLst>
           </p:nvPr>
         </p:nvGraphicFramePr>
         <p:xfrm>
           <a:off x="3665224" y="2330259"/>
-          <a:ext cx="3005455" cy="1376493"/>
+          <a:ext cx="3005455" cy="1472184"/>
         </p:xfrm>
         <a:graphic>
           <a:graphicData uri="http://schemas.openxmlformats.org/drawingml/2006/table">
@@ -11927,21 +10558,21 @@
                 <a:gridCol w="1011555">
                   <a:extLst>
                     <a:ext uri="{9D8B030D-6E8A-4147-A177-3AD203B41FA5}">
-                      <a16:colId xmlns:a16="http://schemas.microsoft.com/office/drawing/2014/main" val="2352958225"/>
+                      <a16:colId xmlns:a16="http://schemas.microsoft.com/office/drawing/2014/main" xmlns="" val="2352958225"/>
                     </a:ext>
                   </a:extLst>
                 </a:gridCol>
                 <a:gridCol w="824230">
                   <a:extLst>
                     <a:ext uri="{9D8B030D-6E8A-4147-A177-3AD203B41FA5}">
-                      <a16:colId xmlns:a16="http://schemas.microsoft.com/office/drawing/2014/main" val="3457738305"/>
+                      <a16:colId xmlns:a16="http://schemas.microsoft.com/office/drawing/2014/main" xmlns="" val="3457738305"/>
                     </a:ext>
                   </a:extLst>
                 </a:gridCol>
                 <a:gridCol w="1169670">
                   <a:extLst>
                     <a:ext uri="{9D8B030D-6E8A-4147-A177-3AD203B41FA5}">
-                      <a16:colId xmlns:a16="http://schemas.microsoft.com/office/drawing/2014/main" val="1363658803"/>
+                      <a16:colId xmlns:a16="http://schemas.microsoft.com/office/drawing/2014/main" xmlns="" val="1363658803"/>
                     </a:ext>
                   </a:extLst>
                 </a:gridCol>
@@ -11961,12 +10592,12 @@
                         </a:spcAft>
                       </a:pPr>
                       <a:r>
-                        <a:rPr lang="es-MX" sz="1200">
+                        <a:rPr lang="es-MX" sz="1200" dirty="0">
                           <a:effectLst/>
                         </a:rPr>
                         <a:t>Registro</a:t>
                       </a:r>
-                      <a:endParaRPr lang="es-MX" sz="1100">
+                      <a:endParaRPr lang="es-MX" sz="1100" dirty="0">
                         <a:effectLst/>
                         <a:latin typeface="Calibri" panose="020F0502020204030204" pitchFamily="34" charset="0"/>
                         <a:ea typeface="Calibri" panose="020F0502020204030204" pitchFamily="34" charset="0"/>
@@ -12036,7 +10667,7 @@
                 </a:tc>
                 <a:extLst>
                   <a:ext uri="{0D108BD9-81ED-4DB2-BD59-A6C34878D82A}">
-                    <a16:rowId xmlns:a16="http://schemas.microsoft.com/office/drawing/2014/main" val="1927795054"/>
+                    <a16:rowId xmlns:a16="http://schemas.microsoft.com/office/drawing/2014/main" xmlns="" val="1927795054"/>
                   </a:ext>
                 </a:extLst>
               </a:tr>
@@ -12055,12 +10686,12 @@
                         </a:spcAft>
                       </a:pPr>
                       <a:r>
-                        <a:rPr lang="es-MX" sz="1200">
+                        <a:rPr lang="es-MX" sz="1200" dirty="0">
                           <a:effectLst/>
                         </a:rPr>
                         <a:t>20</a:t>
                       </a:r>
-                      <a:endParaRPr lang="es-MX" sz="1100">
+                      <a:endParaRPr lang="es-MX" sz="1100" dirty="0">
                         <a:effectLst/>
                         <a:latin typeface="Calibri" panose="020F0502020204030204" pitchFamily="34" charset="0"/>
                         <a:ea typeface="Calibri" panose="020F0502020204030204" pitchFamily="34" charset="0"/>
@@ -12130,7 +10761,7 @@
                 </a:tc>
                 <a:extLst>
                   <a:ext uri="{0D108BD9-81ED-4DB2-BD59-A6C34878D82A}">
-                    <a16:rowId xmlns:a16="http://schemas.microsoft.com/office/drawing/2014/main" val="1537276033"/>
+                    <a16:rowId xmlns:a16="http://schemas.microsoft.com/office/drawing/2014/main" xmlns="" val="1537276033"/>
                   </a:ext>
                 </a:extLst>
               </a:tr>
@@ -12224,7 +10855,7 @@
                 </a:tc>
                 <a:extLst>
                   <a:ext uri="{0D108BD9-81ED-4DB2-BD59-A6C34878D82A}">
-                    <a16:rowId xmlns:a16="http://schemas.microsoft.com/office/drawing/2014/main" val="1416546673"/>
+                    <a16:rowId xmlns:a16="http://schemas.microsoft.com/office/drawing/2014/main" xmlns="" val="1416546673"/>
                   </a:ext>
                 </a:extLst>
               </a:tr>
@@ -12318,7 +10949,7 @@
                 </a:tc>
                 <a:extLst>
                   <a:ext uri="{0D108BD9-81ED-4DB2-BD59-A6C34878D82A}">
-                    <a16:rowId xmlns:a16="http://schemas.microsoft.com/office/drawing/2014/main" val="2680602591"/>
+                    <a16:rowId xmlns:a16="http://schemas.microsoft.com/office/drawing/2014/main" xmlns="" val="2680602591"/>
                   </a:ext>
                 </a:extLst>
               </a:tr>
@@ -12412,7 +11043,7 @@
                 </a:tc>
                 <a:extLst>
                   <a:ext uri="{0D108BD9-81ED-4DB2-BD59-A6C34878D82A}">
-                    <a16:rowId xmlns:a16="http://schemas.microsoft.com/office/drawing/2014/main" val="1907123718"/>
+                    <a16:rowId xmlns:a16="http://schemas.microsoft.com/office/drawing/2014/main" xmlns="" val="1907123718"/>
                   </a:ext>
                 </a:extLst>
               </a:tr>
@@ -12506,7 +11137,7 @@
                 </a:tc>
                 <a:extLst>
                   <a:ext uri="{0D108BD9-81ED-4DB2-BD59-A6C34878D82A}">
-                    <a16:rowId xmlns:a16="http://schemas.microsoft.com/office/drawing/2014/main" val="1876568910"/>
+                    <a16:rowId xmlns:a16="http://schemas.microsoft.com/office/drawing/2014/main" xmlns="" val="1876568910"/>
                   </a:ext>
                 </a:extLst>
               </a:tr>
@@ -12600,7 +11231,7 @@
                 </a:tc>
                 <a:extLst>
                   <a:ext uri="{0D108BD9-81ED-4DB2-BD59-A6C34878D82A}">
-                    <a16:rowId xmlns:a16="http://schemas.microsoft.com/office/drawing/2014/main" val="4121735991"/>
+                    <a16:rowId xmlns:a16="http://schemas.microsoft.com/office/drawing/2014/main" xmlns="" val="4121735991"/>
                   </a:ext>
                 </a:extLst>
               </a:tr>
@@ -12611,7 +11242,7 @@
     </p:spTree>
     <p:extLst>
       <p:ext uri="{BB962C8B-B14F-4D97-AF65-F5344CB8AC3E}">
-        <p14:creationId xmlns:p14="http://schemas.microsoft.com/office/powerpoint/2010/main" val="2072205883"/>
+        <p14:creationId xmlns:p14="http://schemas.microsoft.com/office/powerpoint/2010/main" xmlns="" val="2072205883"/>
       </p:ext>
     </p:extLst>
   </p:cSld>
@@ -12643,7 +11274,7 @@
           <p:cNvPr id="2" name="Título 1">
             <a:extLst>
               <a:ext uri="{FF2B5EF4-FFF2-40B4-BE49-F238E27FC236}">
-                <a16:creationId xmlns:a16="http://schemas.microsoft.com/office/drawing/2014/main" id="{A2BCE3B1-7AB3-44FD-A0EF-3674ECC98867}"/>
+                <a16:creationId xmlns:a16="http://schemas.microsoft.com/office/drawing/2014/main" xmlns="" id="{A2BCE3B1-7AB3-44FD-A0EF-3674ECC98867}"/>
               </a:ext>
             </a:extLst>
           </p:cNvPr>
@@ -12672,7 +11303,7 @@
           <p:cNvPr id="3" name="Marcador de contenido 2">
             <a:extLst>
               <a:ext uri="{FF2B5EF4-FFF2-40B4-BE49-F238E27FC236}">
-                <a16:creationId xmlns:a16="http://schemas.microsoft.com/office/drawing/2014/main" id="{AE6A0209-6499-42CA-85CE-7EAAFC4053F2}"/>
+                <a16:creationId xmlns:a16="http://schemas.microsoft.com/office/drawing/2014/main" xmlns="" id="{AE6A0209-6499-42CA-85CE-7EAAFC4053F2}"/>
               </a:ext>
             </a:extLst>
           </p:cNvPr>
@@ -12688,75 +11319,63 @@
           <a:bodyPr/>
           <a:lstStyle/>
           <a:p>
-            <a:r>
-              <a:rPr lang="es-MX" sz="1800" dirty="0">
-                <a:effectLst/>
-                <a:latin typeface="Arial" panose="020B0604020202020204" pitchFamily="34" charset="0"/>
+            <a:pPr algn="just"/>
+            <a:r>
+              <a:rPr lang="es-MX" altLang="es-MX" sz="2400" dirty="0">
+                <a:latin typeface="Arial Narrow" panose="020B0606020202030204" pitchFamily="34" charset="0"/>
                 <a:ea typeface="Calibri" panose="020F0502020204030204" pitchFamily="34" charset="0"/>
-                <a:cs typeface="Times New Roman" panose="02020603050405020304" pitchFamily="18" charset="0"/>
+                <a:cs typeface="Arial" panose="020B0604020202020204" pitchFamily="34" charset="0"/>
               </a:rPr>
               <a:t>En la fase 2 de nuestro proyecto tuvimos que implementar instrucciones de tipo I, instrucciones de </a:t>
             </a:r>
             <a:r>
-              <a:rPr lang="es-MX" sz="1800" dirty="0" err="1">
-                <a:effectLst/>
-                <a:latin typeface="Arial" panose="020B0604020202020204" pitchFamily="34" charset="0"/>
+              <a:rPr lang="es-MX" altLang="es-MX" sz="2400" dirty="0" err="1">
+                <a:latin typeface="Arial Narrow" panose="020B0606020202030204" pitchFamily="34" charset="0"/>
                 <a:ea typeface="Calibri" panose="020F0502020204030204" pitchFamily="34" charset="0"/>
-                <a:cs typeface="Times New Roman" panose="02020603050405020304" pitchFamily="18" charset="0"/>
+                <a:cs typeface="Arial" panose="020B0604020202020204" pitchFamily="34" charset="0"/>
               </a:rPr>
               <a:t>sw</a:t>
             </a:r>
             <a:r>
-              <a:rPr lang="es-MX" sz="1800" dirty="0">
-                <a:effectLst/>
-                <a:latin typeface="Arial" panose="020B0604020202020204" pitchFamily="34" charset="0"/>
+              <a:rPr lang="es-MX" altLang="es-MX" sz="2400" dirty="0">
+                <a:latin typeface="Arial Narrow" panose="020B0606020202030204" pitchFamily="34" charset="0"/>
                 <a:ea typeface="Calibri" panose="020F0502020204030204" pitchFamily="34" charset="0"/>
-                <a:cs typeface="Times New Roman" panose="02020603050405020304" pitchFamily="18" charset="0"/>
+                <a:cs typeface="Arial" panose="020B0604020202020204" pitchFamily="34" charset="0"/>
               </a:rPr>
               <a:t>, </a:t>
             </a:r>
             <a:r>
-              <a:rPr lang="es-MX" sz="1800" dirty="0" err="1">
-                <a:effectLst/>
-                <a:latin typeface="Arial" panose="020B0604020202020204" pitchFamily="34" charset="0"/>
+              <a:rPr lang="es-MX" altLang="es-MX" sz="2400" dirty="0" err="1">
+                <a:latin typeface="Arial Narrow" panose="020B0606020202030204" pitchFamily="34" charset="0"/>
                 <a:ea typeface="Calibri" panose="020F0502020204030204" pitchFamily="34" charset="0"/>
-                <a:cs typeface="Times New Roman" panose="02020603050405020304" pitchFamily="18" charset="0"/>
+                <a:cs typeface="Arial" panose="020B0604020202020204" pitchFamily="34" charset="0"/>
               </a:rPr>
               <a:t>lw</a:t>
             </a:r>
             <a:r>
-              <a:rPr lang="es-MX" sz="1800" dirty="0">
-                <a:effectLst/>
-                <a:latin typeface="Arial" panose="020B0604020202020204" pitchFamily="34" charset="0"/>
+              <a:rPr lang="es-MX" altLang="es-MX" sz="2400" dirty="0">
+                <a:latin typeface="Arial Narrow" panose="020B0606020202030204" pitchFamily="34" charset="0"/>
                 <a:ea typeface="Calibri" panose="020F0502020204030204" pitchFamily="34" charset="0"/>
-                <a:cs typeface="Times New Roman" panose="02020603050405020304" pitchFamily="18" charset="0"/>
+                <a:cs typeface="Arial" panose="020B0604020202020204" pitchFamily="34" charset="0"/>
               </a:rPr>
               <a:t> y </a:t>
             </a:r>
             <a:r>
-              <a:rPr lang="es-MX" sz="1800" dirty="0" err="1">
-                <a:effectLst/>
-                <a:latin typeface="Arial" panose="020B0604020202020204" pitchFamily="34" charset="0"/>
+              <a:rPr lang="es-MX" altLang="es-MX" sz="2400" dirty="0" err="1">
+                <a:latin typeface="Arial Narrow" panose="020B0606020202030204" pitchFamily="34" charset="0"/>
                 <a:ea typeface="Calibri" panose="020F0502020204030204" pitchFamily="34" charset="0"/>
-                <a:cs typeface="Times New Roman" panose="02020603050405020304" pitchFamily="18" charset="0"/>
+                <a:cs typeface="Arial" panose="020B0604020202020204" pitchFamily="34" charset="0"/>
               </a:rPr>
               <a:t>beq</a:t>
             </a:r>
             <a:r>
-              <a:rPr lang="es-MX" sz="1800" dirty="0">
-                <a:effectLst/>
-                <a:latin typeface="Arial" panose="020B0604020202020204" pitchFamily="34" charset="0"/>
+              <a:rPr lang="es-MX" altLang="es-MX" sz="2400" dirty="0">
+                <a:latin typeface="Arial Narrow" panose="020B0606020202030204" pitchFamily="34" charset="0"/>
                 <a:ea typeface="Calibri" panose="020F0502020204030204" pitchFamily="34" charset="0"/>
-                <a:cs typeface="Times New Roman" panose="02020603050405020304" pitchFamily="18" charset="0"/>
+                <a:cs typeface="Arial" panose="020B0604020202020204" pitchFamily="34" charset="0"/>
               </a:rPr>
               <a:t> en nuestro módulo que anteriormente creado para la fase 1 y también agregamos cuatro buffers para que algunas señales (con las que así se requiere) lleguen al mismo tiempo. No fue tan difícil crear todos estos nuevos módulos e implementar otro tipo de operaciones en el código, en mi opinión, lo más complicado fue interconectar todos los módulos y asegurarse de que los bits vayan al lugar correcto y así evitar errores o pérdida de datos.</a:t>
             </a:r>
-            <a:endParaRPr lang="es-MX" sz="1800" dirty="0">
-              <a:effectLst/>
-              <a:latin typeface="Calibri" panose="020F0502020204030204" pitchFamily="34" charset="0"/>
-              <a:ea typeface="Calibri" panose="020F0502020204030204" pitchFamily="34" charset="0"/>
-              <a:cs typeface="Times New Roman" panose="02020603050405020304" pitchFamily="18" charset="0"/>
-            </a:endParaRPr>
           </a:p>
           <a:p>
             <a:endParaRPr lang="es-MX" dirty="0"/>
@@ -12766,7 +11385,7 @@
     </p:spTree>
     <p:extLst>
       <p:ext uri="{BB962C8B-B14F-4D97-AF65-F5344CB8AC3E}">
-        <p14:creationId xmlns:p14="http://schemas.microsoft.com/office/powerpoint/2010/main" val="2526504557"/>
+        <p14:creationId xmlns:p14="http://schemas.microsoft.com/office/powerpoint/2010/main" xmlns="" val="2526504557"/>
       </p:ext>
     </p:extLst>
   </p:cSld>
@@ -12795,15 +11414,9 @@
       </p:grpSpPr>
       <p:pic>
         <p:nvPicPr>
-          <p:cNvPr id="4" name="Marcador de contenido 3" descr="Diagrama, Esquemático&#10;&#10;Descripción generada automáticamente">
-            <a:extLst>
-              <a:ext uri="{FF2B5EF4-FFF2-40B4-BE49-F238E27FC236}">
-                <a16:creationId xmlns:a16="http://schemas.microsoft.com/office/drawing/2014/main" id="{7C18836E-049F-4B66-BB44-3BC510983483}"/>
-              </a:ext>
-            </a:extLst>
-          </p:cNvPr>
+          <p:cNvPr id="1027" name="Picture 3"/>
           <p:cNvPicPr>
-            <a:picLocks noGrp="1"/>
+            <a:picLocks noGrp="1" noChangeAspect="1" noChangeArrowheads="1"/>
           </p:cNvPicPr>
           <p:nvPr>
             <p:ph idx="1"/>
@@ -12811,24 +11424,33 @@
         </p:nvPicPr>
         <p:blipFill>
           <a:blip r:embed="rId2"/>
+          <a:srcRect/>
           <a:stretch>
             <a:fillRect/>
           </a:stretch>
         </p:blipFill>
-        <p:spPr>
+        <p:spPr bwMode="auto">
           <a:xfrm>
-            <a:off x="230848" y="249011"/>
-            <a:ext cx="11757952" cy="6384018"/>
+            <a:off x="749948" y="526473"/>
+            <a:ext cx="10790888" cy="5913944"/>
           </a:xfrm>
           <a:prstGeom prst="rect">
             <a:avLst/>
           </a:prstGeom>
+          <a:noFill/>
+          <a:ln w="9525">
+            <a:noFill/>
+            <a:miter lim="800000"/>
+            <a:headEnd/>
+            <a:tailEnd/>
+          </a:ln>
+          <a:effectLst/>
         </p:spPr>
       </p:pic>
     </p:spTree>
     <p:extLst>
       <p:ext uri="{BB962C8B-B14F-4D97-AF65-F5344CB8AC3E}">
-        <p14:creationId xmlns:p14="http://schemas.microsoft.com/office/powerpoint/2010/main" val="567492587"/>
+        <p14:creationId xmlns:p14="http://schemas.microsoft.com/office/powerpoint/2010/main" xmlns="" val="567492587"/>
       </p:ext>
     </p:extLst>
   </p:cSld>
@@ -12881,7 +11503,7 @@
     </a:clrScheme>
     <a:fontScheme name="Estela de condensación">
       <a:majorFont>
-        <a:latin typeface="Century Gothic" panose="020B0502020202020204"/>
+        <a:latin typeface="Century Gothic"/>
         <a:ea typeface=""/>
         <a:cs typeface=""/>
         <a:font script="Jpan" typeface="ＭＳ Ｐゴシック"/>
@@ -12916,7 +11538,7 @@
         <a:font script="Geor" typeface="Sylfaen"/>
       </a:majorFont>
       <a:minorFont>
-        <a:latin typeface="Century Gothic" panose="020B0502020202020204"/>
+        <a:latin typeface="Century Gothic"/>
         <a:ea typeface=""/>
         <a:cs typeface=""/>
         <a:font script="Jpan" typeface="ＭＳ Ｐゴシック"/>
@@ -13102,7 +11724,7 @@
   <a:extraClrSchemeLst/>
   <a:extLst>
     <a:ext uri="{05A4C25C-085E-4340-85A3-A5531E510DB2}">
-      <thm15:themeFamily xmlns:thm15="http://schemas.microsoft.com/office/thememl/2012/main" name="Vapor Trail" id="{4FDF2955-7D9C-493C-B9F9-C205151B46CD}" vid="{8F31A783-2159-4870-BC29-2BA7D038EA44}"/>
+      <thm15:themeFamily xmlns:thm15="http://schemas.microsoft.com/office/thememl/2012/main" xmlns="" name="Vapor Trail" id="{4FDF2955-7D9C-493C-B9F9-C205151B46CD}" vid="{8F31A783-2159-4870-BC29-2BA7D038EA44}"/>
     </a:ext>
   </a:extLst>
 </a:theme>

</xml_diff>